<commit_message>
add controller and service
</commit_message>
<xml_diff>
--- a/DB 설계.pptx
+++ b/DB 설계.pptx
@@ -197,7 +197,7 @@
           <a:p>
             <a:fld id="{6C5DBB6D-5226-2A49-ABF7-57F1FB2574B4}" type="datetimeFigureOut">
               <a:rPr kumimoji="1" lang="ko-Kore-KR" altLang="en-US" smtClean="0"/>
-              <a:t>2022. 1. 11.</a:t>
+              <a:t>01/16/2022</a:t>
             </a:fld>
             <a:endParaRPr kumimoji="1" lang="ko-Kore-KR" altLang="en-US"/>
           </a:p>
@@ -696,7 +696,7 @@
           <a:p>
             <a:fld id="{13A5D19F-5D9F-4A76-AB4A-89CB286FCE28}" type="datetimeFigureOut">
               <a:rPr lang="ko-KR" altLang="en-US" smtClean="0"/>
-              <a:t>2022. 1. 11.</a:t>
+              <a:t>2022-01-16</a:t>
             </a:fld>
             <a:endParaRPr lang="ko-KR" altLang="en-US"/>
           </a:p>
@@ -894,7 +894,7 @@
           <a:p>
             <a:fld id="{13A5D19F-5D9F-4A76-AB4A-89CB286FCE28}" type="datetimeFigureOut">
               <a:rPr lang="ko-KR" altLang="en-US" smtClean="0"/>
-              <a:t>2022. 1. 11.</a:t>
+              <a:t>2022-01-16</a:t>
             </a:fld>
             <a:endParaRPr lang="ko-KR" altLang="en-US"/>
           </a:p>
@@ -1102,7 +1102,7 @@
           <a:p>
             <a:fld id="{13A5D19F-5D9F-4A76-AB4A-89CB286FCE28}" type="datetimeFigureOut">
               <a:rPr lang="ko-KR" altLang="en-US" smtClean="0"/>
-              <a:t>2022. 1. 11.</a:t>
+              <a:t>2022-01-16</a:t>
             </a:fld>
             <a:endParaRPr lang="ko-KR" altLang="en-US"/>
           </a:p>
@@ -1300,7 +1300,7 @@
           <a:p>
             <a:fld id="{13A5D19F-5D9F-4A76-AB4A-89CB286FCE28}" type="datetimeFigureOut">
               <a:rPr lang="ko-KR" altLang="en-US" smtClean="0"/>
-              <a:t>2022. 1. 11.</a:t>
+              <a:t>2022-01-16</a:t>
             </a:fld>
             <a:endParaRPr lang="ko-KR" altLang="en-US"/>
           </a:p>
@@ -1575,7 +1575,7 @@
           <a:p>
             <a:fld id="{13A5D19F-5D9F-4A76-AB4A-89CB286FCE28}" type="datetimeFigureOut">
               <a:rPr lang="ko-KR" altLang="en-US" smtClean="0"/>
-              <a:t>2022. 1. 11.</a:t>
+              <a:t>2022-01-16</a:t>
             </a:fld>
             <a:endParaRPr lang="ko-KR" altLang="en-US"/>
           </a:p>
@@ -1840,7 +1840,7 @@
           <a:p>
             <a:fld id="{13A5D19F-5D9F-4A76-AB4A-89CB286FCE28}" type="datetimeFigureOut">
               <a:rPr lang="ko-KR" altLang="en-US" smtClean="0"/>
-              <a:t>2022. 1. 11.</a:t>
+              <a:t>2022-01-16</a:t>
             </a:fld>
             <a:endParaRPr lang="ko-KR" altLang="en-US"/>
           </a:p>
@@ -2252,7 +2252,7 @@
           <a:p>
             <a:fld id="{13A5D19F-5D9F-4A76-AB4A-89CB286FCE28}" type="datetimeFigureOut">
               <a:rPr lang="ko-KR" altLang="en-US" smtClean="0"/>
-              <a:t>2022. 1. 11.</a:t>
+              <a:t>2022-01-16</a:t>
             </a:fld>
             <a:endParaRPr lang="ko-KR" altLang="en-US"/>
           </a:p>
@@ -2393,7 +2393,7 @@
           <a:p>
             <a:fld id="{13A5D19F-5D9F-4A76-AB4A-89CB286FCE28}" type="datetimeFigureOut">
               <a:rPr lang="ko-KR" altLang="en-US" smtClean="0"/>
-              <a:t>2022. 1. 11.</a:t>
+              <a:t>2022-01-16</a:t>
             </a:fld>
             <a:endParaRPr lang="ko-KR" altLang="en-US"/>
           </a:p>
@@ -2506,7 +2506,7 @@
           <a:p>
             <a:fld id="{13A5D19F-5D9F-4A76-AB4A-89CB286FCE28}" type="datetimeFigureOut">
               <a:rPr lang="ko-KR" altLang="en-US" smtClean="0"/>
-              <a:t>2022. 1. 11.</a:t>
+              <a:t>2022-01-16</a:t>
             </a:fld>
             <a:endParaRPr lang="ko-KR" altLang="en-US"/>
           </a:p>
@@ -2817,7 +2817,7 @@
           <a:p>
             <a:fld id="{13A5D19F-5D9F-4A76-AB4A-89CB286FCE28}" type="datetimeFigureOut">
               <a:rPr lang="ko-KR" altLang="en-US" smtClean="0"/>
-              <a:t>2022. 1. 11.</a:t>
+              <a:t>2022-01-16</a:t>
             </a:fld>
             <a:endParaRPr lang="ko-KR" altLang="en-US"/>
           </a:p>
@@ -3105,7 +3105,7 @@
           <a:p>
             <a:fld id="{13A5D19F-5D9F-4A76-AB4A-89CB286FCE28}" type="datetimeFigureOut">
               <a:rPr lang="ko-KR" altLang="en-US" smtClean="0"/>
-              <a:t>2022. 1. 11.</a:t>
+              <a:t>2022-01-16</a:t>
             </a:fld>
             <a:endParaRPr lang="ko-KR" altLang="en-US"/>
           </a:p>
@@ -3346,7 +3346,7 @@
           <a:p>
             <a:fld id="{13A5D19F-5D9F-4A76-AB4A-89CB286FCE28}" type="datetimeFigureOut">
               <a:rPr lang="ko-KR" altLang="en-US" smtClean="0"/>
-              <a:t>2022. 1. 11.</a:t>
+              <a:t>2022-01-16</a:t>
             </a:fld>
             <a:endParaRPr lang="ko-KR" altLang="en-US"/>
           </a:p>
@@ -3778,14 +3778,14 @@
           <p:nvPr>
             <p:extLst>
               <p:ext uri="{D42A27DB-BD31-4B8C-83A1-F6EECF244321}">
-                <p14:modId xmlns:p14="http://schemas.microsoft.com/office/powerpoint/2010/main" val="413635783"/>
+                <p14:modId xmlns:p14="http://schemas.microsoft.com/office/powerpoint/2010/main" val="2799764795"/>
               </p:ext>
             </p:extLst>
           </p:nvPr>
         </p:nvGraphicFramePr>
         <p:xfrm>
-          <a:off x="849084" y="67485"/>
-          <a:ext cx="1685567" cy="3627120"/>
+          <a:off x="891279" y="14515"/>
+          <a:ext cx="1685567" cy="3799110"/>
         </p:xfrm>
         <a:graphic>
           <a:graphicData uri="http://schemas.openxmlformats.org/drawingml/2006/table">
@@ -3810,10 +3810,10 @@
                     <a:p>
                       <a:pPr algn="ctr" latinLnBrk="1"/>
                       <a:r>
-                        <a:rPr lang="en-US" altLang="ko-KR" sz="1100" dirty="0"/>
+                        <a:rPr lang="en-US" altLang="ko-KR" sz="800" dirty="0"/>
                         <a:t>Member</a:t>
                       </a:r>
-                      <a:endParaRPr lang="ko-KR" altLang="en-US" sz="1100" dirty="0"/>
+                      <a:endParaRPr lang="ko-KR" altLang="en-US" sz="800" dirty="0"/>
                     </a:p>
                   </a:txBody>
                   <a:tcPr anchor="ctr"/>
@@ -3832,10 +3832,10 @@
                     <a:p>
                       <a:pPr algn="ctr" latinLnBrk="1"/>
                       <a:r>
-                        <a:rPr lang="en-US" altLang="ko-KR" sz="1100" dirty="0"/>
+                        <a:rPr lang="en-US" altLang="ko-KR" sz="800" dirty="0"/>
                         <a:t>email</a:t>
                       </a:r>
-                      <a:endParaRPr lang="ko-KR" altLang="en-US" sz="1100" dirty="0"/>
+                      <a:endParaRPr lang="ko-KR" altLang="en-US" sz="800" dirty="0"/>
                     </a:p>
                   </a:txBody>
                   <a:tcPr anchor="ctr"/>
@@ -3854,10 +3854,10 @@
                     <a:p>
                       <a:pPr algn="ctr" latinLnBrk="1"/>
                       <a:r>
-                        <a:rPr lang="en-US" altLang="ko-KR" sz="1100" dirty="0"/>
+                        <a:rPr lang="en-US" altLang="ko-KR" sz="800" dirty="0"/>
                         <a:t>password</a:t>
                       </a:r>
-                      <a:endParaRPr lang="ko-KR" altLang="en-US" sz="1100" dirty="0"/>
+                      <a:endParaRPr lang="ko-KR" altLang="en-US" sz="800" dirty="0"/>
                     </a:p>
                   </a:txBody>
                   <a:tcPr anchor="ctr"/>
@@ -3876,10 +3876,10 @@
                     <a:p>
                       <a:pPr algn="ctr" latinLnBrk="1"/>
                       <a:r>
-                        <a:rPr lang="en-US" altLang="ko-KR" sz="1100" dirty="0"/>
+                        <a:rPr lang="en-US" altLang="ko-KR" sz="800" dirty="0"/>
                         <a:t>name</a:t>
                       </a:r>
-                      <a:endParaRPr lang="ko-KR" altLang="en-US" sz="1100" dirty="0"/>
+                      <a:endParaRPr lang="ko-KR" altLang="en-US" sz="800" dirty="0"/>
                     </a:p>
                   </a:txBody>
                   <a:tcPr anchor="ctr"/>
@@ -3898,10 +3898,10 @@
                     <a:p>
                       <a:pPr algn="ctr" latinLnBrk="1"/>
                       <a:r>
-                        <a:rPr lang="en-US" altLang="ko-KR" sz="1100" dirty="0"/>
+                        <a:rPr lang="en-US" altLang="ko-KR" sz="800" dirty="0"/>
                         <a:t>phone</a:t>
                       </a:r>
-                      <a:endParaRPr lang="ko-KR" altLang="en-US" sz="1100" dirty="0"/>
+                      <a:endParaRPr lang="ko-KR" altLang="en-US" sz="800" dirty="0"/>
                     </a:p>
                   </a:txBody>
                   <a:tcPr anchor="ctr"/>
@@ -3920,10 +3920,10 @@
                     <a:p>
                       <a:pPr algn="ctr" latinLnBrk="1"/>
                       <a:r>
-                        <a:rPr lang="en-US" altLang="ko-KR" sz="1100" dirty="0"/>
+                        <a:rPr lang="en-US" altLang="ko-KR" sz="800" dirty="0"/>
                         <a:t>birth</a:t>
                       </a:r>
-                      <a:endParaRPr lang="ko-KR" altLang="en-US" sz="1100" dirty="0"/>
+                      <a:endParaRPr lang="ko-KR" altLang="en-US" sz="800" dirty="0"/>
                     </a:p>
                   </a:txBody>
                   <a:tcPr anchor="ctr"/>
@@ -3942,10 +3942,10 @@
                     <a:p>
                       <a:pPr algn="ctr" latinLnBrk="1"/>
                       <a:r>
-                        <a:rPr lang="en-US" altLang="ko-KR" sz="1100" dirty="0" err="1"/>
+                        <a:rPr lang="en-US" altLang="ko-KR" sz="800" dirty="0" err="1"/>
                         <a:t>member_role</a:t>
                       </a:r>
-                      <a:endParaRPr lang="ko-KR" altLang="en-US" sz="1100" dirty="0"/>
+                      <a:endParaRPr lang="ko-KR" altLang="en-US" sz="800" dirty="0"/>
                     </a:p>
                   </a:txBody>
                   <a:tcPr anchor="ctr"/>
@@ -3964,10 +3964,10 @@
                     <a:p>
                       <a:pPr algn="ctr" latinLnBrk="1"/>
                       <a:r>
-                        <a:rPr lang="en-US" altLang="ko-KR" sz="1100" dirty="0"/>
+                        <a:rPr lang="en-US" altLang="ko-KR" sz="800" dirty="0"/>
                         <a:t>address</a:t>
                       </a:r>
-                      <a:endParaRPr lang="ko-KR" altLang="en-US" sz="1100" dirty="0"/>
+                      <a:endParaRPr lang="ko-KR" altLang="en-US" sz="800" dirty="0"/>
                     </a:p>
                   </a:txBody>
                   <a:tcPr anchor="ctr"/>
@@ -3986,10 +3986,10 @@
                     <a:p>
                       <a:pPr algn="ctr" latinLnBrk="1"/>
                       <a:r>
-                        <a:rPr lang="en-US" altLang="ko-KR" sz="1100" dirty="0"/>
+                        <a:rPr lang="en-US" altLang="ko-KR" sz="800" dirty="0"/>
                         <a:t>point</a:t>
                       </a:r>
-                      <a:endParaRPr lang="ko-KR" altLang="en-US" sz="1100" dirty="0"/>
+                      <a:endParaRPr lang="ko-KR" altLang="en-US" sz="800" dirty="0"/>
                     </a:p>
                   </a:txBody>
                   <a:tcPr anchor="ctr"/>
@@ -4008,10 +4008,10 @@
                     <a:p>
                       <a:pPr algn="ctr" latinLnBrk="1"/>
                       <a:r>
-                        <a:rPr lang="en-US" altLang="ko-KR" sz="1100" dirty="0"/>
+                        <a:rPr lang="en-US" altLang="ko-KR" sz="800" dirty="0"/>
                         <a:t>chance</a:t>
                       </a:r>
-                      <a:endParaRPr lang="ko-KR" altLang="en-US" sz="1100" dirty="0"/>
+                      <a:endParaRPr lang="ko-KR" altLang="en-US" sz="800" dirty="0"/>
                     </a:p>
                   </a:txBody>
                   <a:tcPr anchor="ctr"/>
@@ -4030,7 +4030,7 @@
                     <a:p>
                       <a:pPr algn="ctr" latinLnBrk="1"/>
                       <a:r>
-                        <a:rPr lang="en-US" altLang="ko-KR" sz="1100" dirty="0">
+                        <a:rPr lang="en-US" altLang="ko-KR" sz="800" dirty="0">
                           <a:solidFill>
                             <a:srgbClr val="0070C0"/>
                           </a:solidFill>
@@ -4038,7 +4038,7 @@
                         <a:t>List&lt;</a:t>
                       </a:r>
                       <a:r>
-                        <a:rPr lang="en-US" altLang="ko-KR" sz="1100" dirty="0" err="1">
+                        <a:rPr lang="en-US" altLang="ko-KR" sz="800" dirty="0" err="1">
                           <a:solidFill>
                             <a:srgbClr val="0070C0"/>
                           </a:solidFill>
@@ -4046,14 +4046,14 @@
                         <a:t>Cart_item</a:t>
                       </a:r>
                       <a:r>
-                        <a:rPr lang="en-US" altLang="ko-KR" sz="1100" dirty="0">
+                        <a:rPr lang="en-US" altLang="ko-KR" sz="800" dirty="0">
                           <a:solidFill>
                             <a:srgbClr val="0070C0"/>
                           </a:solidFill>
                         </a:rPr>
                         <a:t>&gt;</a:t>
                       </a:r>
-                      <a:endParaRPr lang="ko-KR" altLang="en-US" sz="1100" dirty="0">
+                      <a:endParaRPr lang="ko-KR" altLang="en-US" sz="800" dirty="0">
                         <a:solidFill>
                           <a:srgbClr val="0070C0"/>
                         </a:solidFill>
@@ -4076,14 +4076,14 @@
                     <a:p>
                       <a:pPr algn="ctr" latinLnBrk="1"/>
                       <a:r>
-                        <a:rPr lang="en-US" altLang="ko-KR" sz="1100" dirty="0">
+                        <a:rPr lang="en-US" altLang="ko-KR" sz="800" dirty="0">
                           <a:solidFill>
                             <a:srgbClr val="0070C0"/>
                           </a:solidFill>
                         </a:rPr>
                         <a:t>List&lt;Order&gt;</a:t>
                       </a:r>
-                      <a:endParaRPr lang="ko-KR" altLang="en-US" sz="1100" dirty="0">
+                      <a:endParaRPr lang="ko-KR" altLang="en-US" sz="800" dirty="0">
                         <a:solidFill>
                           <a:srgbClr val="0070C0"/>
                         </a:solidFill>
@@ -4106,7 +4106,7 @@
                     <a:p>
                       <a:pPr algn="ctr" latinLnBrk="1"/>
                       <a:r>
-                        <a:rPr lang="en-US" altLang="ko-KR" sz="1100" dirty="0">
+                        <a:rPr lang="en-US" altLang="ko-KR" sz="800" dirty="0">
                           <a:solidFill>
                             <a:srgbClr val="0070C0"/>
                           </a:solidFill>
@@ -4114,7 +4114,7 @@
                         <a:t>List&lt;</a:t>
                       </a:r>
                       <a:r>
-                        <a:rPr lang="en-US" altLang="ko-KR" sz="1100" dirty="0" err="1">
+                        <a:rPr lang="en-US" altLang="ko-KR" sz="800" dirty="0" err="1">
                           <a:solidFill>
                             <a:srgbClr val="0070C0"/>
                           </a:solidFill>
@@ -4122,14 +4122,14 @@
                         <a:t>preference_item</a:t>
                       </a:r>
                       <a:r>
-                        <a:rPr lang="en-US" altLang="ko-KR" sz="1100" dirty="0">
+                        <a:rPr lang="en-US" altLang="ko-KR" sz="800" dirty="0">
                           <a:solidFill>
                             <a:srgbClr val="0070C0"/>
                           </a:solidFill>
                         </a:rPr>
                         <a:t>&gt;</a:t>
                       </a:r>
-                      <a:endParaRPr lang="ko-KR" altLang="en-US" sz="1100" dirty="0">
+                      <a:endParaRPr lang="ko-KR" altLang="en-US" sz="800" dirty="0">
                         <a:solidFill>
                           <a:srgbClr val="0070C0"/>
                         </a:solidFill>
@@ -4152,14 +4152,14 @@
                     <a:p>
                       <a:pPr algn="ctr" latinLnBrk="1"/>
                       <a:r>
-                        <a:rPr lang="en-US" altLang="ko-KR" sz="1100" dirty="0">
+                        <a:rPr lang="en-US" altLang="ko-KR" sz="800" dirty="0">
                           <a:solidFill>
                             <a:srgbClr val="0070C0"/>
                           </a:solidFill>
                         </a:rPr>
                         <a:t>List&lt;Coupon&gt;</a:t>
                       </a:r>
-                      <a:endParaRPr lang="ko-KR" altLang="en-US" sz="1100" dirty="0">
+                      <a:endParaRPr lang="ko-KR" altLang="en-US" sz="800" dirty="0">
                         <a:solidFill>
                           <a:srgbClr val="0070C0"/>
                         </a:solidFill>
@@ -4171,6 +4171,82 @@
                 <a:extLst>
                   <a:ext uri="{0D108BD9-81ED-4DB2-BD59-A6C34878D82A}">
                     <a16:rowId xmlns:a16="http://schemas.microsoft.com/office/drawing/2014/main" val="1615974711"/>
+                  </a:ext>
+                </a:extLst>
+              </a:tr>
+              <a:tr h="239050">
+                <a:tc>
+                  <a:txBody>
+                    <a:bodyPr/>
+                    <a:lstStyle/>
+                    <a:p>
+                      <a:pPr algn="ctr" latinLnBrk="1"/>
+                      <a:r>
+                        <a:rPr lang="en-US" altLang="ko-KR" sz="800" dirty="0">
+                          <a:solidFill>
+                            <a:srgbClr val="0070C0"/>
+                          </a:solidFill>
+                        </a:rPr>
+                        <a:t>List&lt;</a:t>
+                      </a:r>
+                      <a:r>
+                        <a:rPr lang="en-US" altLang="ko-KR" sz="800" dirty="0" err="1">
+                          <a:solidFill>
+                            <a:srgbClr val="0070C0"/>
+                          </a:solidFill>
+                        </a:rPr>
+                        <a:t>QnA</a:t>
+                      </a:r>
+                      <a:r>
+                        <a:rPr lang="en-US" altLang="ko-KR" sz="800" dirty="0">
+                          <a:solidFill>
+                            <a:srgbClr val="0070C0"/>
+                          </a:solidFill>
+                        </a:rPr>
+                        <a:t>&gt;</a:t>
+                      </a:r>
+                      <a:endParaRPr lang="ko-KR" altLang="en-US" sz="800" dirty="0">
+                        <a:solidFill>
+                          <a:srgbClr val="0070C0"/>
+                        </a:solidFill>
+                      </a:endParaRPr>
+                    </a:p>
+                  </a:txBody>
+                  <a:tcPr anchor="ctr"/>
+                </a:tc>
+                <a:extLst>
+                  <a:ext uri="{0D108BD9-81ED-4DB2-BD59-A6C34878D82A}">
+                    <a16:rowId xmlns:a16="http://schemas.microsoft.com/office/drawing/2014/main" val="2740698016"/>
+                  </a:ext>
+                </a:extLst>
+              </a:tr>
+              <a:tr h="239050">
+                <a:tc>
+                  <a:txBody>
+                    <a:bodyPr/>
+                    <a:lstStyle/>
+                    <a:p>
+                      <a:pPr algn="ctr" latinLnBrk="1"/>
+                      <a:r>
+                        <a:rPr lang="en-US" altLang="ko-KR" sz="800" dirty="0">
+                          <a:solidFill>
+                            <a:srgbClr val="0070C0"/>
+                          </a:solidFill>
+                        </a:rPr>
+                        <a:t>List&lt;Review&gt;</a:t>
+                      </a:r>
+                      <a:endParaRPr lang="ko-KR" altLang="en-US" sz="800" dirty="0">
+                        <a:solidFill>
+                          <a:srgbClr val="0070C0"/>
+                        </a:solidFill>
+                      </a:endParaRPr>
+                    </a:p>
+                  </a:txBody>
+                  <a:tcPr anchor="ctr"/>
+                </a:tc>
+                <a:extLst>
+                  <a:ext uri="{0D108BD9-81ED-4DB2-BD59-A6C34878D82A}">
+                    <a16:rowId xmlns:a16="http://schemas.microsoft.com/office/drawing/2014/main" val="414508946"/>
                   </a:ext>
                 </a:extLst>
               </a:tr>
@@ -4193,7 +4269,7 @@
           <p:nvPr>
             <p:extLst>
               <p:ext uri="{D42A27DB-BD31-4B8C-83A1-F6EECF244321}">
-                <p14:modId xmlns:p14="http://schemas.microsoft.com/office/powerpoint/2010/main" val="1310738796"/>
+                <p14:modId xmlns:p14="http://schemas.microsoft.com/office/powerpoint/2010/main" val="3259892194"/>
               </p:ext>
             </p:extLst>
           </p:nvPr>
@@ -4252,7 +4328,7 @@
                             <a:srgbClr val="C00000"/>
                           </a:solidFill>
                         </a:rPr>
-                        <a:t>Deliver</a:t>
+                        <a:t>Deliver 1:1</a:t>
                       </a:r>
                       <a:endParaRPr lang="ko-KR" altLang="en-US" sz="1100" dirty="0">
                         <a:solidFill>
@@ -4282,7 +4358,7 @@
                             <a:srgbClr val="C00000"/>
                           </a:solidFill>
                         </a:rPr>
-                        <a:t>Member</a:t>
+                        <a:t>Member N:1</a:t>
                       </a:r>
                       <a:endParaRPr lang="ko-KR" altLang="en-US" sz="1100" dirty="0">
                         <a:solidFill>
@@ -4356,7 +4432,7 @@
                             <a:srgbClr val="C00000"/>
                           </a:solidFill>
                         </a:rPr>
-                        <a:t>Coupon</a:t>
+                        <a:t>Coupon 1:1</a:t>
                       </a:r>
                       <a:endParaRPr lang="ko-KR" altLang="en-US" sz="1100" dirty="0">
                         <a:solidFill>
@@ -4558,13 +4634,13 @@
           <p:nvPr>
             <p:extLst>
               <p:ext uri="{D42A27DB-BD31-4B8C-83A1-F6EECF244321}">
-                <p14:modId xmlns:p14="http://schemas.microsoft.com/office/powerpoint/2010/main" val="2977229621"/>
+                <p14:modId xmlns:p14="http://schemas.microsoft.com/office/powerpoint/2010/main" val="3029864559"/>
               </p:ext>
             </p:extLst>
           </p:nvPr>
         </p:nvGraphicFramePr>
         <p:xfrm>
-          <a:off x="2701616" y="4263930"/>
+          <a:off x="2707241" y="4544722"/>
           <a:ext cx="1156368" cy="1813560"/>
         </p:xfrm>
         <a:graphic>
@@ -4617,7 +4693,7 @@
                             <a:srgbClr val="C00000"/>
                           </a:solidFill>
                         </a:rPr>
-                        <a:t>Order</a:t>
+                        <a:t>Order N:1</a:t>
                       </a:r>
                       <a:endParaRPr lang="ko-KR" altLang="en-US" sz="1100" dirty="0">
                         <a:solidFill>
@@ -4647,7 +4723,7 @@
                             <a:srgbClr val="C00000"/>
                           </a:solidFill>
                         </a:rPr>
-                        <a:t>Item</a:t>
+                        <a:t>Item N:1</a:t>
                       </a:r>
                       <a:endParaRPr lang="ko-KR" altLang="en-US" sz="1100" dirty="0">
                         <a:solidFill>
@@ -4699,7 +4775,7 @@
                             <a:srgbClr val="C00000"/>
                           </a:solidFill>
                         </a:rPr>
-                        <a:t>Option1</a:t>
+                        <a:t>Option1 N:1</a:t>
                       </a:r>
                       <a:endParaRPr lang="ko-KR" altLang="en-US" sz="1100" dirty="0">
                         <a:solidFill>
@@ -4729,7 +4805,7 @@
                             <a:srgbClr val="C00000"/>
                           </a:solidFill>
                         </a:rPr>
-                        <a:t>Option2</a:t>
+                        <a:t>Option2 N:1</a:t>
                       </a:r>
                       <a:endParaRPr lang="ko-KR" altLang="en-US" sz="1100" dirty="0">
                         <a:solidFill>
@@ -4787,13 +4863,13 @@
           <p:nvPr>
             <p:extLst>
               <p:ext uri="{D42A27DB-BD31-4B8C-83A1-F6EECF244321}">
-                <p14:modId xmlns:p14="http://schemas.microsoft.com/office/powerpoint/2010/main" val="2709933416"/>
+                <p14:modId xmlns:p14="http://schemas.microsoft.com/office/powerpoint/2010/main" val="365917124"/>
               </p:ext>
             </p:extLst>
           </p:nvPr>
         </p:nvGraphicFramePr>
         <p:xfrm>
-          <a:off x="2735975" y="2272361"/>
+          <a:off x="2734887" y="2474758"/>
           <a:ext cx="1156368" cy="1813560"/>
         </p:xfrm>
         <a:graphic>
@@ -4846,7 +4922,7 @@
                             <a:srgbClr val="C00000"/>
                           </a:solidFill>
                         </a:rPr>
-                        <a:t>Item</a:t>
+                        <a:t>Item N:1</a:t>
                       </a:r>
                       <a:endParaRPr lang="ko-KR" altLang="en-US" sz="1100" dirty="0">
                         <a:solidFill>
@@ -4898,7 +4974,7 @@
                             <a:srgbClr val="C00000"/>
                           </a:solidFill>
                         </a:rPr>
-                        <a:t>Member</a:t>
+                        <a:t>Member N:1</a:t>
                       </a:r>
                       <a:endParaRPr lang="ko-KR" altLang="en-US" sz="1100" dirty="0">
                         <a:solidFill>
@@ -4928,7 +5004,7 @@
                             <a:srgbClr val="C00000"/>
                           </a:solidFill>
                         </a:rPr>
-                        <a:t>Option1</a:t>
+                        <a:t>Option1 N:1</a:t>
                       </a:r>
                       <a:endParaRPr lang="ko-KR" altLang="en-US" sz="1100" dirty="0">
                         <a:solidFill>
@@ -4958,7 +5034,7 @@
                             <a:srgbClr val="C00000"/>
                           </a:solidFill>
                         </a:rPr>
-                        <a:t>Option2</a:t>
+                        <a:t>Option2 N:1</a:t>
                       </a:r>
                       <a:endParaRPr lang="ko-KR" altLang="en-US" sz="1100" dirty="0">
                         <a:solidFill>
@@ -5016,7 +5092,7 @@
           <p:nvPr>
             <p:extLst>
               <p:ext uri="{D42A27DB-BD31-4B8C-83A1-F6EECF244321}">
-                <p14:modId xmlns:p14="http://schemas.microsoft.com/office/powerpoint/2010/main" val="2167311321"/>
+                <p14:modId xmlns:p14="http://schemas.microsoft.com/office/powerpoint/2010/main" val="621245353"/>
               </p:ext>
             </p:extLst>
           </p:nvPr>
@@ -5075,7 +5151,7 @@
                             <a:srgbClr val="C00000"/>
                           </a:solidFill>
                         </a:rPr>
-                        <a:t>Item</a:t>
+                        <a:t>Item N:1</a:t>
                       </a:r>
                       <a:endParaRPr lang="ko-KR" altLang="en-US" sz="1100" dirty="0">
                         <a:solidFill>
@@ -5105,7 +5181,7 @@
                             <a:srgbClr val="C00000"/>
                           </a:solidFill>
                         </a:rPr>
-                        <a:t>Member</a:t>
+                        <a:t>Member N:1</a:t>
                       </a:r>
                       <a:endParaRPr lang="ko-KR" altLang="en-US" sz="1100" dirty="0">
                         <a:solidFill>
@@ -5141,14 +5217,14 @@
           <p:nvPr>
             <p:extLst>
               <p:ext uri="{D42A27DB-BD31-4B8C-83A1-F6EECF244321}">
-                <p14:modId xmlns:p14="http://schemas.microsoft.com/office/powerpoint/2010/main" val="4156009969"/>
+                <p14:modId xmlns:p14="http://schemas.microsoft.com/office/powerpoint/2010/main" val="3292289290"/>
               </p:ext>
             </p:extLst>
           </p:nvPr>
         </p:nvGraphicFramePr>
         <p:xfrm>
-          <a:off x="2598188" y="137670"/>
-          <a:ext cx="1420569" cy="2072640"/>
+          <a:off x="2608736" y="0"/>
+          <a:ext cx="1420569" cy="2331720"/>
         </p:xfrm>
         <a:graphic>
           <a:graphicData uri="http://schemas.openxmlformats.org/drawingml/2006/table">
@@ -5347,7 +5423,7 @@
                             <a:srgbClr val="C00000"/>
                           </a:solidFill>
                         </a:rPr>
-                        <a:t>Member</a:t>
+                        <a:t>Member N:1</a:t>
                       </a:r>
                       <a:endParaRPr lang="ko-KR" altLang="en-US" sz="1100" dirty="0">
                         <a:solidFill>
@@ -5361,6 +5437,36 @@
                 <a:extLst>
                   <a:ext uri="{0D108BD9-81ED-4DB2-BD59-A6C34878D82A}">
                     <a16:rowId xmlns:a16="http://schemas.microsoft.com/office/drawing/2014/main" val="2026906847"/>
+                  </a:ext>
+                </a:extLst>
+              </a:tr>
+              <a:tr h="239050">
+                <a:tc>
+                  <a:txBody>
+                    <a:bodyPr/>
+                    <a:lstStyle/>
+                    <a:p>
+                      <a:pPr algn="ctr" latinLnBrk="1"/>
+                      <a:r>
+                        <a:rPr lang="en-US" altLang="ko-KR" sz="1100" dirty="0" err="1">
+                          <a:solidFill>
+                            <a:schemeClr val="tx1"/>
+                          </a:solidFill>
+                        </a:rPr>
+                        <a:t>isUsed</a:t>
+                      </a:r>
+                      <a:endParaRPr lang="ko-KR" altLang="en-US" sz="1100" dirty="0">
+                        <a:solidFill>
+                          <a:schemeClr val="tx1"/>
+                        </a:solidFill>
+                      </a:endParaRPr>
+                    </a:p>
+                  </a:txBody>
+                  <a:tcPr anchor="ctr"/>
+                </a:tc>
+                <a:extLst>
+                  <a:ext uri="{0D108BD9-81ED-4DB2-BD59-A6C34878D82A}">
+                    <a16:rowId xmlns:a16="http://schemas.microsoft.com/office/drawing/2014/main" val="1471570891"/>
                   </a:ext>
                 </a:extLst>
               </a:tr>
@@ -5383,7 +5489,7 @@
           <p:nvPr>
             <p:extLst>
               <p:ext uri="{D42A27DB-BD31-4B8C-83A1-F6EECF244321}">
-                <p14:modId xmlns:p14="http://schemas.microsoft.com/office/powerpoint/2010/main" val="813135899"/>
+                <p14:modId xmlns:p14="http://schemas.microsoft.com/office/powerpoint/2010/main" val="140078655"/>
               </p:ext>
             </p:extLst>
           </p:nvPr>
@@ -5437,16 +5543,16 @@
                     <a:p>
                       <a:pPr algn="ctr" latinLnBrk="1"/>
                       <a:r>
-                        <a:rPr lang="en-US" altLang="ko-KR" sz="1100" dirty="0">
+                        <a:rPr lang="en-US" altLang="ko-KR" sz="1100" dirty="0" err="1">
                           <a:solidFill>
-                            <a:srgbClr val="0070C0"/>
+                            <a:schemeClr val="tx1"/>
                           </a:solidFill>
                         </a:rPr>
-                        <a:t>List&lt;Category&gt;</a:t>
+                        <a:t>item_state</a:t>
                       </a:r>
                       <a:endParaRPr lang="ko-KR" altLang="en-US" sz="1100" dirty="0">
                         <a:solidFill>
-                          <a:srgbClr val="0070C0"/>
+                          <a:schemeClr val="tx1"/>
                         </a:solidFill>
                       </a:endParaRPr>
                     </a:p>
@@ -5472,7 +5578,7 @@
                             <a:srgbClr val="C00000"/>
                           </a:solidFill>
                         </a:rPr>
-                        <a:t>Thumbnail</a:t>
+                        <a:t>Thumbnail 1:1</a:t>
                       </a:r>
                       <a:endParaRPr lang="ko-KR" altLang="en-US" sz="1100" dirty="0">
                         <a:solidFill>
@@ -5504,6 +5610,14 @@
                         </a:rPr>
                         <a:t>Admin_member</a:t>
                       </a:r>
+                      <a:r>
+                        <a:rPr lang="en-US" altLang="ko-KR" sz="1100" dirty="0">
+                          <a:solidFill>
+                            <a:srgbClr val="C00000"/>
+                          </a:solidFill>
+                        </a:rPr>
+                        <a:t> N:1</a:t>
+                      </a:r>
                       <a:endParaRPr lang="ko-KR" altLang="en-US" sz="1100" dirty="0">
                         <a:solidFill>
                           <a:srgbClr val="C00000"/>
@@ -5560,6 +5674,80 @@
                 <a:extLst>
                   <a:ext uri="{0D108BD9-81ED-4DB2-BD59-A6C34878D82A}">
                     <a16:rowId xmlns:a16="http://schemas.microsoft.com/office/drawing/2014/main" val="3029070334"/>
+                  </a:ext>
+                </a:extLst>
+              </a:tr>
+              <a:tr h="239050">
+                <a:tc>
+                  <a:txBody>
+                    <a:bodyPr/>
+                    <a:lstStyle/>
+                    <a:p>
+                      <a:pPr algn="ctr" latinLnBrk="1"/>
+                      <a:r>
+                        <a:rPr lang="en-US" altLang="ko-KR" sz="1100" dirty="0" err="1">
+                          <a:solidFill>
+                            <a:schemeClr val="tx1"/>
+                          </a:solidFill>
+                        </a:rPr>
+                        <a:t>registry_date</a:t>
+                      </a:r>
+                      <a:endParaRPr lang="ko-KR" altLang="en-US" sz="1100" dirty="0">
+                        <a:solidFill>
+                          <a:schemeClr val="tx1"/>
+                        </a:solidFill>
+                      </a:endParaRPr>
+                    </a:p>
+                  </a:txBody>
+                  <a:tcPr anchor="ctr"/>
+                </a:tc>
+                <a:extLst>
+                  <a:ext uri="{0D108BD9-81ED-4DB2-BD59-A6C34878D82A}">
+                    <a16:rowId xmlns:a16="http://schemas.microsoft.com/office/drawing/2014/main" val="1772206542"/>
+                  </a:ext>
+                </a:extLst>
+              </a:tr>
+              <a:tr h="239050">
+                <a:tc>
+                  <a:txBody>
+                    <a:bodyPr/>
+                    <a:lstStyle/>
+                    <a:p>
+                      <a:pPr algn="ctr" latinLnBrk="1"/>
+                      <a:r>
+                        <a:rPr lang="en-US" altLang="ko-KR" sz="1100" dirty="0"/>
+                        <a:t>version</a:t>
+                      </a:r>
+                      <a:endParaRPr lang="ko-KR" altLang="en-US" sz="1100" dirty="0"/>
+                    </a:p>
+                  </a:txBody>
+                  <a:tcPr anchor="ctr"/>
+                </a:tc>
+                <a:extLst>
+                  <a:ext uri="{0D108BD9-81ED-4DB2-BD59-A6C34878D82A}">
+                    <a16:rowId xmlns:a16="http://schemas.microsoft.com/office/drawing/2014/main" val="1771303497"/>
+                  </a:ext>
+                </a:extLst>
+              </a:tr>
+              <a:tr h="239050">
+                <a:tc>
+                  <a:txBody>
+                    <a:bodyPr/>
+                    <a:lstStyle/>
+                    <a:p>
+                      <a:pPr algn="ctr" latinLnBrk="1"/>
+                      <a:r>
+                        <a:rPr lang="en-US" altLang="ko-KR" sz="1100" dirty="0"/>
+                        <a:t>sale</a:t>
+                      </a:r>
+                      <a:endParaRPr lang="ko-KR" altLang="en-US" sz="1100" dirty="0"/>
+                    </a:p>
+                  </a:txBody>
+                  <a:tcPr anchor="ctr"/>
+                </a:tc>
+                <a:extLst>
+                  <a:ext uri="{0D108BD9-81ED-4DB2-BD59-A6C34878D82A}">
+                    <a16:rowId xmlns:a16="http://schemas.microsoft.com/office/drawing/2014/main" val="2543635310"/>
                   </a:ext>
                 </a:extLst>
               </a:tr>
@@ -5584,7 +5772,7 @@
                             <a:srgbClr val="0070C0"/>
                           </a:solidFill>
                         </a:rPr>
-                        <a:t>Detail_image</a:t>
+                        <a:t>Category_item</a:t>
                       </a:r>
                       <a:r>
                         <a:rPr lang="en-US" altLang="ko-KR" sz="1100" dirty="0">
@@ -5605,7 +5793,7 @@
                 </a:tc>
                 <a:extLst>
                   <a:ext uri="{0D108BD9-81ED-4DB2-BD59-A6C34878D82A}">
-                    <a16:rowId xmlns:a16="http://schemas.microsoft.com/office/drawing/2014/main" val="1772206542"/>
+                    <a16:rowId xmlns:a16="http://schemas.microsoft.com/office/drawing/2014/main" val="2682673113"/>
                   </a:ext>
                 </a:extLst>
               </a:tr>
@@ -5617,76 +5805,34 @@
                     <a:p>
                       <a:pPr algn="ctr" latinLnBrk="1"/>
                       <a:r>
-                        <a:rPr lang="en-US" altLang="ko-KR" sz="1100" dirty="0"/>
-                        <a:t>version</a:t>
-                      </a:r>
-                      <a:endParaRPr lang="ko-KR" altLang="en-US" sz="1100" dirty="0"/>
-                    </a:p>
-                  </a:txBody>
-                  <a:tcPr anchor="ctr"/>
-                </a:tc>
-                <a:extLst>
-                  <a:ext uri="{0D108BD9-81ED-4DB2-BD59-A6C34878D82A}">
-                    <a16:rowId xmlns:a16="http://schemas.microsoft.com/office/drawing/2014/main" val="1771303497"/>
-                  </a:ext>
-                </a:extLst>
-              </a:tr>
-              <a:tr h="239050">
-                <a:tc>
-                  <a:txBody>
-                    <a:bodyPr/>
-                    <a:lstStyle/>
-                    <a:p>
-                      <a:pPr algn="ctr" latinLnBrk="1"/>
-                      <a:r>
-                        <a:rPr lang="en-US" altLang="ko-KR" sz="1100" dirty="0"/>
-                        <a:t>sale</a:t>
-                      </a:r>
-                      <a:endParaRPr lang="ko-KR" altLang="en-US" sz="1100" dirty="0"/>
-                    </a:p>
-                  </a:txBody>
-                  <a:tcPr anchor="ctr"/>
-                </a:tc>
-                <a:extLst>
-                  <a:ext uri="{0D108BD9-81ED-4DB2-BD59-A6C34878D82A}">
-                    <a16:rowId xmlns:a16="http://schemas.microsoft.com/office/drawing/2014/main" val="2543635310"/>
-                  </a:ext>
-                </a:extLst>
-              </a:tr>
-              <a:tr h="239050">
-                <a:tc>
-                  <a:txBody>
-                    <a:bodyPr/>
-                    <a:lstStyle/>
-                    <a:p>
-                      <a:pPr algn="ctr" latinLnBrk="1"/>
-                      <a:r>
-                        <a:rPr lang="en-US" altLang="ko-KR" sz="1100" dirty="0" err="1"/>
-                        <a:t>item_state</a:t>
-                      </a:r>
-                      <a:endParaRPr lang="ko-KR" altLang="en-US" sz="1100" dirty="0"/>
-                    </a:p>
-                  </a:txBody>
-                  <a:tcPr anchor="ctr"/>
-                </a:tc>
-                <a:extLst>
-                  <a:ext uri="{0D108BD9-81ED-4DB2-BD59-A6C34878D82A}">
-                    <a16:rowId xmlns:a16="http://schemas.microsoft.com/office/drawing/2014/main" val="2682673113"/>
-                  </a:ext>
-                </a:extLst>
-              </a:tr>
-              <a:tr h="239050">
-                <a:tc>
-                  <a:txBody>
-                    <a:bodyPr/>
-                    <a:lstStyle/>
-                    <a:p>
-                      <a:pPr algn="ctr" latinLnBrk="1"/>
-                      <a:r>
-                        <a:rPr lang="en-US" altLang="ko-KR" sz="1100" dirty="0" err="1"/>
-                        <a:t>registry_date</a:t>
-                      </a:r>
-                      <a:endParaRPr lang="ko-KR" altLang="en-US" sz="1100" dirty="0"/>
+                        <a:rPr lang="en-US" altLang="ko-KR" sz="1100" dirty="0">
+                          <a:solidFill>
+                            <a:srgbClr val="0070C0"/>
+                          </a:solidFill>
+                        </a:rPr>
+                        <a:t>List&lt;</a:t>
+                      </a:r>
+                      <a:r>
+                        <a:rPr lang="en-US" altLang="ko-KR" sz="1100" dirty="0" err="1">
+                          <a:solidFill>
+                            <a:srgbClr val="0070C0"/>
+                          </a:solidFill>
+                        </a:rPr>
+                        <a:t>Detail_image</a:t>
+                      </a:r>
+                      <a:r>
+                        <a:rPr lang="en-US" altLang="ko-KR" sz="1100" dirty="0">
+                          <a:solidFill>
+                            <a:srgbClr val="0070C0"/>
+                          </a:solidFill>
+                        </a:rPr>
+                        <a:t>&gt;</a:t>
+                      </a:r>
+                      <a:endParaRPr lang="ko-KR" altLang="en-US" sz="1100" dirty="0">
+                        <a:solidFill>
+                          <a:srgbClr val="0070C0"/>
+                        </a:solidFill>
+                      </a:endParaRPr>
                     </a:p>
                   </a:txBody>
                   <a:tcPr anchor="ctr"/>
@@ -5868,7 +6014,7 @@
           <p:nvPr>
             <p:extLst>
               <p:ext uri="{D42A27DB-BD31-4B8C-83A1-F6EECF244321}">
-                <p14:modId xmlns:p14="http://schemas.microsoft.com/office/powerpoint/2010/main" val="3449820672"/>
+                <p14:modId xmlns:p14="http://schemas.microsoft.com/office/powerpoint/2010/main" val="921949286"/>
               </p:ext>
             </p:extLst>
           </p:nvPr>
@@ -5943,7 +6089,7 @@
                             <a:srgbClr val="C00000"/>
                           </a:solidFill>
                         </a:rPr>
-                        <a:t>Item</a:t>
+                        <a:t>Item N:1</a:t>
                       </a:r>
                       <a:endParaRPr lang="ko-KR" altLang="en-US" sz="1100" dirty="0"/>
                     </a:p>
@@ -6184,14 +6330,14 @@
           <p:nvPr>
             <p:extLst>
               <p:ext uri="{D42A27DB-BD31-4B8C-83A1-F6EECF244321}">
-                <p14:modId xmlns:p14="http://schemas.microsoft.com/office/powerpoint/2010/main" val="1895180459"/>
+                <p14:modId xmlns:p14="http://schemas.microsoft.com/office/powerpoint/2010/main" val="2997170559"/>
               </p:ext>
             </p:extLst>
           </p:nvPr>
         </p:nvGraphicFramePr>
         <p:xfrm>
           <a:off x="4209480" y="2974483"/>
-          <a:ext cx="1203740" cy="2072640"/>
+          <a:ext cx="1203740" cy="2240280"/>
         </p:xfrm>
         <a:graphic>
           <a:graphicData uri="http://schemas.openxmlformats.org/drawingml/2006/table">
@@ -6259,7 +6405,7 @@
                             <a:srgbClr val="C00000"/>
                           </a:solidFill>
                         </a:rPr>
-                        <a:t>Item</a:t>
+                        <a:t>Item N:1</a:t>
                       </a:r>
                       <a:endParaRPr lang="ko-KR" altLang="en-US" sz="1100" dirty="0">
                         <a:solidFill>
@@ -6305,7 +6451,7 @@
                             <a:srgbClr val="C00000"/>
                           </a:solidFill>
                         </a:rPr>
-                        <a:t>Member</a:t>
+                        <a:t>Member N:1</a:t>
                       </a:r>
                       <a:endParaRPr lang="ko-KR" altLang="en-US" sz="1100" dirty="0">
                         <a:solidFill>
@@ -6352,6 +6498,14 @@
                           </a:solidFill>
                         </a:rPr>
                         <a:t>Admin_member</a:t>
+                      </a:r>
+                      <a:r>
+                        <a:rPr lang="en-US" altLang="ko-KR" sz="1100" dirty="0">
+                          <a:solidFill>
+                            <a:srgbClr val="C00000"/>
+                          </a:solidFill>
+                        </a:rPr>
+                        <a:t> N:1</a:t>
                       </a:r>
                       <a:endParaRPr lang="ko-KR" altLang="en-US" sz="1100" dirty="0">
                         <a:solidFill>
@@ -6539,7 +6693,7 @@
           <p:nvPr>
             <p:extLst>
               <p:ext uri="{D42A27DB-BD31-4B8C-83A1-F6EECF244321}">
-                <p14:modId xmlns:p14="http://schemas.microsoft.com/office/powerpoint/2010/main" val="3917764880"/>
+                <p14:modId xmlns:p14="http://schemas.microsoft.com/office/powerpoint/2010/main" val="2029819973"/>
               </p:ext>
             </p:extLst>
           </p:nvPr>
@@ -6614,7 +6768,7 @@
                             <a:srgbClr val="C00000"/>
                           </a:solidFill>
                         </a:rPr>
-                        <a:t>Item</a:t>
+                        <a:t>Item N:1</a:t>
                       </a:r>
                       <a:endParaRPr lang="ko-KR" altLang="en-US" sz="1100" dirty="0">
                         <a:solidFill>
@@ -6698,7 +6852,7 @@
                             <a:srgbClr val="C00000"/>
                           </a:solidFill>
                         </a:rPr>
-                        <a:t>Member</a:t>
+                        <a:t>Member N:1</a:t>
                       </a:r>
                       <a:endParaRPr lang="ko-KR" altLang="en-US" sz="1100" dirty="0">
                         <a:solidFill>
@@ -6910,7 +7064,7 @@
           <p:nvPr>
             <p:extLst>
               <p:ext uri="{D42A27DB-BD31-4B8C-83A1-F6EECF244321}">
-                <p14:modId xmlns:p14="http://schemas.microsoft.com/office/powerpoint/2010/main" val="3207998088"/>
+                <p14:modId xmlns:p14="http://schemas.microsoft.com/office/powerpoint/2010/main" val="4153020584"/>
               </p:ext>
             </p:extLst>
           </p:nvPr>
@@ -6985,7 +7139,7 @@
                             <a:srgbClr val="C00000"/>
                           </a:solidFill>
                         </a:rPr>
-                        <a:t>Review</a:t>
+                        <a:t>Review N:1</a:t>
                       </a:r>
                       <a:endParaRPr lang="ko-KR" altLang="en-US" sz="1100" dirty="0">
                         <a:solidFill>
@@ -7065,7 +7219,7 @@
           <p:nvPr>
             <p:extLst>
               <p:ext uri="{D42A27DB-BD31-4B8C-83A1-F6EECF244321}">
-                <p14:modId xmlns:p14="http://schemas.microsoft.com/office/powerpoint/2010/main" val="3309427878"/>
+                <p14:modId xmlns:p14="http://schemas.microsoft.com/office/powerpoint/2010/main" val="2626485065"/>
               </p:ext>
             </p:extLst>
           </p:nvPr>
@@ -7140,7 +7294,7 @@
                             <a:srgbClr val="C00000"/>
                           </a:solidFill>
                         </a:rPr>
-                        <a:t>Item</a:t>
+                        <a:t>Item N:1</a:t>
                       </a:r>
                       <a:endParaRPr lang="ko-KR" altLang="en-US" sz="1100" dirty="0"/>
                     </a:p>
@@ -7256,7 +7410,7 @@
           <p:nvPr>
             <p:extLst>
               <p:ext uri="{D42A27DB-BD31-4B8C-83A1-F6EECF244321}">
-                <p14:modId xmlns:p14="http://schemas.microsoft.com/office/powerpoint/2010/main" val="4293549946"/>
+                <p14:modId xmlns:p14="http://schemas.microsoft.com/office/powerpoint/2010/main" val="4056985100"/>
               </p:ext>
             </p:extLst>
           </p:nvPr>
@@ -7331,7 +7485,7 @@
                             <a:srgbClr val="C00000"/>
                           </a:solidFill>
                         </a:rPr>
-                        <a:t>Option1</a:t>
+                        <a:t>Option1 N:1</a:t>
                       </a:r>
                       <a:endParaRPr lang="ko-KR" altLang="en-US" sz="1100" dirty="0">
                         <a:solidFill>
@@ -7443,7 +7597,7 @@
           <p:nvPr>
             <p:extLst>
               <p:ext uri="{D42A27DB-BD31-4B8C-83A1-F6EECF244321}">
-                <p14:modId xmlns:p14="http://schemas.microsoft.com/office/powerpoint/2010/main" val="2948620222"/>
+                <p14:modId xmlns:p14="http://schemas.microsoft.com/office/powerpoint/2010/main" val="1663012355"/>
               </p:ext>
             </p:extLst>
           </p:nvPr>
@@ -7518,7 +7672,7 @@
                             <a:srgbClr val="C00000"/>
                           </a:solidFill>
                         </a:rPr>
-                        <a:t>Item</a:t>
+                        <a:t>Item 1:1</a:t>
                       </a:r>
                       <a:endParaRPr lang="ko-KR" altLang="en-US" sz="1100" dirty="0"/>
                     </a:p>
@@ -7594,7 +7748,7 @@
           <p:nvPr>
             <p:extLst>
               <p:ext uri="{D42A27DB-BD31-4B8C-83A1-F6EECF244321}">
-                <p14:modId xmlns:p14="http://schemas.microsoft.com/office/powerpoint/2010/main" val="3489687705"/>
+                <p14:modId xmlns:p14="http://schemas.microsoft.com/office/powerpoint/2010/main" val="1663919033"/>
               </p:ext>
             </p:extLst>
           </p:nvPr>
@@ -7720,7 +7874,7 @@
                           <a:ea typeface="맑은 고딕" panose="020B0503020000020004" pitchFamily="50" charset="-127"/>
                           <a:cs typeface="+mn-cs"/>
                         </a:rPr>
-                        <a:t>Member</a:t>
+                        <a:t>Member 1:1</a:t>
                       </a:r>
                       <a:endParaRPr kumimoji="0" lang="ko-KR" altLang="en-US" sz="1100" b="0" i="0" u="none" strike="noStrike" kern="1200" cap="none" spc="0" normalizeH="0" baseline="0" noProof="0" dirty="0">
                         <a:ln>
@@ -8080,7 +8234,7 @@
           <p:nvPr>
             <p:extLst>
               <p:ext uri="{D42A27DB-BD31-4B8C-83A1-F6EECF244321}">
-                <p14:modId xmlns:p14="http://schemas.microsoft.com/office/powerpoint/2010/main" val="1169374294"/>
+                <p14:modId xmlns:p14="http://schemas.microsoft.com/office/powerpoint/2010/main" val="2853716737"/>
               </p:ext>
             </p:extLst>
           </p:nvPr>
@@ -8155,7 +8309,7 @@
                             <a:srgbClr val="C00000"/>
                           </a:solidFill>
                         </a:rPr>
-                        <a:t>Item</a:t>
+                        <a:t>Item N:1</a:t>
                       </a:r>
                       <a:endParaRPr lang="ko-KR" altLang="en-US" sz="1100" dirty="0">
                         <a:solidFill>
@@ -8201,7 +8355,7 @@
                             <a:srgbClr val="C00000"/>
                           </a:solidFill>
                         </a:rPr>
-                        <a:t>Category</a:t>
+                        <a:t>Category N:1</a:t>
                       </a:r>
                       <a:endParaRPr lang="ko-KR" altLang="en-US" sz="1100" dirty="0">
                         <a:solidFill>
@@ -8471,7 +8625,7 @@
         </p:nvSpPr>
         <p:spPr>
           <a:xfrm>
-            <a:off x="4118423" y="1212692"/>
+            <a:off x="4083661" y="1116470"/>
             <a:ext cx="1685567" cy="416344"/>
           </a:xfrm>
           <a:prstGeom prst="roundRect">
@@ -8668,7 +8822,7 @@
           <p:nvPr>
             <p:extLst>
               <p:ext uri="{D42A27DB-BD31-4B8C-83A1-F6EECF244321}">
-                <p14:modId xmlns:p14="http://schemas.microsoft.com/office/powerpoint/2010/main" val="1819327499"/>
+                <p14:modId xmlns:p14="http://schemas.microsoft.com/office/powerpoint/2010/main" val="3447943698"/>
               </p:ext>
             </p:extLst>
           </p:nvPr>
@@ -8743,7 +8897,7 @@
                             <a:srgbClr val="C00000"/>
                           </a:solidFill>
                         </a:rPr>
-                        <a:t>Item</a:t>
+                        <a:t>Item N:1</a:t>
                       </a:r>
                       <a:endParaRPr lang="ko-KR" altLang="en-US" sz="1100" dirty="0">
                         <a:solidFill>

</xml_diff>

<commit_message>
add qna answer in admin service
</commit_message>
<xml_diff>
--- a/DB 설계.pptx
+++ b/DB 설계.pptx
@@ -198,7 +198,7 @@
           <a:p>
             <a:fld id="{6C5DBB6D-5226-2A49-ABF7-57F1FB2574B4}" type="datetimeFigureOut">
               <a:rPr kumimoji="1" lang="ko-Kore-KR" altLang="en-US" smtClean="0"/>
-              <a:t>2022. 1. 29.</a:t>
+              <a:t>01/29/2022</a:t>
             </a:fld>
             <a:endParaRPr kumimoji="1" lang="ko-Kore-KR" altLang="en-US"/>
           </a:p>
@@ -781,7 +781,7 @@
           <a:p>
             <a:fld id="{13A5D19F-5D9F-4A76-AB4A-89CB286FCE28}" type="datetimeFigureOut">
               <a:rPr lang="ko-KR" altLang="en-US" smtClean="0"/>
-              <a:t>2022. 1. 29.</a:t>
+              <a:t>2022-01-29</a:t>
             </a:fld>
             <a:endParaRPr lang="ko-KR" altLang="en-US"/>
           </a:p>
@@ -979,7 +979,7 @@
           <a:p>
             <a:fld id="{13A5D19F-5D9F-4A76-AB4A-89CB286FCE28}" type="datetimeFigureOut">
               <a:rPr lang="ko-KR" altLang="en-US" smtClean="0"/>
-              <a:t>2022. 1. 29.</a:t>
+              <a:t>2022-01-29</a:t>
             </a:fld>
             <a:endParaRPr lang="ko-KR" altLang="en-US"/>
           </a:p>
@@ -1187,7 +1187,7 @@
           <a:p>
             <a:fld id="{13A5D19F-5D9F-4A76-AB4A-89CB286FCE28}" type="datetimeFigureOut">
               <a:rPr lang="ko-KR" altLang="en-US" smtClean="0"/>
-              <a:t>2022. 1. 29.</a:t>
+              <a:t>2022-01-29</a:t>
             </a:fld>
             <a:endParaRPr lang="ko-KR" altLang="en-US"/>
           </a:p>
@@ -1385,7 +1385,7 @@
           <a:p>
             <a:fld id="{13A5D19F-5D9F-4A76-AB4A-89CB286FCE28}" type="datetimeFigureOut">
               <a:rPr lang="ko-KR" altLang="en-US" smtClean="0"/>
-              <a:t>2022. 1. 29.</a:t>
+              <a:t>2022-01-29</a:t>
             </a:fld>
             <a:endParaRPr lang="ko-KR" altLang="en-US"/>
           </a:p>
@@ -1660,7 +1660,7 @@
           <a:p>
             <a:fld id="{13A5D19F-5D9F-4A76-AB4A-89CB286FCE28}" type="datetimeFigureOut">
               <a:rPr lang="ko-KR" altLang="en-US" smtClean="0"/>
-              <a:t>2022. 1. 29.</a:t>
+              <a:t>2022-01-29</a:t>
             </a:fld>
             <a:endParaRPr lang="ko-KR" altLang="en-US"/>
           </a:p>
@@ -1925,7 +1925,7 @@
           <a:p>
             <a:fld id="{13A5D19F-5D9F-4A76-AB4A-89CB286FCE28}" type="datetimeFigureOut">
               <a:rPr lang="ko-KR" altLang="en-US" smtClean="0"/>
-              <a:t>2022. 1. 29.</a:t>
+              <a:t>2022-01-29</a:t>
             </a:fld>
             <a:endParaRPr lang="ko-KR" altLang="en-US"/>
           </a:p>
@@ -2337,7 +2337,7 @@
           <a:p>
             <a:fld id="{13A5D19F-5D9F-4A76-AB4A-89CB286FCE28}" type="datetimeFigureOut">
               <a:rPr lang="ko-KR" altLang="en-US" smtClean="0"/>
-              <a:t>2022. 1. 29.</a:t>
+              <a:t>2022-01-29</a:t>
             </a:fld>
             <a:endParaRPr lang="ko-KR" altLang="en-US"/>
           </a:p>
@@ -2478,7 +2478,7 @@
           <a:p>
             <a:fld id="{13A5D19F-5D9F-4A76-AB4A-89CB286FCE28}" type="datetimeFigureOut">
               <a:rPr lang="ko-KR" altLang="en-US" smtClean="0"/>
-              <a:t>2022. 1. 29.</a:t>
+              <a:t>2022-01-29</a:t>
             </a:fld>
             <a:endParaRPr lang="ko-KR" altLang="en-US"/>
           </a:p>
@@ -2591,7 +2591,7 @@
           <a:p>
             <a:fld id="{13A5D19F-5D9F-4A76-AB4A-89CB286FCE28}" type="datetimeFigureOut">
               <a:rPr lang="ko-KR" altLang="en-US" smtClean="0"/>
-              <a:t>2022. 1. 29.</a:t>
+              <a:t>2022-01-29</a:t>
             </a:fld>
             <a:endParaRPr lang="ko-KR" altLang="en-US"/>
           </a:p>
@@ -2902,7 +2902,7 @@
           <a:p>
             <a:fld id="{13A5D19F-5D9F-4A76-AB4A-89CB286FCE28}" type="datetimeFigureOut">
               <a:rPr lang="ko-KR" altLang="en-US" smtClean="0"/>
-              <a:t>2022. 1. 29.</a:t>
+              <a:t>2022-01-29</a:t>
             </a:fld>
             <a:endParaRPr lang="ko-KR" altLang="en-US"/>
           </a:p>
@@ -3190,7 +3190,7 @@
           <a:p>
             <a:fld id="{13A5D19F-5D9F-4A76-AB4A-89CB286FCE28}" type="datetimeFigureOut">
               <a:rPr lang="ko-KR" altLang="en-US" smtClean="0"/>
-              <a:t>2022. 1. 29.</a:t>
+              <a:t>2022-01-29</a:t>
             </a:fld>
             <a:endParaRPr lang="ko-KR" altLang="en-US"/>
           </a:p>
@@ -3431,7 +3431,7 @@
           <a:p>
             <a:fld id="{13A5D19F-5D9F-4A76-AB4A-89CB286FCE28}" type="datetimeFigureOut">
               <a:rPr lang="ko-KR" altLang="en-US" smtClean="0"/>
-              <a:t>2022. 1. 29.</a:t>
+              <a:t>2022-01-29</a:t>
             </a:fld>
             <a:endParaRPr lang="ko-KR" altLang="en-US"/>
           </a:p>
@@ -6471,14 +6471,14 @@
           <p:nvPr>
             <p:extLst>
               <p:ext uri="{D42A27DB-BD31-4B8C-83A1-F6EECF244321}">
-                <p14:modId xmlns:p14="http://schemas.microsoft.com/office/powerpoint/2010/main" val="2417886962"/>
+                <p14:modId xmlns:p14="http://schemas.microsoft.com/office/powerpoint/2010/main" val="1273528572"/>
               </p:ext>
             </p:extLst>
           </p:nvPr>
         </p:nvGraphicFramePr>
         <p:xfrm>
           <a:off x="4103560" y="2965781"/>
-          <a:ext cx="1284824" cy="2499360"/>
+          <a:ext cx="1284824" cy="2758440"/>
         </p:xfrm>
         <a:graphic>
           <a:graphicData uri="http://schemas.openxmlformats.org/drawingml/2006/table">
@@ -6763,8 +6763,8 @@
                         <a:defRPr/>
                       </a:pPr>
                       <a:r>
-                        <a:rPr lang="en-US" altLang="ko-KR" sz="1100" dirty="0" err="1"/>
-                        <a:t>quesion</a:t>
+                        <a:rPr lang="en-US" altLang="ko-KR" sz="1100" dirty="0"/>
+                        <a:t>question</a:t>
                       </a:r>
                       <a:endParaRPr lang="ko-KR" altLang="en-US" sz="1100" dirty="0"/>
                     </a:p>
@@ -6839,7 +6839,45 @@
                         <a:defRPr/>
                       </a:pPr>
                       <a:r>
-                        <a:rPr lang="en-US" altLang="ko-KR" sz="1100"/>
+                        <a:rPr lang="en-US" altLang="ko-KR" sz="1100" dirty="0" err="1"/>
+                        <a:t>answer_date</a:t>
+                      </a:r>
+                      <a:endParaRPr lang="ko-KR" altLang="en-US" sz="1100" dirty="0"/>
+                    </a:p>
+                  </a:txBody>
+                  <a:tcPr anchor="ctr"/>
+                </a:tc>
+                <a:extLst>
+                  <a:ext uri="{0D108BD9-81ED-4DB2-BD59-A6C34878D82A}">
+                    <a16:rowId xmlns:a16="http://schemas.microsoft.com/office/drawing/2014/main" val="264018930"/>
+                  </a:ext>
+                </a:extLst>
+              </a:tr>
+              <a:tr h="239050">
+                <a:tc>
+                  <a:txBody>
+                    <a:bodyPr/>
+                    <a:lstStyle/>
+                    <a:p>
+                      <a:pPr marL="0" marR="0" lvl="0" indent="0" algn="ctr" defTabSz="914400" rtl="0" eaLnBrk="1" fontAlgn="auto" latinLnBrk="1" hangingPunct="1">
+                        <a:lnSpc>
+                          <a:spcPct val="100000"/>
+                        </a:lnSpc>
+                        <a:spcBef>
+                          <a:spcPts val="0"/>
+                        </a:spcBef>
+                        <a:spcAft>
+                          <a:spcPts val="0"/>
+                        </a:spcAft>
+                        <a:buClrTx/>
+                        <a:buSzTx/>
+                        <a:buFontTx/>
+                        <a:buNone/>
+                        <a:tabLst/>
+                        <a:defRPr/>
+                      </a:pPr>
+                      <a:r>
+                        <a:rPr lang="en-US" altLang="ko-KR" sz="1100" dirty="0" err="1"/>
                         <a:t>registry_date</a:t>
                       </a:r>
                       <a:endParaRPr lang="ko-KR" altLang="en-US" sz="1100" dirty="0"/>

</xml_diff>

<commit_message>
add image controller and docker config
</commit_message>
<xml_diff>
--- a/DB 설계.pptx
+++ b/DB 설계.pptx
@@ -198,7 +198,7 @@
           <a:p>
             <a:fld id="{6C5DBB6D-5226-2A49-ABF7-57F1FB2574B4}" type="datetimeFigureOut">
               <a:rPr kumimoji="1" lang="ko-Kore-KR" altLang="en-US" smtClean="0"/>
-              <a:t>01/29/2022</a:t>
+              <a:t>2022. 1. 30.</a:t>
             </a:fld>
             <a:endParaRPr kumimoji="1" lang="ko-Kore-KR" altLang="en-US"/>
           </a:p>
@@ -781,7 +781,7 @@
           <a:p>
             <a:fld id="{13A5D19F-5D9F-4A76-AB4A-89CB286FCE28}" type="datetimeFigureOut">
               <a:rPr lang="ko-KR" altLang="en-US" smtClean="0"/>
-              <a:t>2022-01-29</a:t>
+              <a:t>2022. 1. 30.</a:t>
             </a:fld>
             <a:endParaRPr lang="ko-KR" altLang="en-US"/>
           </a:p>
@@ -979,7 +979,7 @@
           <a:p>
             <a:fld id="{13A5D19F-5D9F-4A76-AB4A-89CB286FCE28}" type="datetimeFigureOut">
               <a:rPr lang="ko-KR" altLang="en-US" smtClean="0"/>
-              <a:t>2022-01-29</a:t>
+              <a:t>2022. 1. 30.</a:t>
             </a:fld>
             <a:endParaRPr lang="ko-KR" altLang="en-US"/>
           </a:p>
@@ -1187,7 +1187,7 @@
           <a:p>
             <a:fld id="{13A5D19F-5D9F-4A76-AB4A-89CB286FCE28}" type="datetimeFigureOut">
               <a:rPr lang="ko-KR" altLang="en-US" smtClean="0"/>
-              <a:t>2022-01-29</a:t>
+              <a:t>2022. 1. 30.</a:t>
             </a:fld>
             <a:endParaRPr lang="ko-KR" altLang="en-US"/>
           </a:p>
@@ -1385,7 +1385,7 @@
           <a:p>
             <a:fld id="{13A5D19F-5D9F-4A76-AB4A-89CB286FCE28}" type="datetimeFigureOut">
               <a:rPr lang="ko-KR" altLang="en-US" smtClean="0"/>
-              <a:t>2022-01-29</a:t>
+              <a:t>2022. 1. 30.</a:t>
             </a:fld>
             <a:endParaRPr lang="ko-KR" altLang="en-US"/>
           </a:p>
@@ -1660,7 +1660,7 @@
           <a:p>
             <a:fld id="{13A5D19F-5D9F-4A76-AB4A-89CB286FCE28}" type="datetimeFigureOut">
               <a:rPr lang="ko-KR" altLang="en-US" smtClean="0"/>
-              <a:t>2022-01-29</a:t>
+              <a:t>2022. 1. 30.</a:t>
             </a:fld>
             <a:endParaRPr lang="ko-KR" altLang="en-US"/>
           </a:p>
@@ -1925,7 +1925,7 @@
           <a:p>
             <a:fld id="{13A5D19F-5D9F-4A76-AB4A-89CB286FCE28}" type="datetimeFigureOut">
               <a:rPr lang="ko-KR" altLang="en-US" smtClean="0"/>
-              <a:t>2022-01-29</a:t>
+              <a:t>2022. 1. 30.</a:t>
             </a:fld>
             <a:endParaRPr lang="ko-KR" altLang="en-US"/>
           </a:p>
@@ -2337,7 +2337,7 @@
           <a:p>
             <a:fld id="{13A5D19F-5D9F-4A76-AB4A-89CB286FCE28}" type="datetimeFigureOut">
               <a:rPr lang="ko-KR" altLang="en-US" smtClean="0"/>
-              <a:t>2022-01-29</a:t>
+              <a:t>2022. 1. 30.</a:t>
             </a:fld>
             <a:endParaRPr lang="ko-KR" altLang="en-US"/>
           </a:p>
@@ -2478,7 +2478,7 @@
           <a:p>
             <a:fld id="{13A5D19F-5D9F-4A76-AB4A-89CB286FCE28}" type="datetimeFigureOut">
               <a:rPr lang="ko-KR" altLang="en-US" smtClean="0"/>
-              <a:t>2022-01-29</a:t>
+              <a:t>2022. 1. 30.</a:t>
             </a:fld>
             <a:endParaRPr lang="ko-KR" altLang="en-US"/>
           </a:p>
@@ -2591,7 +2591,7 @@
           <a:p>
             <a:fld id="{13A5D19F-5D9F-4A76-AB4A-89CB286FCE28}" type="datetimeFigureOut">
               <a:rPr lang="ko-KR" altLang="en-US" smtClean="0"/>
-              <a:t>2022-01-29</a:t>
+              <a:t>2022. 1. 30.</a:t>
             </a:fld>
             <a:endParaRPr lang="ko-KR" altLang="en-US"/>
           </a:p>
@@ -2902,7 +2902,7 @@
           <a:p>
             <a:fld id="{13A5D19F-5D9F-4A76-AB4A-89CB286FCE28}" type="datetimeFigureOut">
               <a:rPr lang="ko-KR" altLang="en-US" smtClean="0"/>
-              <a:t>2022-01-29</a:t>
+              <a:t>2022. 1. 30.</a:t>
             </a:fld>
             <a:endParaRPr lang="ko-KR" altLang="en-US"/>
           </a:p>
@@ -3190,7 +3190,7 @@
           <a:p>
             <a:fld id="{13A5D19F-5D9F-4A76-AB4A-89CB286FCE28}" type="datetimeFigureOut">
               <a:rPr lang="ko-KR" altLang="en-US" smtClean="0"/>
-              <a:t>2022-01-29</a:t>
+              <a:t>2022. 1. 30.</a:t>
             </a:fld>
             <a:endParaRPr lang="ko-KR" altLang="en-US"/>
           </a:p>
@@ -3431,7 +3431,7 @@
           <a:p>
             <a:fld id="{13A5D19F-5D9F-4A76-AB4A-89CB286FCE28}" type="datetimeFigureOut">
               <a:rPr lang="ko-KR" altLang="en-US" smtClean="0"/>
-              <a:t>2022-01-29</a:t>
+              <a:t>2022. 1. 30.</a:t>
             </a:fld>
             <a:endParaRPr lang="ko-KR" altLang="en-US"/>
           </a:p>

</xml_diff>

<commit_message>
fix Qna table ans service
</commit_message>
<xml_diff>
--- a/DB 설계.pptx
+++ b/DB 설계.pptx
@@ -198,7 +198,7 @@
           <a:p>
             <a:fld id="{6C5DBB6D-5226-2A49-ABF7-57F1FB2574B4}" type="datetimeFigureOut">
               <a:rPr kumimoji="1" lang="ko-Kore-KR" altLang="en-US" smtClean="0"/>
-              <a:t>2022. 1. 31.</a:t>
+              <a:t>2022. 2. 2.</a:t>
             </a:fld>
             <a:endParaRPr kumimoji="1" lang="ko-Kore-KR" altLang="en-US"/>
           </a:p>
@@ -781,7 +781,7 @@
           <a:p>
             <a:fld id="{13A5D19F-5D9F-4A76-AB4A-89CB286FCE28}" type="datetimeFigureOut">
               <a:rPr lang="ko-KR" altLang="en-US" smtClean="0"/>
-              <a:t>2022. 1. 31.</a:t>
+              <a:t>2022. 2. 2.</a:t>
             </a:fld>
             <a:endParaRPr lang="ko-KR" altLang="en-US"/>
           </a:p>
@@ -979,7 +979,7 @@
           <a:p>
             <a:fld id="{13A5D19F-5D9F-4A76-AB4A-89CB286FCE28}" type="datetimeFigureOut">
               <a:rPr lang="ko-KR" altLang="en-US" smtClean="0"/>
-              <a:t>2022. 1. 31.</a:t>
+              <a:t>2022. 2. 2.</a:t>
             </a:fld>
             <a:endParaRPr lang="ko-KR" altLang="en-US"/>
           </a:p>
@@ -1187,7 +1187,7 @@
           <a:p>
             <a:fld id="{13A5D19F-5D9F-4A76-AB4A-89CB286FCE28}" type="datetimeFigureOut">
               <a:rPr lang="ko-KR" altLang="en-US" smtClean="0"/>
-              <a:t>2022. 1. 31.</a:t>
+              <a:t>2022. 2. 2.</a:t>
             </a:fld>
             <a:endParaRPr lang="ko-KR" altLang="en-US"/>
           </a:p>
@@ -1385,7 +1385,7 @@
           <a:p>
             <a:fld id="{13A5D19F-5D9F-4A76-AB4A-89CB286FCE28}" type="datetimeFigureOut">
               <a:rPr lang="ko-KR" altLang="en-US" smtClean="0"/>
-              <a:t>2022. 1. 31.</a:t>
+              <a:t>2022. 2. 2.</a:t>
             </a:fld>
             <a:endParaRPr lang="ko-KR" altLang="en-US"/>
           </a:p>
@@ -1660,7 +1660,7 @@
           <a:p>
             <a:fld id="{13A5D19F-5D9F-4A76-AB4A-89CB286FCE28}" type="datetimeFigureOut">
               <a:rPr lang="ko-KR" altLang="en-US" smtClean="0"/>
-              <a:t>2022. 1. 31.</a:t>
+              <a:t>2022. 2. 2.</a:t>
             </a:fld>
             <a:endParaRPr lang="ko-KR" altLang="en-US"/>
           </a:p>
@@ -1925,7 +1925,7 @@
           <a:p>
             <a:fld id="{13A5D19F-5D9F-4A76-AB4A-89CB286FCE28}" type="datetimeFigureOut">
               <a:rPr lang="ko-KR" altLang="en-US" smtClean="0"/>
-              <a:t>2022. 1. 31.</a:t>
+              <a:t>2022. 2. 2.</a:t>
             </a:fld>
             <a:endParaRPr lang="ko-KR" altLang="en-US"/>
           </a:p>
@@ -2337,7 +2337,7 @@
           <a:p>
             <a:fld id="{13A5D19F-5D9F-4A76-AB4A-89CB286FCE28}" type="datetimeFigureOut">
               <a:rPr lang="ko-KR" altLang="en-US" smtClean="0"/>
-              <a:t>2022. 1. 31.</a:t>
+              <a:t>2022. 2. 2.</a:t>
             </a:fld>
             <a:endParaRPr lang="ko-KR" altLang="en-US"/>
           </a:p>
@@ -2478,7 +2478,7 @@
           <a:p>
             <a:fld id="{13A5D19F-5D9F-4A76-AB4A-89CB286FCE28}" type="datetimeFigureOut">
               <a:rPr lang="ko-KR" altLang="en-US" smtClean="0"/>
-              <a:t>2022. 1. 31.</a:t>
+              <a:t>2022. 2. 2.</a:t>
             </a:fld>
             <a:endParaRPr lang="ko-KR" altLang="en-US"/>
           </a:p>
@@ -2591,7 +2591,7 @@
           <a:p>
             <a:fld id="{13A5D19F-5D9F-4A76-AB4A-89CB286FCE28}" type="datetimeFigureOut">
               <a:rPr lang="ko-KR" altLang="en-US" smtClean="0"/>
-              <a:t>2022. 1. 31.</a:t>
+              <a:t>2022. 2. 2.</a:t>
             </a:fld>
             <a:endParaRPr lang="ko-KR" altLang="en-US"/>
           </a:p>
@@ -2902,7 +2902,7 @@
           <a:p>
             <a:fld id="{13A5D19F-5D9F-4A76-AB4A-89CB286FCE28}" type="datetimeFigureOut">
               <a:rPr lang="ko-KR" altLang="en-US" smtClean="0"/>
-              <a:t>2022. 1. 31.</a:t>
+              <a:t>2022. 2. 2.</a:t>
             </a:fld>
             <a:endParaRPr lang="ko-KR" altLang="en-US"/>
           </a:p>
@@ -3190,7 +3190,7 @@
           <a:p>
             <a:fld id="{13A5D19F-5D9F-4A76-AB4A-89CB286FCE28}" type="datetimeFigureOut">
               <a:rPr lang="ko-KR" altLang="en-US" smtClean="0"/>
-              <a:t>2022. 1. 31.</a:t>
+              <a:t>2022. 2. 2.</a:t>
             </a:fld>
             <a:endParaRPr lang="ko-KR" altLang="en-US"/>
           </a:p>
@@ -3431,7 +3431,7 @@
           <a:p>
             <a:fld id="{13A5D19F-5D9F-4A76-AB4A-89CB286FCE28}" type="datetimeFigureOut">
               <a:rPr lang="ko-KR" altLang="en-US" smtClean="0"/>
-              <a:t>2022. 1. 31.</a:t>
+              <a:t>2022. 2. 2.</a:t>
             </a:fld>
             <a:endParaRPr lang="ko-KR" altLang="en-US"/>
           </a:p>
@@ -5258,10 +5258,16 @@
           <p:cNvGraphicFramePr>
             <a:graphicFrameLocks noGrp="1"/>
           </p:cNvGraphicFramePr>
-          <p:nvPr/>
+          <p:nvPr>
+            <p:extLst>
+              <p:ext uri="{D42A27DB-BD31-4B8C-83A1-F6EECF244321}">
+                <p14:modId xmlns:p14="http://schemas.microsoft.com/office/powerpoint/2010/main" val="980920800"/>
+              </p:ext>
+            </p:extLst>
+          </p:nvPr>
         </p:nvGraphicFramePr>
         <p:xfrm>
-          <a:off x="4094323" y="2086138"/>
+          <a:off x="4094323" y="1609059"/>
           <a:ext cx="1294061" cy="777240"/>
         </p:xfrm>
         <a:graphic>
@@ -6471,14 +6477,14 @@
           <p:nvPr>
             <p:extLst>
               <p:ext uri="{D42A27DB-BD31-4B8C-83A1-F6EECF244321}">
-                <p14:modId xmlns:p14="http://schemas.microsoft.com/office/powerpoint/2010/main" val="1273528572"/>
+                <p14:modId xmlns:p14="http://schemas.microsoft.com/office/powerpoint/2010/main" val="217045377"/>
               </p:ext>
             </p:extLst>
           </p:nvPr>
         </p:nvGraphicFramePr>
         <p:xfrm>
-          <a:off x="4103560" y="2965781"/>
-          <a:ext cx="1284824" cy="2758440"/>
+          <a:off x="4094323" y="2542525"/>
+          <a:ext cx="1284824" cy="3017520"/>
         </p:xfrm>
         <a:graphic>
           <a:graphicData uri="http://schemas.openxmlformats.org/drawingml/2006/table">
@@ -6812,6 +6818,44 @@
                 <a:extLst>
                   <a:ext uri="{0D108BD9-81ED-4DB2-BD59-A6C34878D82A}">
                     <a16:rowId xmlns:a16="http://schemas.microsoft.com/office/drawing/2014/main" val="3893380815"/>
+                  </a:ext>
+                </a:extLst>
+              </a:tr>
+              <a:tr h="239050">
+                <a:tc>
+                  <a:txBody>
+                    <a:bodyPr/>
+                    <a:lstStyle/>
+                    <a:p>
+                      <a:pPr marL="0" marR="0" lvl="0" indent="0" algn="ctr" defTabSz="914400" rtl="0" eaLnBrk="1" fontAlgn="auto" latinLnBrk="1" hangingPunct="1">
+                        <a:lnSpc>
+                          <a:spcPct val="100000"/>
+                        </a:lnSpc>
+                        <a:spcBef>
+                          <a:spcPts val="0"/>
+                        </a:spcBef>
+                        <a:spcAft>
+                          <a:spcPts val="0"/>
+                        </a:spcAft>
+                        <a:buClrTx/>
+                        <a:buSzTx/>
+                        <a:buFontTx/>
+                        <a:buNone/>
+                        <a:tabLst/>
+                        <a:defRPr/>
+                      </a:pPr>
+                      <a:r>
+                        <a:rPr lang="en-US" altLang="ko-KR" sz="1100" dirty="0"/>
+                        <a:t>title</a:t>
+                      </a:r>
+                      <a:endParaRPr lang="ko-KR" altLang="en-US" sz="1100" dirty="0"/>
+                    </a:p>
+                  </a:txBody>
+                  <a:tcPr anchor="ctr"/>
+                </a:tc>
+                <a:extLst>
+                  <a:ext uri="{0D108BD9-81ED-4DB2-BD59-A6C34878D82A}">
+                    <a16:rowId xmlns:a16="http://schemas.microsoft.com/office/drawing/2014/main" val="3350295452"/>
                   </a:ext>
                 </a:extLst>
               </a:tr>

</xml_diff>

<commit_message>
db table web comple
</commit_message>
<xml_diff>
--- a/DB 설계.pptx
+++ b/DB 설계.pptx
@@ -9,7 +9,7 @@
   </p:notesMasterIdLst>
   <p:sldIdLst>
     <p:sldId id="257" r:id="rId2"/>
-    <p:sldId id="256" r:id="rId3"/>
+    <p:sldId id="258" r:id="rId3"/>
   </p:sldIdLst>
   <p:sldSz cx="12192000" cy="6858000"/>
   <p:notesSz cx="6858000" cy="9144000"/>
@@ -198,7 +198,7 @@
           <a:p>
             <a:fld id="{6C5DBB6D-5226-2A49-ABF7-57F1FB2574B4}" type="datetimeFigureOut">
               <a:rPr kumimoji="1" lang="ko-Kore-KR" altLang="en-US" smtClean="0"/>
-              <a:t>2022. 2. 2.</a:t>
+              <a:t>2022. 2. 6.</a:t>
             </a:fld>
             <a:endParaRPr kumimoji="1" lang="ko-Kore-KR" altLang="en-US"/>
           </a:p>
@@ -624,7 +624,7 @@
     </p:spTree>
     <p:extLst>
       <p:ext uri="{BB962C8B-B14F-4D97-AF65-F5344CB8AC3E}">
-        <p14:creationId xmlns:p14="http://schemas.microsoft.com/office/powerpoint/2010/main" val="1755640711"/>
+        <p14:creationId xmlns:p14="http://schemas.microsoft.com/office/powerpoint/2010/main" val="2548887723"/>
       </p:ext>
     </p:extLst>
   </p:cSld>
@@ -781,7 +781,7 @@
           <a:p>
             <a:fld id="{13A5D19F-5D9F-4A76-AB4A-89CB286FCE28}" type="datetimeFigureOut">
               <a:rPr lang="ko-KR" altLang="en-US" smtClean="0"/>
-              <a:t>2022. 2. 2.</a:t>
+              <a:t>2022. 2. 6.</a:t>
             </a:fld>
             <a:endParaRPr lang="ko-KR" altLang="en-US"/>
           </a:p>
@@ -979,7 +979,7 @@
           <a:p>
             <a:fld id="{13A5D19F-5D9F-4A76-AB4A-89CB286FCE28}" type="datetimeFigureOut">
               <a:rPr lang="ko-KR" altLang="en-US" smtClean="0"/>
-              <a:t>2022. 2. 2.</a:t>
+              <a:t>2022. 2. 6.</a:t>
             </a:fld>
             <a:endParaRPr lang="ko-KR" altLang="en-US"/>
           </a:p>
@@ -1187,7 +1187,7 @@
           <a:p>
             <a:fld id="{13A5D19F-5D9F-4A76-AB4A-89CB286FCE28}" type="datetimeFigureOut">
               <a:rPr lang="ko-KR" altLang="en-US" smtClean="0"/>
-              <a:t>2022. 2. 2.</a:t>
+              <a:t>2022. 2. 6.</a:t>
             </a:fld>
             <a:endParaRPr lang="ko-KR" altLang="en-US"/>
           </a:p>
@@ -1385,7 +1385,7 @@
           <a:p>
             <a:fld id="{13A5D19F-5D9F-4A76-AB4A-89CB286FCE28}" type="datetimeFigureOut">
               <a:rPr lang="ko-KR" altLang="en-US" smtClean="0"/>
-              <a:t>2022. 2. 2.</a:t>
+              <a:t>2022. 2. 6.</a:t>
             </a:fld>
             <a:endParaRPr lang="ko-KR" altLang="en-US"/>
           </a:p>
@@ -1660,7 +1660,7 @@
           <a:p>
             <a:fld id="{13A5D19F-5D9F-4A76-AB4A-89CB286FCE28}" type="datetimeFigureOut">
               <a:rPr lang="ko-KR" altLang="en-US" smtClean="0"/>
-              <a:t>2022. 2. 2.</a:t>
+              <a:t>2022. 2. 6.</a:t>
             </a:fld>
             <a:endParaRPr lang="ko-KR" altLang="en-US"/>
           </a:p>
@@ -1925,7 +1925,7 @@
           <a:p>
             <a:fld id="{13A5D19F-5D9F-4A76-AB4A-89CB286FCE28}" type="datetimeFigureOut">
               <a:rPr lang="ko-KR" altLang="en-US" smtClean="0"/>
-              <a:t>2022. 2. 2.</a:t>
+              <a:t>2022. 2. 6.</a:t>
             </a:fld>
             <a:endParaRPr lang="ko-KR" altLang="en-US"/>
           </a:p>
@@ -2337,7 +2337,7 @@
           <a:p>
             <a:fld id="{13A5D19F-5D9F-4A76-AB4A-89CB286FCE28}" type="datetimeFigureOut">
               <a:rPr lang="ko-KR" altLang="en-US" smtClean="0"/>
-              <a:t>2022. 2. 2.</a:t>
+              <a:t>2022. 2. 6.</a:t>
             </a:fld>
             <a:endParaRPr lang="ko-KR" altLang="en-US"/>
           </a:p>
@@ -2478,7 +2478,7 @@
           <a:p>
             <a:fld id="{13A5D19F-5D9F-4A76-AB4A-89CB286FCE28}" type="datetimeFigureOut">
               <a:rPr lang="ko-KR" altLang="en-US" smtClean="0"/>
-              <a:t>2022. 2. 2.</a:t>
+              <a:t>2022. 2. 6.</a:t>
             </a:fld>
             <a:endParaRPr lang="ko-KR" altLang="en-US"/>
           </a:p>
@@ -2591,7 +2591,7 @@
           <a:p>
             <a:fld id="{13A5D19F-5D9F-4A76-AB4A-89CB286FCE28}" type="datetimeFigureOut">
               <a:rPr lang="ko-KR" altLang="en-US" smtClean="0"/>
-              <a:t>2022. 2. 2.</a:t>
+              <a:t>2022. 2. 6.</a:t>
             </a:fld>
             <a:endParaRPr lang="ko-KR" altLang="en-US"/>
           </a:p>
@@ -2902,7 +2902,7 @@
           <a:p>
             <a:fld id="{13A5D19F-5D9F-4A76-AB4A-89CB286FCE28}" type="datetimeFigureOut">
               <a:rPr lang="ko-KR" altLang="en-US" smtClean="0"/>
-              <a:t>2022. 2. 2.</a:t>
+              <a:t>2022. 2. 6.</a:t>
             </a:fld>
             <a:endParaRPr lang="ko-KR" altLang="en-US"/>
           </a:p>
@@ -3190,7 +3190,7 @@
           <a:p>
             <a:fld id="{13A5D19F-5D9F-4A76-AB4A-89CB286FCE28}" type="datetimeFigureOut">
               <a:rPr lang="ko-KR" altLang="en-US" smtClean="0"/>
-              <a:t>2022. 2. 2.</a:t>
+              <a:t>2022. 2. 6.</a:t>
             </a:fld>
             <a:endParaRPr lang="ko-KR" altLang="en-US"/>
           </a:p>
@@ -3431,7 +3431,7 @@
           <a:p>
             <a:fld id="{13A5D19F-5D9F-4A76-AB4A-89CB286FCE28}" type="datetimeFigureOut">
               <a:rPr lang="ko-KR" altLang="en-US" smtClean="0"/>
-              <a:t>2022. 2. 2.</a:t>
+              <a:t>2022. 2. 6.</a:t>
             </a:fld>
             <a:endParaRPr lang="ko-KR" altLang="en-US"/>
           </a:p>
@@ -9091,14 +9091,14 @@
           <p:nvPr>
             <p:extLst>
               <p:ext uri="{D42A27DB-BD31-4B8C-83A1-F6EECF244321}">
-                <p14:modId xmlns:p14="http://schemas.microsoft.com/office/powerpoint/2010/main" val="2799764795"/>
+                <p14:modId xmlns:p14="http://schemas.microsoft.com/office/powerpoint/2010/main" val="1178154708"/>
               </p:ext>
             </p:extLst>
           </p:nvPr>
         </p:nvGraphicFramePr>
         <p:xfrm>
-          <a:off x="891279" y="14515"/>
-          <a:ext cx="1685567" cy="3799110"/>
+          <a:off x="1863418" y="152565"/>
+          <a:ext cx="1685567" cy="2849880"/>
         </p:xfrm>
         <a:graphic>
           <a:graphicData uri="http://schemas.openxmlformats.org/drawingml/2006/table">
@@ -9123,10 +9123,10 @@
                     <a:p>
                       <a:pPr algn="ctr" latinLnBrk="1"/>
                       <a:r>
-                        <a:rPr lang="en-US" altLang="ko-KR" sz="800" dirty="0"/>
+                        <a:rPr lang="en-US" altLang="ko-KR" sz="1100" dirty="0"/>
                         <a:t>Member</a:t>
                       </a:r>
-                      <a:endParaRPr lang="ko-KR" altLang="en-US" sz="800" dirty="0"/>
+                      <a:endParaRPr lang="ko-KR" altLang="en-US" sz="1100" dirty="0"/>
                     </a:p>
                   </a:txBody>
                   <a:tcPr anchor="ctr"/>
@@ -9145,230 +9145,16 @@
                     <a:p>
                       <a:pPr algn="ctr" latinLnBrk="1"/>
                       <a:r>
-                        <a:rPr lang="en-US" altLang="ko-KR" sz="800" dirty="0"/>
-                        <a:t>email</a:t>
-                      </a:r>
-                      <a:endParaRPr lang="ko-KR" altLang="en-US" sz="800" dirty="0"/>
-                    </a:p>
-                  </a:txBody>
-                  <a:tcPr anchor="ctr"/>
-                </a:tc>
-                <a:extLst>
-                  <a:ext uri="{0D108BD9-81ED-4DB2-BD59-A6C34878D82A}">
-                    <a16:rowId xmlns:a16="http://schemas.microsoft.com/office/drawing/2014/main" val="3610887053"/>
-                  </a:ext>
-                </a:extLst>
-              </a:tr>
-              <a:tr h="239050">
-                <a:tc>
-                  <a:txBody>
-                    <a:bodyPr/>
-                    <a:lstStyle/>
-                    <a:p>
-                      <a:pPr algn="ctr" latinLnBrk="1"/>
-                      <a:r>
-                        <a:rPr lang="en-US" altLang="ko-KR" sz="800" dirty="0"/>
-                        <a:t>password</a:t>
-                      </a:r>
-                      <a:endParaRPr lang="ko-KR" altLang="en-US" sz="800" dirty="0"/>
-                    </a:p>
-                  </a:txBody>
-                  <a:tcPr anchor="ctr"/>
-                </a:tc>
-                <a:extLst>
-                  <a:ext uri="{0D108BD9-81ED-4DB2-BD59-A6C34878D82A}">
-                    <a16:rowId xmlns:a16="http://schemas.microsoft.com/office/drawing/2014/main" val="1431156138"/>
-                  </a:ext>
-                </a:extLst>
-              </a:tr>
-              <a:tr h="239050">
-                <a:tc>
-                  <a:txBody>
-                    <a:bodyPr/>
-                    <a:lstStyle/>
-                    <a:p>
-                      <a:pPr algn="ctr" latinLnBrk="1"/>
-                      <a:r>
-                        <a:rPr lang="en-US" altLang="ko-KR" sz="800" dirty="0"/>
-                        <a:t>name</a:t>
-                      </a:r>
-                      <a:endParaRPr lang="ko-KR" altLang="en-US" sz="800" dirty="0"/>
-                    </a:p>
-                  </a:txBody>
-                  <a:tcPr anchor="ctr"/>
-                </a:tc>
-                <a:extLst>
-                  <a:ext uri="{0D108BD9-81ED-4DB2-BD59-A6C34878D82A}">
-                    <a16:rowId xmlns:a16="http://schemas.microsoft.com/office/drawing/2014/main" val="3029070334"/>
-                  </a:ext>
-                </a:extLst>
-              </a:tr>
-              <a:tr h="239050">
-                <a:tc>
-                  <a:txBody>
-                    <a:bodyPr/>
-                    <a:lstStyle/>
-                    <a:p>
-                      <a:pPr algn="ctr" latinLnBrk="1"/>
-                      <a:r>
-                        <a:rPr lang="en-US" altLang="ko-KR" sz="800" dirty="0"/>
-                        <a:t>phone</a:t>
-                      </a:r>
-                      <a:endParaRPr lang="ko-KR" altLang="en-US" sz="800" dirty="0"/>
-                    </a:p>
-                  </a:txBody>
-                  <a:tcPr anchor="ctr"/>
-                </a:tc>
-                <a:extLst>
-                  <a:ext uri="{0D108BD9-81ED-4DB2-BD59-A6C34878D82A}">
-                    <a16:rowId xmlns:a16="http://schemas.microsoft.com/office/drawing/2014/main" val="1772206542"/>
-                  </a:ext>
-                </a:extLst>
-              </a:tr>
-              <a:tr h="239050">
-                <a:tc>
-                  <a:txBody>
-                    <a:bodyPr/>
-                    <a:lstStyle/>
-                    <a:p>
-                      <a:pPr algn="ctr" latinLnBrk="1"/>
-                      <a:r>
-                        <a:rPr lang="en-US" altLang="ko-KR" sz="800" dirty="0"/>
-                        <a:t>birth</a:t>
-                      </a:r>
-                      <a:endParaRPr lang="ko-KR" altLang="en-US" sz="800" dirty="0"/>
-                    </a:p>
-                  </a:txBody>
-                  <a:tcPr anchor="ctr"/>
-                </a:tc>
-                <a:extLst>
-                  <a:ext uri="{0D108BD9-81ED-4DB2-BD59-A6C34878D82A}">
-                    <a16:rowId xmlns:a16="http://schemas.microsoft.com/office/drawing/2014/main" val="1061514626"/>
-                  </a:ext>
-                </a:extLst>
-              </a:tr>
-              <a:tr h="239050">
-                <a:tc>
-                  <a:txBody>
-                    <a:bodyPr/>
-                    <a:lstStyle/>
-                    <a:p>
-                      <a:pPr algn="ctr" latinLnBrk="1"/>
-                      <a:r>
-                        <a:rPr lang="en-US" altLang="ko-KR" sz="800" dirty="0" err="1"/>
-                        <a:t>member_role</a:t>
-                      </a:r>
-                      <a:endParaRPr lang="ko-KR" altLang="en-US" sz="800" dirty="0"/>
-                    </a:p>
-                  </a:txBody>
-                  <a:tcPr anchor="ctr"/>
-                </a:tc>
-                <a:extLst>
-                  <a:ext uri="{0D108BD9-81ED-4DB2-BD59-A6C34878D82A}">
-                    <a16:rowId xmlns:a16="http://schemas.microsoft.com/office/drawing/2014/main" val="2543635310"/>
-                  </a:ext>
-                </a:extLst>
-              </a:tr>
-              <a:tr h="239050">
-                <a:tc>
-                  <a:txBody>
-                    <a:bodyPr/>
-                    <a:lstStyle/>
-                    <a:p>
-                      <a:pPr algn="ctr" latinLnBrk="1"/>
-                      <a:r>
-                        <a:rPr lang="en-US" altLang="ko-KR" sz="800" dirty="0"/>
-                        <a:t>address</a:t>
-                      </a:r>
-                      <a:endParaRPr lang="ko-KR" altLang="en-US" sz="800" dirty="0"/>
-                    </a:p>
-                  </a:txBody>
-                  <a:tcPr anchor="ctr"/>
-                </a:tc>
-                <a:extLst>
-                  <a:ext uri="{0D108BD9-81ED-4DB2-BD59-A6C34878D82A}">
-                    <a16:rowId xmlns:a16="http://schemas.microsoft.com/office/drawing/2014/main" val="877702539"/>
-                  </a:ext>
-                </a:extLst>
-              </a:tr>
-              <a:tr h="239050">
-                <a:tc>
-                  <a:txBody>
-                    <a:bodyPr/>
-                    <a:lstStyle/>
-                    <a:p>
-                      <a:pPr algn="ctr" latinLnBrk="1"/>
-                      <a:r>
-                        <a:rPr lang="en-US" altLang="ko-KR" sz="800" dirty="0"/>
-                        <a:t>point</a:t>
-                      </a:r>
-                      <a:endParaRPr lang="ko-KR" altLang="en-US" sz="800" dirty="0"/>
-                    </a:p>
-                  </a:txBody>
-                  <a:tcPr anchor="ctr"/>
-                </a:tc>
-                <a:extLst>
-                  <a:ext uri="{0D108BD9-81ED-4DB2-BD59-A6C34878D82A}">
-                    <a16:rowId xmlns:a16="http://schemas.microsoft.com/office/drawing/2014/main" val="3562315353"/>
-                  </a:ext>
-                </a:extLst>
-              </a:tr>
-              <a:tr h="239050">
-                <a:tc>
-                  <a:txBody>
-                    <a:bodyPr/>
-                    <a:lstStyle/>
-                    <a:p>
-                      <a:pPr algn="ctr" latinLnBrk="1"/>
-                      <a:r>
-                        <a:rPr lang="en-US" altLang="ko-KR" sz="800" dirty="0"/>
-                        <a:t>chance</a:t>
-                      </a:r>
-                      <a:endParaRPr lang="ko-KR" altLang="en-US" sz="800" dirty="0"/>
-                    </a:p>
-                  </a:txBody>
-                  <a:tcPr anchor="ctr"/>
-                </a:tc>
-                <a:extLst>
-                  <a:ext uri="{0D108BD9-81ED-4DB2-BD59-A6C34878D82A}">
-                    <a16:rowId xmlns:a16="http://schemas.microsoft.com/office/drawing/2014/main" val="3616753289"/>
-                  </a:ext>
-                </a:extLst>
-              </a:tr>
-              <a:tr h="239050">
-                <a:tc>
-                  <a:txBody>
-                    <a:bodyPr/>
-                    <a:lstStyle/>
-                    <a:p>
-                      <a:pPr algn="ctr" latinLnBrk="1"/>
-                      <a:r>
-                        <a:rPr lang="en-US" altLang="ko-KR" sz="800" dirty="0">
-                          <a:solidFill>
-                            <a:srgbClr val="0070C0"/>
-                          </a:solidFill>
-                        </a:rPr>
-                        <a:t>List&lt;</a:t>
-                      </a:r>
-                      <a:r>
-                        <a:rPr lang="en-US" altLang="ko-KR" sz="800" dirty="0" err="1">
-                          <a:solidFill>
-                            <a:srgbClr val="0070C0"/>
-                          </a:solidFill>
-                        </a:rPr>
-                        <a:t>Cart_item</a:t>
-                      </a:r>
-                      <a:r>
-                        <a:rPr lang="en-US" altLang="ko-KR" sz="800" dirty="0">
-                          <a:solidFill>
-                            <a:srgbClr val="0070C0"/>
-                          </a:solidFill>
-                        </a:rPr>
-                        <a:t>&gt;</a:t>
-                      </a:r>
-                      <a:endParaRPr lang="ko-KR" altLang="en-US" sz="800" dirty="0">
+                        <a:rPr lang="en-US" altLang="ko-KR" sz="1100" dirty="0">
+                          <a:solidFill>
+                            <a:schemeClr val="tx1"/>
+                          </a:solidFill>
+                        </a:rPr>
+                        <a:t>MEMBER_ID</a:t>
+                      </a:r>
+                      <a:endParaRPr lang="ko-KR" altLang="en-US" sz="1100" dirty="0">
                         <a:solidFill>
-                          <a:srgbClr val="0070C0"/>
+                          <a:schemeClr val="tx1"/>
                         </a:solidFill>
                       </a:endParaRPr>
                     </a:p>
@@ -9377,28 +9163,28 @@
                 </a:tc>
                 <a:extLst>
                   <a:ext uri="{0D108BD9-81ED-4DB2-BD59-A6C34878D82A}">
-                    <a16:rowId xmlns:a16="http://schemas.microsoft.com/office/drawing/2014/main" val="2856554535"/>
-                  </a:ext>
-                </a:extLst>
-              </a:tr>
-              <a:tr h="239050">
-                <a:tc>
-                  <a:txBody>
-                    <a:bodyPr/>
-                    <a:lstStyle/>
-                    <a:p>
-                      <a:pPr algn="ctr" latinLnBrk="1"/>
-                      <a:r>
-                        <a:rPr lang="en-US" altLang="ko-KR" sz="800" dirty="0">
-                          <a:solidFill>
-                            <a:srgbClr val="0070C0"/>
-                          </a:solidFill>
-                        </a:rPr>
-                        <a:t>List&lt;Order&gt;</a:t>
-                      </a:r>
-                      <a:endParaRPr lang="ko-KR" altLang="en-US" sz="800" dirty="0">
+                    <a16:rowId xmlns:a16="http://schemas.microsoft.com/office/drawing/2014/main" val="3610887053"/>
+                  </a:ext>
+                </a:extLst>
+              </a:tr>
+              <a:tr h="239050">
+                <a:tc>
+                  <a:txBody>
+                    <a:bodyPr/>
+                    <a:lstStyle/>
+                    <a:p>
+                      <a:pPr algn="ctr" latinLnBrk="1"/>
+                      <a:r>
+                        <a:rPr lang="en-US" altLang="ko-KR" sz="1100" dirty="0">
+                          <a:solidFill>
+                            <a:schemeClr val="tx1"/>
+                          </a:solidFill>
+                        </a:rPr>
+                        <a:t>ADDRESS</a:t>
+                      </a:r>
+                      <a:endParaRPr lang="ko-KR" altLang="en-US" sz="1100" dirty="0">
                         <a:solidFill>
-                          <a:srgbClr val="0070C0"/>
+                          <a:schemeClr val="tx1"/>
                         </a:solidFill>
                       </a:endParaRPr>
                     </a:p>
@@ -9407,44 +9193,28 @@
                 </a:tc>
                 <a:extLst>
                   <a:ext uri="{0D108BD9-81ED-4DB2-BD59-A6C34878D82A}">
-                    <a16:rowId xmlns:a16="http://schemas.microsoft.com/office/drawing/2014/main" val="1480278148"/>
-                  </a:ext>
-                </a:extLst>
-              </a:tr>
-              <a:tr h="239050">
-                <a:tc>
-                  <a:txBody>
-                    <a:bodyPr/>
-                    <a:lstStyle/>
-                    <a:p>
-                      <a:pPr algn="ctr" latinLnBrk="1"/>
-                      <a:r>
-                        <a:rPr lang="en-US" altLang="ko-KR" sz="800" dirty="0">
-                          <a:solidFill>
-                            <a:srgbClr val="0070C0"/>
-                          </a:solidFill>
-                        </a:rPr>
-                        <a:t>List&lt;</a:t>
-                      </a:r>
-                      <a:r>
-                        <a:rPr lang="en-US" altLang="ko-KR" sz="800" dirty="0" err="1">
-                          <a:solidFill>
-                            <a:srgbClr val="0070C0"/>
-                          </a:solidFill>
-                        </a:rPr>
-                        <a:t>preference_item</a:t>
-                      </a:r>
-                      <a:r>
-                        <a:rPr lang="en-US" altLang="ko-KR" sz="800" dirty="0">
-                          <a:solidFill>
-                            <a:srgbClr val="0070C0"/>
-                          </a:solidFill>
-                        </a:rPr>
-                        <a:t>&gt;</a:t>
-                      </a:r>
-                      <a:endParaRPr lang="ko-KR" altLang="en-US" sz="800" dirty="0">
+                    <a16:rowId xmlns:a16="http://schemas.microsoft.com/office/drawing/2014/main" val="1431156138"/>
+                  </a:ext>
+                </a:extLst>
+              </a:tr>
+              <a:tr h="239050">
+                <a:tc>
+                  <a:txBody>
+                    <a:bodyPr/>
+                    <a:lstStyle/>
+                    <a:p>
+                      <a:pPr algn="ctr" latinLnBrk="1"/>
+                      <a:r>
+                        <a:rPr lang="en-US" altLang="ko-KR" sz="1100" dirty="0">
+                          <a:solidFill>
+                            <a:schemeClr val="tx1"/>
+                          </a:solidFill>
+                        </a:rPr>
+                        <a:t>BIRTH</a:t>
+                      </a:r>
+                      <a:endParaRPr lang="ko-KR" altLang="en-US" sz="1100" dirty="0">
                         <a:solidFill>
-                          <a:srgbClr val="0070C0"/>
+                          <a:schemeClr val="tx1"/>
                         </a:solidFill>
                       </a:endParaRPr>
                     </a:p>
@@ -9453,28 +9223,28 @@
                 </a:tc>
                 <a:extLst>
                   <a:ext uri="{0D108BD9-81ED-4DB2-BD59-A6C34878D82A}">
-                    <a16:rowId xmlns:a16="http://schemas.microsoft.com/office/drawing/2014/main" val="989763767"/>
-                  </a:ext>
-                </a:extLst>
-              </a:tr>
-              <a:tr h="239050">
-                <a:tc>
-                  <a:txBody>
-                    <a:bodyPr/>
-                    <a:lstStyle/>
-                    <a:p>
-                      <a:pPr algn="ctr" latinLnBrk="1"/>
-                      <a:r>
-                        <a:rPr lang="en-US" altLang="ko-KR" sz="800" dirty="0">
-                          <a:solidFill>
-                            <a:srgbClr val="0070C0"/>
-                          </a:solidFill>
-                        </a:rPr>
-                        <a:t>List&lt;Coupon&gt;</a:t>
-                      </a:r>
-                      <a:endParaRPr lang="ko-KR" altLang="en-US" sz="800" dirty="0">
+                    <a16:rowId xmlns:a16="http://schemas.microsoft.com/office/drawing/2014/main" val="3029070334"/>
+                  </a:ext>
+                </a:extLst>
+              </a:tr>
+              <a:tr h="239050">
+                <a:tc>
+                  <a:txBody>
+                    <a:bodyPr/>
+                    <a:lstStyle/>
+                    <a:p>
+                      <a:pPr algn="ctr" latinLnBrk="1"/>
+                      <a:r>
+                        <a:rPr lang="en-US" altLang="ko-KR" sz="1100" dirty="0">
+                          <a:solidFill>
+                            <a:schemeClr val="tx1"/>
+                          </a:solidFill>
+                        </a:rPr>
+                        <a:t>CHANCE</a:t>
+                      </a:r>
+                      <a:endParaRPr lang="ko-KR" altLang="en-US" sz="1100" dirty="0">
                         <a:solidFill>
-                          <a:srgbClr val="0070C0"/>
+                          <a:schemeClr val="tx1"/>
                         </a:solidFill>
                       </a:endParaRPr>
                     </a:p>
@@ -9483,44 +9253,28 @@
                 </a:tc>
                 <a:extLst>
                   <a:ext uri="{0D108BD9-81ED-4DB2-BD59-A6C34878D82A}">
-                    <a16:rowId xmlns:a16="http://schemas.microsoft.com/office/drawing/2014/main" val="1615974711"/>
-                  </a:ext>
-                </a:extLst>
-              </a:tr>
-              <a:tr h="239050">
-                <a:tc>
-                  <a:txBody>
-                    <a:bodyPr/>
-                    <a:lstStyle/>
-                    <a:p>
-                      <a:pPr algn="ctr" latinLnBrk="1"/>
-                      <a:r>
-                        <a:rPr lang="en-US" altLang="ko-KR" sz="800" dirty="0">
-                          <a:solidFill>
-                            <a:srgbClr val="0070C0"/>
-                          </a:solidFill>
-                        </a:rPr>
-                        <a:t>List&lt;</a:t>
-                      </a:r>
-                      <a:r>
-                        <a:rPr lang="en-US" altLang="ko-KR" sz="800" dirty="0" err="1">
-                          <a:solidFill>
-                            <a:srgbClr val="0070C0"/>
-                          </a:solidFill>
-                        </a:rPr>
-                        <a:t>QnA</a:t>
-                      </a:r>
-                      <a:r>
-                        <a:rPr lang="en-US" altLang="ko-KR" sz="800" dirty="0">
-                          <a:solidFill>
-                            <a:srgbClr val="0070C0"/>
-                          </a:solidFill>
-                        </a:rPr>
-                        <a:t>&gt;</a:t>
-                      </a:r>
-                      <a:endParaRPr lang="ko-KR" altLang="en-US" sz="800" dirty="0">
+                    <a16:rowId xmlns:a16="http://schemas.microsoft.com/office/drawing/2014/main" val="1772206542"/>
+                  </a:ext>
+                </a:extLst>
+              </a:tr>
+              <a:tr h="239050">
+                <a:tc>
+                  <a:txBody>
+                    <a:bodyPr/>
+                    <a:lstStyle/>
+                    <a:p>
+                      <a:pPr algn="ctr" latinLnBrk="1"/>
+                      <a:r>
+                        <a:rPr lang="en-US" altLang="ko-KR" sz="1100" dirty="0">
+                          <a:solidFill>
+                            <a:schemeClr val="tx1"/>
+                          </a:solidFill>
+                        </a:rPr>
+                        <a:t>EMAIL</a:t>
+                      </a:r>
+                      <a:endParaRPr lang="ko-KR" altLang="en-US" sz="1100" dirty="0">
                         <a:solidFill>
-                          <a:srgbClr val="0070C0"/>
+                          <a:schemeClr val="tx1"/>
                         </a:solidFill>
                       </a:endParaRPr>
                     </a:p>
@@ -9529,28 +9283,28 @@
                 </a:tc>
                 <a:extLst>
                   <a:ext uri="{0D108BD9-81ED-4DB2-BD59-A6C34878D82A}">
-                    <a16:rowId xmlns:a16="http://schemas.microsoft.com/office/drawing/2014/main" val="2740698016"/>
-                  </a:ext>
-                </a:extLst>
-              </a:tr>
-              <a:tr h="239050">
-                <a:tc>
-                  <a:txBody>
-                    <a:bodyPr/>
-                    <a:lstStyle/>
-                    <a:p>
-                      <a:pPr algn="ctr" latinLnBrk="1"/>
-                      <a:r>
-                        <a:rPr lang="en-US" altLang="ko-KR" sz="800" dirty="0">
-                          <a:solidFill>
-                            <a:srgbClr val="0070C0"/>
-                          </a:solidFill>
-                        </a:rPr>
-                        <a:t>List&lt;Review&gt;</a:t>
-                      </a:r>
-                      <a:endParaRPr lang="ko-KR" altLang="en-US" sz="800" dirty="0">
+                    <a16:rowId xmlns:a16="http://schemas.microsoft.com/office/drawing/2014/main" val="1061514626"/>
+                  </a:ext>
+                </a:extLst>
+              </a:tr>
+              <a:tr h="239050">
+                <a:tc>
+                  <a:txBody>
+                    <a:bodyPr/>
+                    <a:lstStyle/>
+                    <a:p>
+                      <a:pPr algn="ctr" latinLnBrk="1"/>
+                      <a:r>
+                        <a:rPr lang="en-US" altLang="ko-KR" sz="1100" dirty="0">
+                          <a:solidFill>
+                            <a:schemeClr val="tx1"/>
+                          </a:solidFill>
+                        </a:rPr>
+                        <a:t>MEMBER_ROLE</a:t>
+                      </a:r>
+                      <a:endParaRPr lang="ko-KR" altLang="en-US" sz="1100" dirty="0">
                         <a:solidFill>
-                          <a:srgbClr val="0070C0"/>
+                          <a:schemeClr val="tx1"/>
                         </a:solidFill>
                       </a:endParaRPr>
                     </a:p>
@@ -9559,7 +9313,127 @@
                 </a:tc>
                 <a:extLst>
                   <a:ext uri="{0D108BD9-81ED-4DB2-BD59-A6C34878D82A}">
-                    <a16:rowId xmlns:a16="http://schemas.microsoft.com/office/drawing/2014/main" val="414508946"/>
+                    <a16:rowId xmlns:a16="http://schemas.microsoft.com/office/drawing/2014/main" val="2543635310"/>
+                  </a:ext>
+                </a:extLst>
+              </a:tr>
+              <a:tr h="239050">
+                <a:tc>
+                  <a:txBody>
+                    <a:bodyPr/>
+                    <a:lstStyle/>
+                    <a:p>
+                      <a:pPr algn="ctr" latinLnBrk="1"/>
+                      <a:r>
+                        <a:rPr lang="en-US" altLang="ko-KR" sz="1100" dirty="0">
+                          <a:solidFill>
+                            <a:schemeClr val="tx1"/>
+                          </a:solidFill>
+                        </a:rPr>
+                        <a:t>NAME</a:t>
+                      </a:r>
+                      <a:endParaRPr lang="ko-KR" altLang="en-US" sz="1100" dirty="0">
+                        <a:solidFill>
+                          <a:schemeClr val="tx1"/>
+                        </a:solidFill>
+                      </a:endParaRPr>
+                    </a:p>
+                  </a:txBody>
+                  <a:tcPr anchor="ctr"/>
+                </a:tc>
+                <a:extLst>
+                  <a:ext uri="{0D108BD9-81ED-4DB2-BD59-A6C34878D82A}">
+                    <a16:rowId xmlns:a16="http://schemas.microsoft.com/office/drawing/2014/main" val="877702539"/>
+                  </a:ext>
+                </a:extLst>
+              </a:tr>
+              <a:tr h="239050">
+                <a:tc>
+                  <a:txBody>
+                    <a:bodyPr/>
+                    <a:lstStyle/>
+                    <a:p>
+                      <a:pPr algn="ctr" latinLnBrk="1"/>
+                      <a:r>
+                        <a:rPr lang="en-US" altLang="ko-KR" sz="1100" dirty="0">
+                          <a:solidFill>
+                            <a:schemeClr val="tx1"/>
+                          </a:solidFill>
+                        </a:rPr>
+                        <a:t>PASSWORD</a:t>
+                      </a:r>
+                      <a:endParaRPr lang="ko-KR" altLang="en-US" sz="1100" dirty="0">
+                        <a:solidFill>
+                          <a:schemeClr val="tx1"/>
+                        </a:solidFill>
+                      </a:endParaRPr>
+                    </a:p>
+                  </a:txBody>
+                  <a:tcPr anchor="ctr"/>
+                </a:tc>
+                <a:extLst>
+                  <a:ext uri="{0D108BD9-81ED-4DB2-BD59-A6C34878D82A}">
+                    <a16:rowId xmlns:a16="http://schemas.microsoft.com/office/drawing/2014/main" val="3562315353"/>
+                  </a:ext>
+                </a:extLst>
+              </a:tr>
+              <a:tr h="239050">
+                <a:tc>
+                  <a:txBody>
+                    <a:bodyPr/>
+                    <a:lstStyle/>
+                    <a:p>
+                      <a:pPr algn="ctr" latinLnBrk="1"/>
+                      <a:r>
+                        <a:rPr lang="en-US" altLang="ko-KR" sz="1100" dirty="0">
+                          <a:solidFill>
+                            <a:schemeClr val="tx1"/>
+                          </a:solidFill>
+                        </a:rPr>
+                        <a:t>PHONE</a:t>
+                      </a:r>
+                      <a:endParaRPr lang="ko-KR" altLang="en-US" sz="1100" dirty="0">
+                        <a:solidFill>
+                          <a:schemeClr val="tx1"/>
+                        </a:solidFill>
+                      </a:endParaRPr>
+                    </a:p>
+                  </a:txBody>
+                  <a:tcPr anchor="ctr"/>
+                </a:tc>
+                <a:extLst>
+                  <a:ext uri="{0D108BD9-81ED-4DB2-BD59-A6C34878D82A}">
+                    <a16:rowId xmlns:a16="http://schemas.microsoft.com/office/drawing/2014/main" val="3616753289"/>
+                  </a:ext>
+                </a:extLst>
+              </a:tr>
+              <a:tr h="239050">
+                <a:tc>
+                  <a:txBody>
+                    <a:bodyPr/>
+                    <a:lstStyle/>
+                    <a:p>
+                      <a:pPr algn="ctr" latinLnBrk="1"/>
+                      <a:r>
+                        <a:rPr lang="en-US" altLang="ko-KR" sz="1100" dirty="0">
+                          <a:solidFill>
+                            <a:schemeClr val="tx1"/>
+                          </a:solidFill>
+                        </a:rPr>
+                        <a:t>POINT</a:t>
+                      </a:r>
+                      <a:endParaRPr lang="ko-KR" altLang="en-US" sz="1100" dirty="0">
+                        <a:solidFill>
+                          <a:schemeClr val="tx1"/>
+                        </a:solidFill>
+                      </a:endParaRPr>
+                    </a:p>
+                  </a:txBody>
+                  <a:tcPr anchor="ctr"/>
+                </a:tc>
+                <a:extLst>
+                  <a:ext uri="{0D108BD9-81ED-4DB2-BD59-A6C34878D82A}">
+                    <a16:rowId xmlns:a16="http://schemas.microsoft.com/office/drawing/2014/main" val="2856554535"/>
                   </a:ext>
                 </a:extLst>
               </a:tr>
@@ -9582,14 +9456,14 @@
           <p:nvPr>
             <p:extLst>
               <p:ext uri="{D42A27DB-BD31-4B8C-83A1-F6EECF244321}">
-                <p14:modId xmlns:p14="http://schemas.microsoft.com/office/powerpoint/2010/main" val="3259892194"/>
+                <p14:modId xmlns:p14="http://schemas.microsoft.com/office/powerpoint/2010/main" val="2359698567"/>
               </p:ext>
             </p:extLst>
           </p:nvPr>
         </p:nvGraphicFramePr>
         <p:xfrm>
-          <a:off x="1255723" y="3833262"/>
-          <a:ext cx="1335506" cy="2849880"/>
+          <a:off x="1528298" y="3858303"/>
+          <a:ext cx="1491894" cy="2849880"/>
         </p:xfrm>
         <a:graphic>
           <a:graphicData uri="http://schemas.openxmlformats.org/drawingml/2006/table">
@@ -9598,7 +9472,7 @@
                 <a:tableStyleId>{5C22544A-7EE6-4342-B048-85BDC9FD1C3A}</a:tableStyleId>
               </a:tblPr>
               <a:tblGrid>
-                <a:gridCol w="1335506">
+                <a:gridCol w="1491894">
                   <a:extLst>
                     <a:ext uri="{9D8B030D-6E8A-4147-A177-3AD203B41FA5}">
                       <a16:colId xmlns:a16="http://schemas.microsoft.com/office/drawing/2014/main" val="329139778"/>
@@ -9638,14 +9512,14 @@
                       <a:r>
                         <a:rPr lang="en-US" altLang="ko-KR" sz="1100" dirty="0">
                           <a:solidFill>
-                            <a:srgbClr val="C00000"/>
-                          </a:solidFill>
-                        </a:rPr>
-                        <a:t>Deliver 1:1</a:t>
+                            <a:schemeClr val="tx1"/>
+                          </a:solidFill>
+                        </a:rPr>
+                        <a:t>ORDER_ID</a:t>
                       </a:r>
                       <a:endParaRPr lang="ko-KR" altLang="en-US" sz="1100" dirty="0">
                         <a:solidFill>
-                          <a:srgbClr val="C00000"/>
+                          <a:schemeClr val="tx1"/>
                         </a:solidFill>
                       </a:endParaRPr>
                     </a:p>
@@ -9668,14 +9542,14 @@
                       <a:r>
                         <a:rPr lang="en-US" altLang="ko-KR" sz="1100" dirty="0">
                           <a:solidFill>
-                            <a:srgbClr val="C00000"/>
-                          </a:solidFill>
-                        </a:rPr>
-                        <a:t>Member N:1</a:t>
+                            <a:schemeClr val="tx1"/>
+                          </a:solidFill>
+                        </a:rPr>
+                        <a:t>ORDER_DATE</a:t>
                       </a:r>
                       <a:endParaRPr lang="ko-KR" altLang="en-US" sz="1100" dirty="0">
                         <a:solidFill>
-                          <a:srgbClr val="C00000"/>
+                          <a:schemeClr val="tx1"/>
                         </a:solidFill>
                       </a:endParaRPr>
                     </a:p>
@@ -9696,60 +9570,16 @@
                     <a:p>
                       <a:pPr algn="ctr" latinLnBrk="1"/>
                       <a:r>
-                        <a:rPr lang="en-US" altLang="ko-KR" sz="1100" dirty="0" err="1"/>
-                        <a:t>order_date</a:t>
-                      </a:r>
-                      <a:endParaRPr lang="ko-KR" altLang="en-US" sz="1100" dirty="0"/>
-                    </a:p>
-                  </a:txBody>
-                  <a:tcPr anchor="ctr"/>
-                </a:tc>
-                <a:extLst>
-                  <a:ext uri="{0D108BD9-81ED-4DB2-BD59-A6C34878D82A}">
-                    <a16:rowId xmlns:a16="http://schemas.microsoft.com/office/drawing/2014/main" val="334312098"/>
-                  </a:ext>
-                </a:extLst>
-              </a:tr>
-              <a:tr h="239050">
-                <a:tc>
-                  <a:txBody>
-                    <a:bodyPr/>
-                    <a:lstStyle/>
-                    <a:p>
-                      <a:pPr algn="ctr" latinLnBrk="1"/>
-                      <a:r>
-                        <a:rPr lang="en-US" altLang="ko-KR" sz="1100" dirty="0" err="1"/>
-                        <a:t>total_price</a:t>
-                      </a:r>
-                      <a:endParaRPr lang="ko-KR" altLang="en-US" sz="1100" dirty="0"/>
-                    </a:p>
-                  </a:txBody>
-                  <a:tcPr anchor="ctr"/>
-                </a:tc>
-                <a:extLst>
-                  <a:ext uri="{0D108BD9-81ED-4DB2-BD59-A6C34878D82A}">
-                    <a16:rowId xmlns:a16="http://schemas.microsoft.com/office/drawing/2014/main" val="2921409194"/>
-                  </a:ext>
-                </a:extLst>
-              </a:tr>
-              <a:tr h="239050">
-                <a:tc>
-                  <a:txBody>
-                    <a:bodyPr/>
-                    <a:lstStyle/>
-                    <a:p>
-                      <a:pPr algn="ctr" latinLnBrk="1"/>
-                      <a:r>
                         <a:rPr lang="en-US" altLang="ko-KR" sz="1100" dirty="0">
                           <a:solidFill>
-                            <a:srgbClr val="C00000"/>
-                          </a:solidFill>
-                        </a:rPr>
-                        <a:t>Coupon 1:1</a:t>
+                            <a:schemeClr val="tx1"/>
+                          </a:solidFill>
+                        </a:rPr>
+                        <a:t>ORDER_STATE</a:t>
                       </a:r>
                       <a:endParaRPr lang="ko-KR" altLang="en-US" sz="1100" dirty="0">
                         <a:solidFill>
-                          <a:srgbClr val="C00000"/>
+                          <a:schemeClr val="tx1"/>
                         </a:solidFill>
                       </a:endParaRPr>
                     </a:p>
@@ -9758,6 +9588,66 @@
                 </a:tc>
                 <a:extLst>
                   <a:ext uri="{0D108BD9-81ED-4DB2-BD59-A6C34878D82A}">
+                    <a16:rowId xmlns:a16="http://schemas.microsoft.com/office/drawing/2014/main" val="334312098"/>
+                  </a:ext>
+                </a:extLst>
+              </a:tr>
+              <a:tr h="239050">
+                <a:tc>
+                  <a:txBody>
+                    <a:bodyPr/>
+                    <a:lstStyle/>
+                    <a:p>
+                      <a:pPr algn="ctr" latinLnBrk="1"/>
+                      <a:r>
+                        <a:rPr lang="en-US" altLang="ko-KR" sz="1100" dirty="0">
+                          <a:solidFill>
+                            <a:schemeClr val="tx1"/>
+                          </a:solidFill>
+                        </a:rPr>
+                        <a:t>PAY_METHOD</a:t>
+                      </a:r>
+                      <a:endParaRPr lang="ko-KR" altLang="en-US" sz="1100" dirty="0">
+                        <a:solidFill>
+                          <a:schemeClr val="tx1"/>
+                        </a:solidFill>
+                      </a:endParaRPr>
+                    </a:p>
+                  </a:txBody>
+                  <a:tcPr anchor="ctr"/>
+                </a:tc>
+                <a:extLst>
+                  <a:ext uri="{0D108BD9-81ED-4DB2-BD59-A6C34878D82A}">
+                    <a16:rowId xmlns:a16="http://schemas.microsoft.com/office/drawing/2014/main" val="2921409194"/>
+                  </a:ext>
+                </a:extLst>
+              </a:tr>
+              <a:tr h="239050">
+                <a:tc>
+                  <a:txBody>
+                    <a:bodyPr/>
+                    <a:lstStyle/>
+                    <a:p>
+                      <a:pPr algn="ctr" latinLnBrk="1"/>
+                      <a:r>
+                        <a:rPr lang="en-US" altLang="ko-KR" sz="1100" dirty="0">
+                          <a:solidFill>
+                            <a:schemeClr val="tx1"/>
+                          </a:solidFill>
+                        </a:rPr>
+                        <a:t>SHIPPING_CHARGE</a:t>
+                      </a:r>
+                      <a:endParaRPr lang="ko-KR" altLang="en-US" sz="1100" dirty="0">
+                        <a:solidFill>
+                          <a:schemeClr val="tx1"/>
+                        </a:solidFill>
+                      </a:endParaRPr>
+                    </a:p>
+                  </a:txBody>
+                  <a:tcPr anchor="ctr"/>
+                </a:tc>
+                <a:extLst>
+                  <a:ext uri="{0D108BD9-81ED-4DB2-BD59-A6C34878D82A}">
                     <a16:rowId xmlns:a16="http://schemas.microsoft.com/office/drawing/2014/main" val="585717344"/>
                   </a:ext>
                 </a:extLst>
@@ -9770,10 +9660,18 @@
                     <a:p>
                       <a:pPr algn="ctr" latinLnBrk="1"/>
                       <a:r>
-                        <a:rPr lang="en-US" altLang="ko-KR" sz="1100" dirty="0" err="1"/>
-                        <a:t>used_point</a:t>
-                      </a:r>
-                      <a:endParaRPr lang="ko-KR" altLang="en-US" sz="1100" dirty="0"/>
+                        <a:rPr lang="en-US" altLang="ko-KR" sz="1100" dirty="0">
+                          <a:solidFill>
+                            <a:schemeClr val="tx1"/>
+                          </a:solidFill>
+                        </a:rPr>
+                        <a:t>TOTAL_PRICE</a:t>
+                      </a:r>
+                      <a:endParaRPr lang="ko-KR" altLang="en-US" sz="1100" dirty="0">
+                        <a:solidFill>
+                          <a:schemeClr val="tx1"/>
+                        </a:solidFill>
+                      </a:endParaRPr>
                     </a:p>
                   </a:txBody>
                   <a:tcPr anchor="ctr"/>
@@ -9808,10 +9706,18 @@
                         <a:defRPr/>
                       </a:pPr>
                       <a:r>
-                        <a:rPr lang="en-US" altLang="ko-KR" sz="1100" dirty="0" err="1"/>
-                        <a:t>pay_method</a:t>
-                      </a:r>
-                      <a:endParaRPr lang="ko-KR" altLang="en-US" sz="1100" dirty="0"/>
+                        <a:rPr lang="en-US" altLang="ko-KR" sz="1100" dirty="0">
+                          <a:solidFill>
+                            <a:schemeClr val="tx1"/>
+                          </a:solidFill>
+                        </a:rPr>
+                        <a:t>USED_POINT</a:t>
+                      </a:r>
+                      <a:endParaRPr lang="ko-KR" altLang="en-US" sz="1100" dirty="0">
+                        <a:solidFill>
+                          <a:schemeClr val="tx1"/>
+                        </a:solidFill>
+                      </a:endParaRPr>
                     </a:p>
                   </a:txBody>
                   <a:tcPr anchor="ctr"/>
@@ -9830,10 +9736,18 @@
                     <a:p>
                       <a:pPr algn="ctr" latinLnBrk="1"/>
                       <a:r>
-                        <a:rPr lang="en-US" altLang="ko-KR" sz="1100" dirty="0" err="1"/>
-                        <a:t>shipping_charge</a:t>
-                      </a:r>
-                      <a:endParaRPr lang="ko-KR" altLang="en-US" sz="1100" dirty="0"/>
+                        <a:rPr lang="en-US" altLang="ko-KR" sz="1100" dirty="0">
+                          <a:solidFill>
+                            <a:schemeClr val="tx1"/>
+                          </a:solidFill>
+                        </a:rPr>
+                        <a:t>COUPON_ID</a:t>
+                      </a:r>
+                      <a:endParaRPr lang="ko-KR" altLang="en-US" sz="1100" dirty="0">
+                        <a:solidFill>
+                          <a:schemeClr val="tx1"/>
+                        </a:solidFill>
+                      </a:endParaRPr>
                     </a:p>
                   </a:txBody>
                   <a:tcPr anchor="ctr"/>
@@ -9852,10 +9766,18 @@
                     <a:p>
                       <a:pPr algn="ctr" latinLnBrk="1"/>
                       <a:r>
-                        <a:rPr lang="en-US" altLang="ko-KR" sz="1100" dirty="0" err="1"/>
-                        <a:t>order_state</a:t>
-                      </a:r>
-                      <a:endParaRPr lang="ko-KR" altLang="en-US" sz="1100" dirty="0"/>
+                        <a:rPr lang="en-US" altLang="ko-KR" sz="1100" dirty="0">
+                          <a:solidFill>
+                            <a:schemeClr val="tx1"/>
+                          </a:solidFill>
+                        </a:rPr>
+                        <a:t>DELIVERY_ID</a:t>
+                      </a:r>
+                      <a:endParaRPr lang="ko-KR" altLang="en-US" sz="1100" dirty="0">
+                        <a:solidFill>
+                          <a:schemeClr val="tx1"/>
+                        </a:solidFill>
+                      </a:endParaRPr>
                     </a:p>
                   </a:txBody>
                   <a:tcPr anchor="ctr"/>
@@ -9892,30 +9814,14 @@
                       <a:r>
                         <a:rPr lang="en-US" altLang="ko-KR" sz="1100" dirty="0">
                           <a:solidFill>
-                            <a:srgbClr val="0070C0"/>
-                          </a:solidFill>
-                        </a:rPr>
-                        <a:t>List&lt;</a:t>
-                      </a:r>
-                      <a:r>
-                        <a:rPr lang="en-US" altLang="ko-KR" sz="1100" dirty="0" err="1">
-                          <a:solidFill>
-                            <a:srgbClr val="0070C0"/>
-                          </a:solidFill>
-                        </a:rPr>
-                        <a:t>Order_item</a:t>
-                      </a:r>
-                      <a:r>
-                        <a:rPr lang="en-US" altLang="ko-KR" sz="1100" dirty="0">
-                          <a:solidFill>
-                            <a:srgbClr val="0070C0"/>
-                          </a:solidFill>
-                        </a:rPr>
-                        <a:t>&gt;</a:t>
+                            <a:schemeClr val="tx1"/>
+                          </a:solidFill>
+                        </a:rPr>
+                        <a:t>MEMBER_ID</a:t>
                       </a:r>
                       <a:endParaRPr lang="ko-KR" altLang="en-US" sz="1100" dirty="0">
                         <a:solidFill>
-                          <a:srgbClr val="0070C0"/>
+                          <a:schemeClr val="tx1"/>
                         </a:solidFill>
                       </a:endParaRPr>
                     </a:p>
@@ -9947,14 +9853,14 @@
           <p:nvPr>
             <p:extLst>
               <p:ext uri="{D42A27DB-BD31-4B8C-83A1-F6EECF244321}">
-                <p14:modId xmlns:p14="http://schemas.microsoft.com/office/powerpoint/2010/main" val="3029864559"/>
+                <p14:modId xmlns:p14="http://schemas.microsoft.com/office/powerpoint/2010/main" val="2520075907"/>
               </p:ext>
             </p:extLst>
           </p:nvPr>
         </p:nvGraphicFramePr>
         <p:xfrm>
-          <a:off x="2707241" y="4544722"/>
-          <a:ext cx="1156368" cy="1813560"/>
+          <a:off x="3350567" y="3694461"/>
+          <a:ext cx="1353635" cy="3108960"/>
         </p:xfrm>
         <a:graphic>
           <a:graphicData uri="http://schemas.openxmlformats.org/drawingml/2006/table">
@@ -9963,7 +9869,7 @@
                 <a:tableStyleId>{5C22544A-7EE6-4342-B048-85BDC9FD1C3A}</a:tableStyleId>
               </a:tblPr>
               <a:tblGrid>
-                <a:gridCol w="1156368">
+                <a:gridCol w="1353635">
                   <a:extLst>
                     <a:ext uri="{9D8B030D-6E8A-4147-A177-3AD203B41FA5}">
                       <a16:colId xmlns:a16="http://schemas.microsoft.com/office/drawing/2014/main" val="329139778"/>
@@ -10003,14 +9909,14 @@
                       <a:r>
                         <a:rPr lang="en-US" altLang="ko-KR" sz="1100" dirty="0">
                           <a:solidFill>
-                            <a:srgbClr val="C00000"/>
-                          </a:solidFill>
-                        </a:rPr>
-                        <a:t>Order N:1</a:t>
+                            <a:schemeClr val="tx1"/>
+                          </a:solidFill>
+                        </a:rPr>
+                        <a:t>ORDER_ITEM_ID</a:t>
                       </a:r>
                       <a:endParaRPr lang="ko-KR" altLang="en-US" sz="1100" dirty="0">
                         <a:solidFill>
-                          <a:srgbClr val="C00000"/>
+                          <a:schemeClr val="tx1"/>
                         </a:solidFill>
                       </a:endParaRPr>
                     </a:p>
@@ -10033,14 +9939,14 @@
                       <a:r>
                         <a:rPr lang="en-US" altLang="ko-KR" sz="1100" dirty="0">
                           <a:solidFill>
-                            <a:srgbClr val="C00000"/>
-                          </a:solidFill>
-                        </a:rPr>
-                        <a:t>Item N:1</a:t>
+                            <a:schemeClr val="tx1"/>
+                          </a:solidFill>
+                        </a:rPr>
+                        <a:t>COUNT</a:t>
                       </a:r>
                       <a:endParaRPr lang="ko-KR" altLang="en-US" sz="1100" dirty="0">
                         <a:solidFill>
-                          <a:srgbClr val="C00000"/>
+                          <a:schemeClr val="tx1"/>
                         </a:solidFill>
                       </a:endParaRPr>
                     </a:p>
@@ -10061,38 +9967,16 @@
                     <a:p>
                       <a:pPr algn="ctr" latinLnBrk="1"/>
                       <a:r>
-                        <a:rPr lang="en-US" altLang="ko-KR" sz="1100" dirty="0" err="1"/>
-                        <a:t>single_price</a:t>
-                      </a:r>
-                      <a:endParaRPr lang="ko-KR" altLang="en-US" sz="1100" dirty="0"/>
-                    </a:p>
-                  </a:txBody>
-                  <a:tcPr anchor="ctr"/>
-                </a:tc>
-                <a:extLst>
-                  <a:ext uri="{0D108BD9-81ED-4DB2-BD59-A6C34878D82A}">
-                    <a16:rowId xmlns:a16="http://schemas.microsoft.com/office/drawing/2014/main" val="1954131315"/>
-                  </a:ext>
-                </a:extLst>
-              </a:tr>
-              <a:tr h="239050">
-                <a:tc>
-                  <a:txBody>
-                    <a:bodyPr/>
-                    <a:lstStyle/>
-                    <a:p>
-                      <a:pPr algn="ctr" latinLnBrk="1"/>
-                      <a:r>
                         <a:rPr lang="en-US" altLang="ko-KR" sz="1100" dirty="0">
                           <a:solidFill>
-                            <a:srgbClr val="C00000"/>
-                          </a:solidFill>
-                        </a:rPr>
-                        <a:t>Option1 N:1</a:t>
+                            <a:schemeClr val="tx1"/>
+                          </a:solidFill>
+                        </a:rPr>
+                        <a:t>IS_REVIEWED</a:t>
                       </a:r>
                       <a:endParaRPr lang="ko-KR" altLang="en-US" sz="1100" dirty="0">
                         <a:solidFill>
-                          <a:srgbClr val="C00000"/>
+                          <a:schemeClr val="tx1"/>
                         </a:solidFill>
                       </a:endParaRPr>
                     </a:p>
@@ -10101,7 +9985,7 @@
                 </a:tc>
                 <a:extLst>
                   <a:ext uri="{0D108BD9-81ED-4DB2-BD59-A6C34878D82A}">
-                    <a16:rowId xmlns:a16="http://schemas.microsoft.com/office/drawing/2014/main" val="1431156138"/>
+                    <a16:rowId xmlns:a16="http://schemas.microsoft.com/office/drawing/2014/main" val="1954131315"/>
                   </a:ext>
                 </a:extLst>
               </a:tr>
@@ -10115,14 +9999,14 @@
                       <a:r>
                         <a:rPr lang="en-US" altLang="ko-KR" sz="1100" dirty="0">
                           <a:solidFill>
-                            <a:srgbClr val="C00000"/>
-                          </a:solidFill>
-                        </a:rPr>
-                        <a:t>Option2 N:1</a:t>
+                            <a:schemeClr val="tx1"/>
+                          </a:solidFill>
+                        </a:rPr>
+                        <a:t>ITEM_NAME</a:t>
                       </a:r>
                       <a:endParaRPr lang="ko-KR" altLang="en-US" sz="1100" dirty="0">
                         <a:solidFill>
-                          <a:srgbClr val="C00000"/>
+                          <a:schemeClr val="tx1"/>
                         </a:solidFill>
                       </a:endParaRPr>
                     </a:p>
@@ -10131,6 +10015,36 @@
                 </a:tc>
                 <a:extLst>
                   <a:ext uri="{0D108BD9-81ED-4DB2-BD59-A6C34878D82A}">
+                    <a16:rowId xmlns:a16="http://schemas.microsoft.com/office/drawing/2014/main" val="1431156138"/>
+                  </a:ext>
+                </a:extLst>
+              </a:tr>
+              <a:tr h="239050">
+                <a:tc>
+                  <a:txBody>
+                    <a:bodyPr/>
+                    <a:lstStyle/>
+                    <a:p>
+                      <a:pPr algn="ctr" latinLnBrk="1"/>
+                      <a:r>
+                        <a:rPr lang="en-US" altLang="ko-KR" sz="1100" dirty="0">
+                          <a:solidFill>
+                            <a:schemeClr val="tx1"/>
+                          </a:solidFill>
+                        </a:rPr>
+                        <a:t>ITEM_PRICE</a:t>
+                      </a:r>
+                      <a:endParaRPr lang="ko-KR" altLang="en-US" sz="1100" dirty="0">
+                        <a:solidFill>
+                          <a:schemeClr val="tx1"/>
+                        </a:solidFill>
+                      </a:endParaRPr>
+                    </a:p>
+                  </a:txBody>
+                  <a:tcPr anchor="ctr"/>
+                </a:tc>
+                <a:extLst>
+                  <a:ext uri="{0D108BD9-81ED-4DB2-BD59-A6C34878D82A}">
                     <a16:rowId xmlns:a16="http://schemas.microsoft.com/office/drawing/2014/main" val="3288449375"/>
                   </a:ext>
                 </a:extLst>
@@ -10143,8 +10057,68 @@
                     <a:p>
                       <a:pPr algn="ctr" latinLnBrk="1"/>
                       <a:r>
+                        <a:rPr lang="en-US" altLang="ko-KR" sz="1100" dirty="0">
+                          <a:solidFill>
+                            <a:schemeClr val="tx1"/>
+                          </a:solidFill>
+                        </a:rPr>
+                        <a:t>ITEM_VERSION</a:t>
+                      </a:r>
+                      <a:endParaRPr lang="ko-KR" altLang="en-US" sz="1100" dirty="0">
+                        <a:solidFill>
+                          <a:schemeClr val="tx1"/>
+                        </a:solidFill>
+                      </a:endParaRPr>
+                    </a:p>
+                  </a:txBody>
+                  <a:tcPr anchor="ctr"/>
+                </a:tc>
+                <a:extLst>
+                  <a:ext uri="{0D108BD9-81ED-4DB2-BD59-A6C34878D82A}">
+                    <a16:rowId xmlns:a16="http://schemas.microsoft.com/office/drawing/2014/main" val="1946880554"/>
+                  </a:ext>
+                </a:extLst>
+              </a:tr>
+              <a:tr h="239050">
+                <a:tc>
+                  <a:txBody>
+                    <a:bodyPr/>
+                    <a:lstStyle/>
+                    <a:p>
+                      <a:pPr algn="ctr" latinLnBrk="1"/>
+                      <a:r>
+                        <a:rPr lang="en-US" altLang="ko-KR" sz="1100" dirty="0">
+                          <a:solidFill>
+                            <a:schemeClr val="tx1"/>
+                          </a:solidFill>
+                        </a:rPr>
+                        <a:t>OPTION1</a:t>
+                      </a:r>
+                      <a:endParaRPr lang="ko-KR" altLang="en-US" sz="1100" dirty="0">
+                        <a:solidFill>
+                          <a:schemeClr val="tx1"/>
+                        </a:solidFill>
+                      </a:endParaRPr>
+                    </a:p>
+                  </a:txBody>
+                  <a:tcPr anchor="ctr"/>
+                </a:tc>
+                <a:extLst>
+                  <a:ext uri="{0D108BD9-81ED-4DB2-BD59-A6C34878D82A}">
+                    <a16:rowId xmlns:a16="http://schemas.microsoft.com/office/drawing/2014/main" val="388887747"/>
+                  </a:ext>
+                </a:extLst>
+              </a:tr>
+              <a:tr h="239050">
+                <a:tc>
+                  <a:txBody>
+                    <a:bodyPr/>
+                    <a:lstStyle/>
+                    <a:p>
+                      <a:pPr algn="ctr" latinLnBrk="1"/>
+                      <a:r>
                         <a:rPr lang="en-US" altLang="ko-KR" sz="1100" dirty="0"/>
-                        <a:t>count</a:t>
+                        <a:t>OPTION2</a:t>
                       </a:r>
                       <a:endParaRPr lang="ko-KR" altLang="en-US" sz="1100" dirty="0"/>
                     </a:p>
@@ -10153,7 +10127,73 @@
                 </a:tc>
                 <a:extLst>
                   <a:ext uri="{0D108BD9-81ED-4DB2-BD59-A6C34878D82A}">
-                    <a16:rowId xmlns:a16="http://schemas.microsoft.com/office/drawing/2014/main" val="388887747"/>
+                    <a16:rowId xmlns:a16="http://schemas.microsoft.com/office/drawing/2014/main" val="3067151928"/>
+                  </a:ext>
+                </a:extLst>
+              </a:tr>
+              <a:tr h="239050">
+                <a:tc>
+                  <a:txBody>
+                    <a:bodyPr/>
+                    <a:lstStyle/>
+                    <a:p>
+                      <a:pPr algn="ctr" latinLnBrk="1"/>
+                      <a:r>
+                        <a:rPr lang="en-US" altLang="ko-KR" sz="1100" dirty="0"/>
+                        <a:t>THUMBNAIL_URL</a:t>
+                      </a:r>
+                      <a:endParaRPr lang="ko-KR" altLang="en-US" sz="1100" dirty="0"/>
+                    </a:p>
+                  </a:txBody>
+                  <a:tcPr anchor="ctr"/>
+                </a:tc>
+                <a:extLst>
+                  <a:ext uri="{0D108BD9-81ED-4DB2-BD59-A6C34878D82A}">
+                    <a16:rowId xmlns:a16="http://schemas.microsoft.com/office/drawing/2014/main" val="4044220585"/>
+                  </a:ext>
+                </a:extLst>
+              </a:tr>
+              <a:tr h="239050">
+                <a:tc>
+                  <a:txBody>
+                    <a:bodyPr/>
+                    <a:lstStyle/>
+                    <a:p>
+                      <a:pPr algn="ctr" latinLnBrk="1"/>
+                      <a:r>
+                        <a:rPr lang="en-US" altLang="ko-KR" sz="1100" dirty="0"/>
+                        <a:t>ITEM_ID</a:t>
+                      </a:r>
+                      <a:endParaRPr lang="ko-KR" altLang="en-US" sz="1100" dirty="0"/>
+                    </a:p>
+                  </a:txBody>
+                  <a:tcPr anchor="ctr"/>
+                </a:tc>
+                <a:extLst>
+                  <a:ext uri="{0D108BD9-81ED-4DB2-BD59-A6C34878D82A}">
+                    <a16:rowId xmlns:a16="http://schemas.microsoft.com/office/drawing/2014/main" val="3052156933"/>
+                  </a:ext>
+                </a:extLst>
+              </a:tr>
+              <a:tr h="239050">
+                <a:tc>
+                  <a:txBody>
+                    <a:bodyPr/>
+                    <a:lstStyle/>
+                    <a:p>
+                      <a:pPr algn="ctr" latinLnBrk="1"/>
+                      <a:r>
+                        <a:rPr lang="en-US" altLang="ko-KR" sz="1100" dirty="0"/>
+                        <a:t>ORDER_ID</a:t>
+                      </a:r>
+                      <a:endParaRPr lang="ko-KR" altLang="en-US" sz="1100" dirty="0"/>
+                    </a:p>
+                  </a:txBody>
+                  <a:tcPr anchor="ctr"/>
+                </a:tc>
+                <a:extLst>
+                  <a:ext uri="{0D108BD9-81ED-4DB2-BD59-A6C34878D82A}">
+                    <a16:rowId xmlns:a16="http://schemas.microsoft.com/office/drawing/2014/main" val="1261983711"/>
                   </a:ext>
                 </a:extLst>
               </a:tr>
@@ -10176,14 +10216,14 @@
           <p:nvPr>
             <p:extLst>
               <p:ext uri="{D42A27DB-BD31-4B8C-83A1-F6EECF244321}">
-                <p14:modId xmlns:p14="http://schemas.microsoft.com/office/powerpoint/2010/main" val="488861279"/>
+                <p14:modId xmlns:p14="http://schemas.microsoft.com/office/powerpoint/2010/main" val="222481181"/>
               </p:ext>
             </p:extLst>
           </p:nvPr>
         </p:nvGraphicFramePr>
         <p:xfrm>
-          <a:off x="2682578" y="2619229"/>
-          <a:ext cx="1156368" cy="1813560"/>
+          <a:off x="3697586" y="1334505"/>
+          <a:ext cx="1616758" cy="2072640"/>
         </p:xfrm>
         <a:graphic>
           <a:graphicData uri="http://schemas.openxmlformats.org/drawingml/2006/table">
@@ -10192,7 +10232,7 @@
                 <a:tableStyleId>{5C22544A-7EE6-4342-B048-85BDC9FD1C3A}</a:tableStyleId>
               </a:tblPr>
               <a:tblGrid>
-                <a:gridCol w="1156368">
+                <a:gridCol w="1616758">
                   <a:extLst>
                     <a:ext uri="{9D8B030D-6E8A-4147-A177-3AD203B41FA5}">
                       <a16:colId xmlns:a16="http://schemas.microsoft.com/office/drawing/2014/main" val="329139778"/>
@@ -10200,7 +10240,7 @@
                   </a:extLst>
                 </a:gridCol>
               </a:tblGrid>
-              <a:tr h="172876">
+              <a:tr h="256033">
                 <a:tc>
                   <a:txBody>
                     <a:bodyPr/>
@@ -10232,14 +10272,14 @@
                       <a:r>
                         <a:rPr lang="en-US" altLang="ko-KR" sz="1100" dirty="0">
                           <a:solidFill>
-                            <a:srgbClr val="C00000"/>
-                          </a:solidFill>
-                        </a:rPr>
-                        <a:t>Item N:1</a:t>
+                            <a:schemeClr val="tx1"/>
+                          </a:solidFill>
+                        </a:rPr>
+                        <a:t>CART_ITEM_ID</a:t>
                       </a:r>
                       <a:endParaRPr lang="ko-KR" altLang="en-US" sz="1100" dirty="0">
                         <a:solidFill>
-                          <a:srgbClr val="C00000"/>
+                          <a:schemeClr val="tx1"/>
                         </a:solidFill>
                       </a:endParaRPr>
                     </a:p>
@@ -10260,10 +10300,13 @@
                     <a:p>
                       <a:pPr algn="ctr" latinLnBrk="1"/>
                       <a:r>
-                        <a:rPr lang="en-US" altLang="ko-KR" sz="1100" dirty="0" err="1"/>
-                        <a:t>item_version</a:t>
-                      </a:r>
-                      <a:endParaRPr lang="en-US" altLang="ko-KR" sz="1100" dirty="0"/>
+                        <a:rPr lang="en-US" altLang="ko-KR" sz="1100" dirty="0">
+                          <a:solidFill>
+                            <a:schemeClr val="tx1"/>
+                          </a:solidFill>
+                        </a:rPr>
+                        <a:t>COUNT</a:t>
+                      </a:r>
                     </a:p>
                   </a:txBody>
                   <a:tcPr anchor="ctr"/>
@@ -10284,14 +10327,14 @@
                       <a:r>
                         <a:rPr lang="en-US" altLang="ko-KR" sz="1100" dirty="0">
                           <a:solidFill>
-                            <a:srgbClr val="C00000"/>
-                          </a:solidFill>
-                        </a:rPr>
-                        <a:t>Member N:1</a:t>
+                            <a:schemeClr val="tx1"/>
+                          </a:solidFill>
+                        </a:rPr>
+                        <a:t>ITEM_VERSION</a:t>
                       </a:r>
                       <a:endParaRPr lang="ko-KR" altLang="en-US" sz="1100" dirty="0">
                         <a:solidFill>
-                          <a:srgbClr val="C00000"/>
+                          <a:schemeClr val="tx1"/>
                         </a:solidFill>
                       </a:endParaRPr>
                     </a:p>
@@ -10314,14 +10357,14 @@
                       <a:r>
                         <a:rPr lang="en-US" altLang="ko-KR" sz="1100" dirty="0">
                           <a:solidFill>
-                            <a:srgbClr val="C00000"/>
-                          </a:solidFill>
-                        </a:rPr>
-                        <a:t>Option1 N:1</a:t>
+                            <a:schemeClr val="tx1"/>
+                          </a:solidFill>
+                        </a:rPr>
+                        <a:t>ITEM_ID</a:t>
                       </a:r>
                       <a:endParaRPr lang="ko-KR" altLang="en-US" sz="1100" dirty="0">
                         <a:solidFill>
-                          <a:srgbClr val="C00000"/>
+                          <a:schemeClr val="tx1"/>
                         </a:solidFill>
                       </a:endParaRPr>
                     </a:p>
@@ -10344,14 +10387,14 @@
                       <a:r>
                         <a:rPr lang="en-US" altLang="ko-KR" sz="1100" dirty="0">
                           <a:solidFill>
-                            <a:srgbClr val="C00000"/>
-                          </a:solidFill>
-                        </a:rPr>
-                        <a:t>Option2 N:1</a:t>
+                            <a:schemeClr val="tx1"/>
+                          </a:solidFill>
+                        </a:rPr>
+                        <a:t>MEMBER_ID</a:t>
                       </a:r>
                       <a:endParaRPr lang="ko-KR" altLang="en-US" sz="1100" dirty="0">
                         <a:solidFill>
-                          <a:srgbClr val="C00000"/>
+                          <a:schemeClr val="tx1"/>
                         </a:solidFill>
                       </a:endParaRPr>
                     </a:p>
@@ -10372,10 +10415,18 @@
                     <a:p>
                       <a:pPr algn="ctr" latinLnBrk="1"/>
                       <a:r>
-                        <a:rPr lang="en-US" altLang="ko-KR" sz="1100" dirty="0"/>
-                        <a:t>count</a:t>
-                      </a:r>
-                      <a:endParaRPr lang="ko-KR" altLang="en-US" sz="1100" dirty="0"/>
+                        <a:rPr lang="en-US" altLang="ko-KR" sz="1100" dirty="0">
+                          <a:solidFill>
+                            <a:schemeClr val="tx1"/>
+                          </a:solidFill>
+                        </a:rPr>
+                        <a:t>OPTION1_ID</a:t>
+                      </a:r>
+                      <a:endParaRPr lang="ko-KR" altLang="en-US" sz="1100" dirty="0">
+                        <a:solidFill>
+                          <a:schemeClr val="tx1"/>
+                        </a:solidFill>
+                      </a:endParaRPr>
                     </a:p>
                   </a:txBody>
                   <a:tcPr anchor="ctr"/>
@@ -10383,6 +10434,36 @@
                 <a:extLst>
                   <a:ext uri="{0D108BD9-81ED-4DB2-BD59-A6C34878D82A}">
                     <a16:rowId xmlns:a16="http://schemas.microsoft.com/office/drawing/2014/main" val="1772206542"/>
+                  </a:ext>
+                </a:extLst>
+              </a:tr>
+              <a:tr h="239050">
+                <a:tc>
+                  <a:txBody>
+                    <a:bodyPr/>
+                    <a:lstStyle/>
+                    <a:p>
+                      <a:pPr algn="ctr" latinLnBrk="1"/>
+                      <a:r>
+                        <a:rPr lang="en-US" altLang="ko-KR" sz="1100" dirty="0">
+                          <a:solidFill>
+                            <a:schemeClr val="tx1"/>
+                          </a:solidFill>
+                        </a:rPr>
+                        <a:t>OPTION2_ID</a:t>
+                      </a:r>
+                      <a:endParaRPr lang="ko-KR" altLang="en-US" sz="1100" dirty="0">
+                        <a:solidFill>
+                          <a:schemeClr val="tx1"/>
+                        </a:solidFill>
+                      </a:endParaRPr>
+                    </a:p>
+                  </a:txBody>
+                  <a:tcPr anchor="ctr"/>
+                </a:tc>
+                <a:extLst>
+                  <a:ext uri="{0D108BD9-81ED-4DB2-BD59-A6C34878D82A}">
+                    <a16:rowId xmlns:a16="http://schemas.microsoft.com/office/drawing/2014/main" val="2578387421"/>
                   </a:ext>
                 </a:extLst>
               </a:tr>
@@ -10405,14 +10486,14 @@
           <p:nvPr>
             <p:extLst>
               <p:ext uri="{D42A27DB-BD31-4B8C-83A1-F6EECF244321}">
-                <p14:modId xmlns:p14="http://schemas.microsoft.com/office/powerpoint/2010/main" val="1264536574"/>
+                <p14:modId xmlns:p14="http://schemas.microsoft.com/office/powerpoint/2010/main" val="2155001606"/>
               </p:ext>
             </p:extLst>
           </p:nvPr>
         </p:nvGraphicFramePr>
         <p:xfrm>
-          <a:off x="4094323" y="2086138"/>
-          <a:ext cx="1294061" cy="777240"/>
+          <a:off x="3680792" y="152565"/>
+          <a:ext cx="1685568" cy="1036320"/>
         </p:xfrm>
         <a:graphic>
           <a:graphicData uri="http://schemas.openxmlformats.org/drawingml/2006/table">
@@ -10421,7 +10502,7 @@
                 <a:tableStyleId>{5C22544A-7EE6-4342-B048-85BDC9FD1C3A}</a:tableStyleId>
               </a:tblPr>
               <a:tblGrid>
-                <a:gridCol w="1294061">
+                <a:gridCol w="1685568">
                   <a:extLst>
                     <a:ext uri="{9D8B030D-6E8A-4147-A177-3AD203B41FA5}">
                       <a16:colId xmlns:a16="http://schemas.microsoft.com/office/drawing/2014/main" val="329139778"/>
@@ -10461,14 +10542,14 @@
                       <a:r>
                         <a:rPr lang="en-US" altLang="ko-KR" sz="1100" dirty="0">
                           <a:solidFill>
-                            <a:srgbClr val="C00000"/>
-                          </a:solidFill>
-                        </a:rPr>
-                        <a:t>Item N:1</a:t>
+                            <a:schemeClr val="tx1"/>
+                          </a:solidFill>
+                        </a:rPr>
+                        <a:t>PREFERENCE_ITEM_ID</a:t>
                       </a:r>
                       <a:endParaRPr lang="ko-KR" altLang="en-US" sz="1100" dirty="0">
                         <a:solidFill>
-                          <a:srgbClr val="C00000"/>
+                          <a:schemeClr val="tx1"/>
                         </a:solidFill>
                       </a:endParaRPr>
                     </a:p>
@@ -10491,14 +10572,14 @@
                       <a:r>
                         <a:rPr lang="en-US" altLang="ko-KR" sz="1100" dirty="0">
                           <a:solidFill>
-                            <a:srgbClr val="C00000"/>
-                          </a:solidFill>
-                        </a:rPr>
-                        <a:t>Member N:1</a:t>
+                            <a:schemeClr val="tx1"/>
+                          </a:solidFill>
+                        </a:rPr>
+                        <a:t>ITEM_ID</a:t>
                       </a:r>
                       <a:endParaRPr lang="ko-KR" altLang="en-US" sz="1100" dirty="0">
                         <a:solidFill>
-                          <a:srgbClr val="C00000"/>
+                          <a:schemeClr val="tx1"/>
                         </a:solidFill>
                       </a:endParaRPr>
                     </a:p>
@@ -10508,6 +10589,36 @@
                 <a:extLst>
                   <a:ext uri="{0D108BD9-81ED-4DB2-BD59-A6C34878D82A}">
                     <a16:rowId xmlns:a16="http://schemas.microsoft.com/office/drawing/2014/main" val="302865429"/>
+                  </a:ext>
+                </a:extLst>
+              </a:tr>
+              <a:tr h="239050">
+                <a:tc>
+                  <a:txBody>
+                    <a:bodyPr/>
+                    <a:lstStyle/>
+                    <a:p>
+                      <a:pPr algn="ctr" latinLnBrk="1"/>
+                      <a:r>
+                        <a:rPr lang="en-US" altLang="ko-KR" sz="1100" dirty="0">
+                          <a:solidFill>
+                            <a:schemeClr val="tx1"/>
+                          </a:solidFill>
+                        </a:rPr>
+                        <a:t>MEMBER_ID</a:t>
+                      </a:r>
+                      <a:endParaRPr lang="ko-KR" altLang="en-US" sz="1100" dirty="0">
+                        <a:solidFill>
+                          <a:schemeClr val="tx1"/>
+                        </a:solidFill>
+                      </a:endParaRPr>
+                    </a:p>
+                  </a:txBody>
+                  <a:tcPr anchor="ctr"/>
+                </a:tc>
+                <a:extLst>
+                  <a:ext uri="{0D108BD9-81ED-4DB2-BD59-A6C34878D82A}">
+                    <a16:rowId xmlns:a16="http://schemas.microsoft.com/office/drawing/2014/main" val="2229742867"/>
                   </a:ext>
                 </a:extLst>
               </a:tr>
@@ -10530,14 +10641,14 @@
           <p:nvPr>
             <p:extLst>
               <p:ext uri="{D42A27DB-BD31-4B8C-83A1-F6EECF244321}">
-                <p14:modId xmlns:p14="http://schemas.microsoft.com/office/powerpoint/2010/main" val="602297140"/>
+                <p14:modId xmlns:p14="http://schemas.microsoft.com/office/powerpoint/2010/main" val="1182861190"/>
               </p:ext>
             </p:extLst>
           </p:nvPr>
         </p:nvGraphicFramePr>
         <p:xfrm>
-          <a:off x="2608736" y="0"/>
-          <a:ext cx="1420569" cy="2331720"/>
+          <a:off x="4927" y="1024489"/>
+          <a:ext cx="1772765" cy="2590800"/>
         </p:xfrm>
         <a:graphic>
           <a:graphicData uri="http://schemas.openxmlformats.org/drawingml/2006/table">
@@ -10546,7 +10657,7 @@
                 <a:tableStyleId>{5C22544A-7EE6-4342-B048-85BDC9FD1C3A}</a:tableStyleId>
               </a:tblPr>
               <a:tblGrid>
-                <a:gridCol w="1420569">
+                <a:gridCol w="1772765">
                   <a:extLst>
                     <a:ext uri="{9D8B030D-6E8A-4147-A177-3AD203B41FA5}">
                       <a16:colId xmlns:a16="http://schemas.microsoft.com/office/drawing/2014/main" val="329139778"/>
@@ -10562,10 +10673,18 @@
                     <a:p>
                       <a:pPr algn="ctr" latinLnBrk="1"/>
                       <a:r>
-                        <a:rPr lang="en-US" altLang="ko-KR" sz="1100" dirty="0"/>
+                        <a:rPr lang="en-US" altLang="ko-KR" sz="1100" dirty="0">
+                          <a:solidFill>
+                            <a:schemeClr val="bg1"/>
+                          </a:solidFill>
+                        </a:rPr>
                         <a:t>Coupon</a:t>
                       </a:r>
-                      <a:endParaRPr lang="ko-KR" altLang="en-US" sz="1100" dirty="0"/>
+                      <a:endParaRPr lang="ko-KR" altLang="en-US" sz="1100" dirty="0">
+                        <a:solidFill>
+                          <a:schemeClr val="bg1"/>
+                        </a:solidFill>
+                      </a:endParaRPr>
                     </a:p>
                   </a:txBody>
                   <a:tcPr anchor="ctr"/>
@@ -10600,173 +10719,12 @@
                         <a:defRPr/>
                       </a:pPr>
                       <a:r>
-                        <a:rPr lang="en-US" altLang="ko-KR" sz="1100" dirty="0" err="1"/>
-                        <a:t>coupon_kind</a:t>
-                      </a:r>
-                      <a:endParaRPr lang="ko-KR" altLang="en-US" sz="1100" dirty="0"/>
-                    </a:p>
-                  </a:txBody>
-                  <a:tcPr anchor="ctr"/>
-                </a:tc>
-                <a:extLst>
-                  <a:ext uri="{0D108BD9-81ED-4DB2-BD59-A6C34878D82A}">
-                    <a16:rowId xmlns:a16="http://schemas.microsoft.com/office/drawing/2014/main" val="3610887053"/>
-                  </a:ext>
-                </a:extLst>
-              </a:tr>
-              <a:tr h="239050">
-                <a:tc>
-                  <a:txBody>
-                    <a:bodyPr/>
-                    <a:lstStyle/>
-                    <a:p>
-                      <a:pPr algn="ctr" latinLnBrk="1"/>
-                      <a:r>
-                        <a:rPr lang="en-US" altLang="ko-KR" sz="1100" dirty="0"/>
-                        <a:t>rate</a:t>
-                      </a:r>
-                      <a:endParaRPr lang="ko-KR" altLang="en-US" sz="1100" dirty="0"/>
-                    </a:p>
-                  </a:txBody>
-                  <a:tcPr anchor="ctr"/>
-                </a:tc>
-                <a:extLst>
-                  <a:ext uri="{0D108BD9-81ED-4DB2-BD59-A6C34878D82A}">
-                    <a16:rowId xmlns:a16="http://schemas.microsoft.com/office/drawing/2014/main" val="1431156138"/>
-                  </a:ext>
-                </a:extLst>
-              </a:tr>
-              <a:tr h="239050">
-                <a:tc>
-                  <a:txBody>
-                    <a:bodyPr/>
-                    <a:lstStyle/>
-                    <a:p>
-                      <a:pPr algn="ctr" latinLnBrk="1"/>
-                      <a:r>
-                        <a:rPr lang="en-US" altLang="ko-KR" sz="1100" dirty="0" err="1"/>
-                        <a:t>expired_date</a:t>
-                      </a:r>
-                      <a:endParaRPr lang="ko-KR" altLang="en-US" sz="1100" dirty="0"/>
-                    </a:p>
-                  </a:txBody>
-                  <a:tcPr anchor="ctr"/>
-                </a:tc>
-                <a:extLst>
-                  <a:ext uri="{0D108BD9-81ED-4DB2-BD59-A6C34878D82A}">
-                    <a16:rowId xmlns:a16="http://schemas.microsoft.com/office/drawing/2014/main" val="3029070334"/>
-                  </a:ext>
-                </a:extLst>
-              </a:tr>
-              <a:tr h="239050">
-                <a:tc>
-                  <a:txBody>
-                    <a:bodyPr/>
-                    <a:lstStyle/>
-                    <a:p>
-                      <a:pPr algn="ctr" latinLnBrk="1"/>
-                      <a:r>
-                        <a:rPr lang="en-US" altLang="ko-KR" sz="1100" dirty="0" err="1"/>
-                        <a:t>coupon_condition</a:t>
-                      </a:r>
-                      <a:endParaRPr lang="ko-KR" altLang="en-US" sz="1100" dirty="0"/>
-                    </a:p>
-                  </a:txBody>
-                  <a:tcPr anchor="ctr"/>
-                </a:tc>
-                <a:extLst>
-                  <a:ext uri="{0D108BD9-81ED-4DB2-BD59-A6C34878D82A}">
-                    <a16:rowId xmlns:a16="http://schemas.microsoft.com/office/drawing/2014/main" val="1772206542"/>
-                  </a:ext>
-                </a:extLst>
-              </a:tr>
-              <a:tr h="239050">
-                <a:tc>
-                  <a:txBody>
-                    <a:bodyPr/>
-                    <a:lstStyle/>
-                    <a:p>
-                      <a:pPr algn="ctr" latinLnBrk="1"/>
-                      <a:r>
-                        <a:rPr lang="en-US" altLang="ko-KR" sz="1100" dirty="0" err="1"/>
-                        <a:t>serial_number</a:t>
-                      </a:r>
-                      <a:endParaRPr lang="ko-KR" altLang="en-US" sz="1100" dirty="0"/>
-                    </a:p>
-                  </a:txBody>
-                  <a:tcPr anchor="ctr"/>
-                </a:tc>
-                <a:extLst>
-                  <a:ext uri="{0D108BD9-81ED-4DB2-BD59-A6C34878D82A}">
-                    <a16:rowId xmlns:a16="http://schemas.microsoft.com/office/drawing/2014/main" val="3848402200"/>
-                  </a:ext>
-                </a:extLst>
-              </a:tr>
-              <a:tr h="239050">
-                <a:tc>
-                  <a:txBody>
-                    <a:bodyPr/>
-                    <a:lstStyle/>
-                    <a:p>
-                      <a:pPr algn="ctr" latinLnBrk="1"/>
-                      <a:r>
-                        <a:rPr lang="en-US" altLang="ko-KR" sz="1100" dirty="0"/>
-                        <a:t>name</a:t>
-                      </a:r>
-                    </a:p>
-                  </a:txBody>
-                  <a:tcPr anchor="ctr"/>
-                </a:tc>
-                <a:extLst>
-                  <a:ext uri="{0D108BD9-81ED-4DB2-BD59-A6C34878D82A}">
-                    <a16:rowId xmlns:a16="http://schemas.microsoft.com/office/drawing/2014/main" val="3459395171"/>
-                  </a:ext>
-                </a:extLst>
-              </a:tr>
-              <a:tr h="239050">
-                <a:tc>
-                  <a:txBody>
-                    <a:bodyPr/>
-                    <a:lstStyle/>
-                    <a:p>
-                      <a:pPr algn="ctr" latinLnBrk="1"/>
-                      <a:r>
                         <a:rPr lang="en-US" altLang="ko-KR" sz="1100" dirty="0">
                           <a:solidFill>
-                            <a:srgbClr val="C00000"/>
-                          </a:solidFill>
-                        </a:rPr>
-                        <a:t>Member N:1</a:t>
-                      </a:r>
-                      <a:endParaRPr lang="ko-KR" altLang="en-US" sz="1100" dirty="0">
-                        <a:solidFill>
-                          <a:srgbClr val="C00000"/>
-                        </a:solidFill>
-                      </a:endParaRPr>
-                    </a:p>
-                  </a:txBody>
-                  <a:tcPr anchor="ctr"/>
-                </a:tc>
-                <a:extLst>
-                  <a:ext uri="{0D108BD9-81ED-4DB2-BD59-A6C34878D82A}">
-                    <a16:rowId xmlns:a16="http://schemas.microsoft.com/office/drawing/2014/main" val="2026906847"/>
-                  </a:ext>
-                </a:extLst>
-              </a:tr>
-              <a:tr h="239050">
-                <a:tc>
-                  <a:txBody>
-                    <a:bodyPr/>
-                    <a:lstStyle/>
-                    <a:p>
-                      <a:pPr algn="ctr" latinLnBrk="1"/>
-                      <a:r>
-                        <a:rPr lang="en-US" altLang="ko-KR" sz="1100" dirty="0" err="1">
-                          <a:solidFill>
                             <a:schemeClr val="tx1"/>
                           </a:solidFill>
                         </a:rPr>
-                        <a:t>isUsed</a:t>
+                        <a:t>COUPON_ID</a:t>
                       </a:r>
                       <a:endParaRPr lang="ko-KR" altLang="en-US" sz="1100" dirty="0">
                         <a:solidFill>
@@ -10779,7 +10737,242 @@
                 </a:tc>
                 <a:extLst>
                   <a:ext uri="{0D108BD9-81ED-4DB2-BD59-A6C34878D82A}">
+                    <a16:rowId xmlns:a16="http://schemas.microsoft.com/office/drawing/2014/main" val="3610887053"/>
+                  </a:ext>
+                </a:extLst>
+              </a:tr>
+              <a:tr h="239050">
+                <a:tc>
+                  <a:txBody>
+                    <a:bodyPr/>
+                    <a:lstStyle/>
+                    <a:p>
+                      <a:pPr algn="ctr" latinLnBrk="1"/>
+                      <a:r>
+                        <a:rPr lang="en-US" altLang="ko-KR" sz="1100" dirty="0">
+                          <a:solidFill>
+                            <a:schemeClr val="tx1"/>
+                          </a:solidFill>
+                        </a:rPr>
+                        <a:t>COUPON_CONDITION</a:t>
+                      </a:r>
+                      <a:endParaRPr lang="ko-KR" altLang="en-US" sz="1100" dirty="0">
+                        <a:solidFill>
+                          <a:schemeClr val="tx1"/>
+                        </a:solidFill>
+                      </a:endParaRPr>
+                    </a:p>
+                  </a:txBody>
+                  <a:tcPr anchor="ctr"/>
+                </a:tc>
+                <a:extLst>
+                  <a:ext uri="{0D108BD9-81ED-4DB2-BD59-A6C34878D82A}">
+                    <a16:rowId xmlns:a16="http://schemas.microsoft.com/office/drawing/2014/main" val="1431156138"/>
+                  </a:ext>
+                </a:extLst>
+              </a:tr>
+              <a:tr h="239050">
+                <a:tc>
+                  <a:txBody>
+                    <a:bodyPr/>
+                    <a:lstStyle/>
+                    <a:p>
+                      <a:pPr algn="ctr" latinLnBrk="1"/>
+                      <a:r>
+                        <a:rPr lang="en-US" altLang="ko-KR" sz="1100" dirty="0">
+                          <a:solidFill>
+                            <a:schemeClr val="tx1"/>
+                          </a:solidFill>
+                        </a:rPr>
+                        <a:t>COUPON_KIND</a:t>
+                      </a:r>
+                      <a:endParaRPr lang="ko-KR" altLang="en-US" sz="1100" dirty="0">
+                        <a:solidFill>
+                          <a:schemeClr val="tx1"/>
+                        </a:solidFill>
+                      </a:endParaRPr>
+                    </a:p>
+                  </a:txBody>
+                  <a:tcPr anchor="ctr"/>
+                </a:tc>
+                <a:extLst>
+                  <a:ext uri="{0D108BD9-81ED-4DB2-BD59-A6C34878D82A}">
+                    <a16:rowId xmlns:a16="http://schemas.microsoft.com/office/drawing/2014/main" val="3029070334"/>
+                  </a:ext>
+                </a:extLst>
+              </a:tr>
+              <a:tr h="239050">
+                <a:tc>
+                  <a:txBody>
+                    <a:bodyPr/>
+                    <a:lstStyle/>
+                    <a:p>
+                      <a:pPr algn="ctr" latinLnBrk="1"/>
+                      <a:r>
+                        <a:rPr lang="en-US" altLang="ko-KR" sz="1100" dirty="0">
+                          <a:solidFill>
+                            <a:schemeClr val="tx1"/>
+                          </a:solidFill>
+                        </a:rPr>
+                        <a:t>EXPIRED_DATE</a:t>
+                      </a:r>
+                      <a:endParaRPr lang="ko-KR" altLang="en-US" sz="1100" dirty="0">
+                        <a:solidFill>
+                          <a:schemeClr val="tx1"/>
+                        </a:solidFill>
+                      </a:endParaRPr>
+                    </a:p>
+                  </a:txBody>
+                  <a:tcPr anchor="ctr"/>
+                </a:tc>
+                <a:extLst>
+                  <a:ext uri="{0D108BD9-81ED-4DB2-BD59-A6C34878D82A}">
+                    <a16:rowId xmlns:a16="http://schemas.microsoft.com/office/drawing/2014/main" val="1772206542"/>
+                  </a:ext>
+                </a:extLst>
+              </a:tr>
+              <a:tr h="239050">
+                <a:tc>
+                  <a:txBody>
+                    <a:bodyPr/>
+                    <a:lstStyle/>
+                    <a:p>
+                      <a:pPr algn="ctr" latinLnBrk="1"/>
+                      <a:r>
+                        <a:rPr lang="en-US" altLang="ko-KR" sz="1100" dirty="0">
+                          <a:solidFill>
+                            <a:schemeClr val="tx1"/>
+                          </a:solidFill>
+                        </a:rPr>
+                        <a:t>IS_USED</a:t>
+                      </a:r>
+                      <a:endParaRPr lang="ko-KR" altLang="en-US" sz="1100" dirty="0">
+                        <a:solidFill>
+                          <a:schemeClr val="tx1"/>
+                        </a:solidFill>
+                      </a:endParaRPr>
+                    </a:p>
+                  </a:txBody>
+                  <a:tcPr anchor="ctr"/>
+                </a:tc>
+                <a:extLst>
+                  <a:ext uri="{0D108BD9-81ED-4DB2-BD59-A6C34878D82A}">
+                    <a16:rowId xmlns:a16="http://schemas.microsoft.com/office/drawing/2014/main" val="3848402200"/>
+                  </a:ext>
+                </a:extLst>
+              </a:tr>
+              <a:tr h="239050">
+                <a:tc>
+                  <a:txBody>
+                    <a:bodyPr/>
+                    <a:lstStyle/>
+                    <a:p>
+                      <a:pPr algn="ctr" latinLnBrk="1"/>
+                      <a:r>
+                        <a:rPr lang="en-US" altLang="ko-KR" sz="1100" dirty="0">
+                          <a:solidFill>
+                            <a:schemeClr val="tx1"/>
+                          </a:solidFill>
+                        </a:rPr>
+                        <a:t>NAME</a:t>
+                      </a:r>
+                    </a:p>
+                  </a:txBody>
+                  <a:tcPr anchor="ctr"/>
+                </a:tc>
+                <a:extLst>
+                  <a:ext uri="{0D108BD9-81ED-4DB2-BD59-A6C34878D82A}">
+                    <a16:rowId xmlns:a16="http://schemas.microsoft.com/office/drawing/2014/main" val="3459395171"/>
+                  </a:ext>
+                </a:extLst>
+              </a:tr>
+              <a:tr h="239050">
+                <a:tc>
+                  <a:txBody>
+                    <a:bodyPr/>
+                    <a:lstStyle/>
+                    <a:p>
+                      <a:pPr algn="ctr" latinLnBrk="1"/>
+                      <a:r>
+                        <a:rPr lang="en-US" altLang="ko-KR" sz="1100" dirty="0">
+                          <a:solidFill>
+                            <a:schemeClr val="tx1"/>
+                          </a:solidFill>
+                        </a:rPr>
+                        <a:t>RATE</a:t>
+                      </a:r>
+                      <a:endParaRPr lang="ko-KR" altLang="en-US" sz="1100" dirty="0">
+                        <a:solidFill>
+                          <a:schemeClr val="tx1"/>
+                        </a:solidFill>
+                      </a:endParaRPr>
+                    </a:p>
+                  </a:txBody>
+                  <a:tcPr anchor="ctr"/>
+                </a:tc>
+                <a:extLst>
+                  <a:ext uri="{0D108BD9-81ED-4DB2-BD59-A6C34878D82A}">
+                    <a16:rowId xmlns:a16="http://schemas.microsoft.com/office/drawing/2014/main" val="2026906847"/>
+                  </a:ext>
+                </a:extLst>
+              </a:tr>
+              <a:tr h="239050">
+                <a:tc>
+                  <a:txBody>
+                    <a:bodyPr/>
+                    <a:lstStyle/>
+                    <a:p>
+                      <a:pPr algn="ctr" latinLnBrk="1"/>
+                      <a:r>
+                        <a:rPr lang="en-US" altLang="ko-KR" sz="1100" dirty="0">
+                          <a:solidFill>
+                            <a:schemeClr val="tx1"/>
+                          </a:solidFill>
+                        </a:rPr>
+                        <a:t>SERIAL_NUMBER</a:t>
+                      </a:r>
+                      <a:endParaRPr lang="ko-KR" altLang="en-US" sz="1100" dirty="0">
+                        <a:solidFill>
+                          <a:schemeClr val="tx1"/>
+                        </a:solidFill>
+                      </a:endParaRPr>
+                    </a:p>
+                  </a:txBody>
+                  <a:tcPr anchor="ctr"/>
+                </a:tc>
+                <a:extLst>
+                  <a:ext uri="{0D108BD9-81ED-4DB2-BD59-A6C34878D82A}">
                     <a16:rowId xmlns:a16="http://schemas.microsoft.com/office/drawing/2014/main" val="1471570891"/>
+                  </a:ext>
+                </a:extLst>
+              </a:tr>
+              <a:tr h="239050">
+                <a:tc>
+                  <a:txBody>
+                    <a:bodyPr/>
+                    <a:lstStyle/>
+                    <a:p>
+                      <a:pPr algn="ctr" latinLnBrk="1"/>
+                      <a:r>
+                        <a:rPr lang="en-US" altLang="ko-KR" sz="1100" dirty="0">
+                          <a:solidFill>
+                            <a:schemeClr val="tx1"/>
+                          </a:solidFill>
+                        </a:rPr>
+                        <a:t>MEMBER_ID</a:t>
+                      </a:r>
+                      <a:endParaRPr lang="ko-KR" altLang="en-US" sz="1100" dirty="0">
+                        <a:solidFill>
+                          <a:schemeClr val="tx1"/>
+                        </a:solidFill>
+                      </a:endParaRPr>
+                    </a:p>
+                  </a:txBody>
+                  <a:tcPr anchor="ctr"/>
+                </a:tc>
+                <a:extLst>
+                  <a:ext uri="{0D108BD9-81ED-4DB2-BD59-A6C34878D82A}">
+                    <a16:rowId xmlns:a16="http://schemas.microsoft.com/office/drawing/2014/main" val="3183836266"/>
                   </a:ext>
                 </a:extLst>
               </a:tr>
@@ -10802,14 +10995,14 @@
           <p:nvPr>
             <p:extLst>
               <p:ext uri="{D42A27DB-BD31-4B8C-83A1-F6EECF244321}">
-                <p14:modId xmlns:p14="http://schemas.microsoft.com/office/powerpoint/2010/main" val="1593458641"/>
+                <p14:modId xmlns:p14="http://schemas.microsoft.com/office/powerpoint/2010/main" val="162959061"/>
               </p:ext>
             </p:extLst>
           </p:nvPr>
         </p:nvGraphicFramePr>
         <p:xfrm>
-          <a:off x="6445313" y="1522053"/>
-          <a:ext cx="1685567" cy="4145280"/>
+          <a:off x="8094342" y="425976"/>
+          <a:ext cx="1685567" cy="3108960"/>
         </p:xfrm>
         <a:graphic>
           <a:graphicData uri="http://schemas.openxmlformats.org/drawingml/2006/table">
@@ -10856,12 +11049,12 @@
                     <a:p>
                       <a:pPr algn="ctr" latinLnBrk="1"/>
                       <a:r>
-                        <a:rPr lang="en-US" altLang="ko-KR" sz="1100" dirty="0" err="1">
+                        <a:rPr lang="en-US" altLang="ko-KR" sz="1100" dirty="0">
                           <a:solidFill>
                             <a:schemeClr val="tx1"/>
                           </a:solidFill>
                         </a:rPr>
-                        <a:t>item_state</a:t>
+                        <a:t>ITEM_ID</a:t>
                       </a:r>
                       <a:endParaRPr lang="ko-KR" altLang="en-US" sz="1100" dirty="0">
                         <a:solidFill>
@@ -10888,144 +11081,10 @@
                       <a:r>
                         <a:rPr lang="en-US" altLang="ko-KR" sz="1100" dirty="0">
                           <a:solidFill>
-                            <a:srgbClr val="C00000"/>
-                          </a:solidFill>
-                        </a:rPr>
-                        <a:t>Thumbnail 1:1</a:t>
-                      </a:r>
-                      <a:endParaRPr lang="ko-KR" altLang="en-US" sz="1100" dirty="0">
-                        <a:solidFill>
-                          <a:srgbClr val="C00000"/>
-                        </a:solidFill>
-                      </a:endParaRPr>
-                    </a:p>
-                  </a:txBody>
-                  <a:tcPr anchor="ctr"/>
-                </a:tc>
-                <a:extLst>
-                  <a:ext uri="{0D108BD9-81ED-4DB2-BD59-A6C34878D82A}">
-                    <a16:rowId xmlns:a16="http://schemas.microsoft.com/office/drawing/2014/main" val="1431156138"/>
-                  </a:ext>
-                </a:extLst>
-              </a:tr>
-              <a:tr h="239050">
-                <a:tc>
-                  <a:txBody>
-                    <a:bodyPr/>
-                    <a:lstStyle/>
-                    <a:p>
-                      <a:pPr algn="ctr" latinLnBrk="1"/>
-                      <a:r>
-                        <a:rPr lang="en-US" altLang="ko-KR" sz="1100" dirty="0" err="1">
-                          <a:solidFill>
-                            <a:srgbClr val="C00000"/>
-                          </a:solidFill>
-                        </a:rPr>
-                        <a:t>Admin_member</a:t>
-                      </a:r>
-                      <a:r>
-                        <a:rPr lang="en-US" altLang="ko-KR" sz="1100" dirty="0">
-                          <a:solidFill>
-                            <a:srgbClr val="C00000"/>
-                          </a:solidFill>
-                        </a:rPr>
-                        <a:t> N:1</a:t>
-                      </a:r>
-                      <a:endParaRPr lang="ko-KR" altLang="en-US" sz="1100" dirty="0">
-                        <a:solidFill>
-                          <a:srgbClr val="C00000"/>
-                        </a:solidFill>
-                      </a:endParaRPr>
-                    </a:p>
-                  </a:txBody>
-                  <a:tcPr anchor="ctr"/>
-                </a:tc>
-                <a:extLst>
-                  <a:ext uri="{0D108BD9-81ED-4DB2-BD59-A6C34878D82A}">
-                    <a16:rowId xmlns:a16="http://schemas.microsoft.com/office/drawing/2014/main" val="65395760"/>
-                  </a:ext>
-                </a:extLst>
-              </a:tr>
-              <a:tr h="239050">
-                <a:tc>
-                  <a:txBody>
-                    <a:bodyPr/>
-                    <a:lstStyle/>
-                    <a:p>
-                      <a:pPr algn="ctr" latinLnBrk="1"/>
-                      <a:r>
-                        <a:rPr lang="en-US" altLang="ko-KR" sz="1100" dirty="0"/>
-                        <a:t>name</a:t>
-                      </a:r>
-                      <a:endParaRPr lang="ko-KR" altLang="en-US" sz="1100" dirty="0"/>
-                    </a:p>
-                  </a:txBody>
-                  <a:tcPr anchor="ctr"/>
-                </a:tc>
-                <a:extLst>
-                  <a:ext uri="{0D108BD9-81ED-4DB2-BD59-A6C34878D82A}">
-                    <a16:rowId xmlns:a16="http://schemas.microsoft.com/office/drawing/2014/main" val="1930579698"/>
-                  </a:ext>
-                </a:extLst>
-              </a:tr>
-              <a:tr h="239050">
-                <a:tc>
-                  <a:txBody>
-                    <a:bodyPr/>
-                    <a:lstStyle/>
-                    <a:p>
-                      <a:pPr algn="ctr" latinLnBrk="1"/>
-                      <a:r>
-                        <a:rPr lang="en-US" altLang="ko-KR" sz="1100" dirty="0"/>
-                        <a:t>price</a:t>
-                      </a:r>
-                      <a:endParaRPr lang="ko-KR" altLang="en-US" sz="1100" dirty="0"/>
-                    </a:p>
-                  </a:txBody>
-                  <a:tcPr anchor="ctr"/>
-                </a:tc>
-                <a:extLst>
-                  <a:ext uri="{0D108BD9-81ED-4DB2-BD59-A6C34878D82A}">
-                    <a16:rowId xmlns:a16="http://schemas.microsoft.com/office/drawing/2014/main" val="1201544431"/>
-                  </a:ext>
-                </a:extLst>
-              </a:tr>
-              <a:tr h="239050">
-                <a:tc>
-                  <a:txBody>
-                    <a:bodyPr/>
-                    <a:lstStyle/>
-                    <a:p>
-                      <a:pPr algn="ctr" latinLnBrk="1"/>
-                      <a:r>
-                        <a:rPr lang="en-US" altLang="ko-KR" sz="1100" dirty="0" err="1"/>
-                        <a:t>preference_count</a:t>
-                      </a:r>
-                      <a:endParaRPr lang="ko-KR" altLang="en-US" sz="1100" dirty="0"/>
-                    </a:p>
-                  </a:txBody>
-                  <a:tcPr anchor="ctr"/>
-                </a:tc>
-                <a:extLst>
-                  <a:ext uri="{0D108BD9-81ED-4DB2-BD59-A6C34878D82A}">
-                    <a16:rowId xmlns:a16="http://schemas.microsoft.com/office/drawing/2014/main" val="3029070334"/>
-                  </a:ext>
-                </a:extLst>
-              </a:tr>
-              <a:tr h="239050">
-                <a:tc>
-                  <a:txBody>
-                    <a:bodyPr/>
-                    <a:lstStyle/>
-                    <a:p>
-                      <a:pPr algn="ctr" latinLnBrk="1"/>
-                      <a:r>
-                        <a:rPr lang="en-US" altLang="ko-KR" sz="1100" dirty="0" err="1">
-                          <a:solidFill>
                             <a:schemeClr val="tx1"/>
                           </a:solidFill>
                         </a:rPr>
-                        <a:t>registry_date</a:t>
+                        <a:t>ITEM_STATE</a:t>
                       </a:r>
                       <a:endParaRPr lang="ko-KR" altLang="en-US" sz="1100" dirty="0">
                         <a:solidFill>
@@ -11038,51 +11097,7 @@
                 </a:tc>
                 <a:extLst>
                   <a:ext uri="{0D108BD9-81ED-4DB2-BD59-A6C34878D82A}">
-                    <a16:rowId xmlns:a16="http://schemas.microsoft.com/office/drawing/2014/main" val="1772206542"/>
-                  </a:ext>
-                </a:extLst>
-              </a:tr>
-              <a:tr h="239050">
-                <a:tc>
-                  <a:txBody>
-                    <a:bodyPr/>
-                    <a:lstStyle/>
-                    <a:p>
-                      <a:pPr algn="ctr" latinLnBrk="1"/>
-                      <a:r>
-                        <a:rPr lang="en-US" altLang="ko-KR" sz="1100" dirty="0"/>
-                        <a:t>version</a:t>
-                      </a:r>
-                      <a:endParaRPr lang="ko-KR" altLang="en-US" sz="1100" dirty="0"/>
-                    </a:p>
-                  </a:txBody>
-                  <a:tcPr anchor="ctr"/>
-                </a:tc>
-                <a:extLst>
-                  <a:ext uri="{0D108BD9-81ED-4DB2-BD59-A6C34878D82A}">
-                    <a16:rowId xmlns:a16="http://schemas.microsoft.com/office/drawing/2014/main" val="1771303497"/>
-                  </a:ext>
-                </a:extLst>
-              </a:tr>
-              <a:tr h="239050">
-                <a:tc>
-                  <a:txBody>
-                    <a:bodyPr/>
-                    <a:lstStyle/>
-                    <a:p>
-                      <a:pPr algn="ctr" latinLnBrk="1"/>
-                      <a:r>
-                        <a:rPr lang="en-US" altLang="ko-KR" sz="1100" dirty="0"/>
-                        <a:t>sale</a:t>
-                      </a:r>
-                      <a:endParaRPr lang="ko-KR" altLang="en-US" sz="1100" dirty="0"/>
-                    </a:p>
-                  </a:txBody>
-                  <a:tcPr anchor="ctr"/>
-                </a:tc>
-                <a:extLst>
-                  <a:ext uri="{0D108BD9-81ED-4DB2-BD59-A6C34878D82A}">
-                    <a16:rowId xmlns:a16="http://schemas.microsoft.com/office/drawing/2014/main" val="2543635310"/>
+                    <a16:rowId xmlns:a16="http://schemas.microsoft.com/office/drawing/2014/main" val="1431156138"/>
                   </a:ext>
                 </a:extLst>
               </a:tr>
@@ -11096,30 +11111,14 @@
                       <a:r>
                         <a:rPr lang="en-US" altLang="ko-KR" sz="1100" dirty="0">
                           <a:solidFill>
-                            <a:srgbClr val="0070C0"/>
-                          </a:solidFill>
-                        </a:rPr>
-                        <a:t>List&lt;</a:t>
-                      </a:r>
-                      <a:r>
-                        <a:rPr lang="en-US" altLang="ko-KR" sz="1100" dirty="0" err="1">
-                          <a:solidFill>
-                            <a:srgbClr val="0070C0"/>
-                          </a:solidFill>
-                        </a:rPr>
-                        <a:t>Category_item</a:t>
-                      </a:r>
-                      <a:r>
-                        <a:rPr lang="en-US" altLang="ko-KR" sz="1100" dirty="0">
-                          <a:solidFill>
-                            <a:srgbClr val="0070C0"/>
-                          </a:solidFill>
-                        </a:rPr>
-                        <a:t>&gt;</a:t>
+                            <a:schemeClr val="tx1"/>
+                          </a:solidFill>
+                        </a:rPr>
+                        <a:t>NAME</a:t>
                       </a:r>
                       <a:endParaRPr lang="ko-KR" altLang="en-US" sz="1100" dirty="0">
                         <a:solidFill>
-                          <a:srgbClr val="0070C0"/>
+                          <a:schemeClr val="tx1"/>
                         </a:solidFill>
                       </a:endParaRPr>
                     </a:p>
@@ -11128,7 +11127,7 @@
                 </a:tc>
                 <a:extLst>
                   <a:ext uri="{0D108BD9-81ED-4DB2-BD59-A6C34878D82A}">
-                    <a16:rowId xmlns:a16="http://schemas.microsoft.com/office/drawing/2014/main" val="2682673113"/>
+                    <a16:rowId xmlns:a16="http://schemas.microsoft.com/office/drawing/2014/main" val="65395760"/>
                   </a:ext>
                 </a:extLst>
               </a:tr>
@@ -11142,30 +11141,14 @@
                       <a:r>
                         <a:rPr lang="en-US" altLang="ko-KR" sz="1100" dirty="0">
                           <a:solidFill>
-                            <a:srgbClr val="0070C0"/>
-                          </a:solidFill>
-                        </a:rPr>
-                        <a:t>List&lt;</a:t>
-                      </a:r>
-                      <a:r>
-                        <a:rPr lang="en-US" altLang="ko-KR" sz="1100" dirty="0" err="1">
-                          <a:solidFill>
-                            <a:srgbClr val="0070C0"/>
-                          </a:solidFill>
-                        </a:rPr>
-                        <a:t>Detail_image</a:t>
-                      </a:r>
-                      <a:r>
-                        <a:rPr lang="en-US" altLang="ko-KR" sz="1100" dirty="0">
-                          <a:solidFill>
-                            <a:srgbClr val="0070C0"/>
-                          </a:solidFill>
-                        </a:rPr>
-                        <a:t>&gt;</a:t>
+                            <a:schemeClr val="tx1"/>
+                          </a:solidFill>
+                        </a:rPr>
+                        <a:t>PREFERENCE_COUNT</a:t>
                       </a:r>
                       <a:endParaRPr lang="ko-KR" altLang="en-US" sz="1100" dirty="0">
                         <a:solidFill>
-                          <a:srgbClr val="0070C0"/>
+                          <a:schemeClr val="tx1"/>
                         </a:solidFill>
                       </a:endParaRPr>
                     </a:p>
@@ -11174,7 +11157,7 @@
                 </a:tc>
                 <a:extLst>
                   <a:ext uri="{0D108BD9-81ED-4DB2-BD59-A6C34878D82A}">
-                    <a16:rowId xmlns:a16="http://schemas.microsoft.com/office/drawing/2014/main" val="3228376060"/>
+                    <a16:rowId xmlns:a16="http://schemas.microsoft.com/office/drawing/2014/main" val="1930579698"/>
                   </a:ext>
                 </a:extLst>
               </a:tr>
@@ -11188,30 +11171,14 @@
                       <a:r>
                         <a:rPr lang="en-US" altLang="ko-KR" sz="1100" dirty="0">
                           <a:solidFill>
-                            <a:srgbClr val="0070C0"/>
-                          </a:solidFill>
-                        </a:rPr>
-                        <a:t>List&lt;</a:t>
-                      </a:r>
-                      <a:r>
-                        <a:rPr lang="en-US" altLang="ko-KR" sz="1100" dirty="0" err="1">
-                          <a:solidFill>
-                            <a:srgbClr val="0070C0"/>
-                          </a:solidFill>
-                        </a:rPr>
-                        <a:t>QnA</a:t>
-                      </a:r>
-                      <a:r>
-                        <a:rPr lang="en-US" altLang="ko-KR" sz="1100" dirty="0">
-                          <a:solidFill>
-                            <a:srgbClr val="0070C0"/>
-                          </a:solidFill>
-                        </a:rPr>
-                        <a:t>&gt;</a:t>
+                            <a:schemeClr val="tx1"/>
+                          </a:solidFill>
+                        </a:rPr>
+                        <a:t>PRICE</a:t>
                       </a:r>
                       <a:endParaRPr lang="ko-KR" altLang="en-US" sz="1100" dirty="0">
                         <a:solidFill>
-                          <a:srgbClr val="0070C0"/>
+                          <a:schemeClr val="tx1"/>
                         </a:solidFill>
                       </a:endParaRPr>
                     </a:p>
@@ -11220,7 +11187,7 @@
                 </a:tc>
                 <a:extLst>
                   <a:ext uri="{0D108BD9-81ED-4DB2-BD59-A6C34878D82A}">
-                    <a16:rowId xmlns:a16="http://schemas.microsoft.com/office/drawing/2014/main" val="877702539"/>
+                    <a16:rowId xmlns:a16="http://schemas.microsoft.com/office/drawing/2014/main" val="1201544431"/>
                   </a:ext>
                 </a:extLst>
               </a:tr>
@@ -11234,14 +11201,14 @@
                       <a:r>
                         <a:rPr lang="en-US" altLang="ko-KR" sz="1100" dirty="0">
                           <a:solidFill>
-                            <a:srgbClr val="0070C0"/>
-                          </a:solidFill>
-                        </a:rPr>
-                        <a:t>List&lt;Review&gt;</a:t>
+                            <a:schemeClr val="tx1"/>
+                          </a:solidFill>
+                        </a:rPr>
+                        <a:t>REGISTRY_DATE</a:t>
                       </a:r>
                       <a:endParaRPr lang="ko-KR" altLang="en-US" sz="1100" dirty="0">
                         <a:solidFill>
-                          <a:srgbClr val="0070C0"/>
+                          <a:schemeClr val="tx1"/>
                         </a:solidFill>
                       </a:endParaRPr>
                     </a:p>
@@ -11250,7 +11217,7 @@
                 </a:tc>
                 <a:extLst>
                   <a:ext uri="{0D108BD9-81ED-4DB2-BD59-A6C34878D82A}">
-                    <a16:rowId xmlns:a16="http://schemas.microsoft.com/office/drawing/2014/main" val="3562315353"/>
+                    <a16:rowId xmlns:a16="http://schemas.microsoft.com/office/drawing/2014/main" val="3029070334"/>
                   </a:ext>
                 </a:extLst>
               </a:tr>
@@ -11264,30 +11231,14 @@
                       <a:r>
                         <a:rPr lang="en-US" altLang="ko-KR" sz="1100" dirty="0">
                           <a:solidFill>
-                            <a:srgbClr val="0070C0"/>
-                          </a:solidFill>
-                        </a:rPr>
-                        <a:t>List&lt;</a:t>
-                      </a:r>
-                      <a:r>
-                        <a:rPr lang="en-US" altLang="ko-KR" sz="1100" dirty="0" err="1">
-                          <a:solidFill>
-                            <a:srgbClr val="0070C0"/>
-                          </a:solidFill>
-                        </a:rPr>
-                        <a:t>Item_image</a:t>
-                      </a:r>
-                      <a:r>
-                        <a:rPr lang="en-US" altLang="ko-KR" sz="1100" dirty="0">
-                          <a:solidFill>
-                            <a:srgbClr val="0070C0"/>
-                          </a:solidFill>
-                        </a:rPr>
-                        <a:t>&gt;</a:t>
+                            <a:schemeClr val="tx1"/>
+                          </a:solidFill>
+                        </a:rPr>
+                        <a:t>SALE</a:t>
                       </a:r>
                       <a:endParaRPr lang="ko-KR" altLang="en-US" sz="1100" dirty="0">
                         <a:solidFill>
-                          <a:srgbClr val="0070C0"/>
+                          <a:schemeClr val="tx1"/>
                         </a:solidFill>
                       </a:endParaRPr>
                     </a:p>
@@ -11296,7 +11247,7 @@
                 </a:tc>
                 <a:extLst>
                   <a:ext uri="{0D108BD9-81ED-4DB2-BD59-A6C34878D82A}">
-                    <a16:rowId xmlns:a16="http://schemas.microsoft.com/office/drawing/2014/main" val="3616753289"/>
+                    <a16:rowId xmlns:a16="http://schemas.microsoft.com/office/drawing/2014/main" val="1772206542"/>
                   </a:ext>
                 </a:extLst>
               </a:tr>
@@ -11310,14 +11261,14 @@
                       <a:r>
                         <a:rPr lang="en-US" altLang="ko-KR" sz="1100" dirty="0">
                           <a:solidFill>
-                            <a:srgbClr val="0070C0"/>
-                          </a:solidFill>
-                        </a:rPr>
-                        <a:t>List&lt;Option&gt;</a:t>
+                            <a:schemeClr val="tx1"/>
+                          </a:solidFill>
+                        </a:rPr>
+                        <a:t>VERSION</a:t>
                       </a:r>
                       <a:endParaRPr lang="ko-KR" altLang="en-US" sz="1100" dirty="0">
                         <a:solidFill>
-                          <a:srgbClr val="0070C0"/>
+                          <a:schemeClr val="tx1"/>
                         </a:solidFill>
                       </a:endParaRPr>
                     </a:p>
@@ -11326,7 +11277,97 @@
                 </a:tc>
                 <a:extLst>
                   <a:ext uri="{0D108BD9-81ED-4DB2-BD59-A6C34878D82A}">
-                    <a16:rowId xmlns:a16="http://schemas.microsoft.com/office/drawing/2014/main" val="2856554535"/>
+                    <a16:rowId xmlns:a16="http://schemas.microsoft.com/office/drawing/2014/main" val="1771303497"/>
+                  </a:ext>
+                </a:extLst>
+              </a:tr>
+              <a:tr h="239050">
+                <a:tc>
+                  <a:txBody>
+                    <a:bodyPr/>
+                    <a:lstStyle/>
+                    <a:p>
+                      <a:pPr algn="ctr" latinLnBrk="1"/>
+                      <a:r>
+                        <a:rPr lang="en-US" altLang="ko-KR" sz="1100" dirty="0">
+                          <a:solidFill>
+                            <a:schemeClr val="tx1"/>
+                          </a:solidFill>
+                        </a:rPr>
+                        <a:t>ADMIN_MEMBER_ID</a:t>
+                      </a:r>
+                      <a:endParaRPr lang="ko-KR" altLang="en-US" sz="1100" dirty="0">
+                        <a:solidFill>
+                          <a:schemeClr val="tx1"/>
+                        </a:solidFill>
+                      </a:endParaRPr>
+                    </a:p>
+                  </a:txBody>
+                  <a:tcPr anchor="ctr"/>
+                </a:tc>
+                <a:extLst>
+                  <a:ext uri="{0D108BD9-81ED-4DB2-BD59-A6C34878D82A}">
+                    <a16:rowId xmlns:a16="http://schemas.microsoft.com/office/drawing/2014/main" val="2543635310"/>
+                  </a:ext>
+                </a:extLst>
+              </a:tr>
+              <a:tr h="239050">
+                <a:tc>
+                  <a:txBody>
+                    <a:bodyPr/>
+                    <a:lstStyle/>
+                    <a:p>
+                      <a:pPr algn="ctr" latinLnBrk="1"/>
+                      <a:r>
+                        <a:rPr lang="en-US" altLang="ko-KR" sz="1100" dirty="0">
+                          <a:solidFill>
+                            <a:schemeClr val="tx1"/>
+                          </a:solidFill>
+                        </a:rPr>
+                        <a:t>CATEGORY_ID</a:t>
+                      </a:r>
+                      <a:endParaRPr lang="ko-KR" altLang="en-US" sz="1100" dirty="0">
+                        <a:solidFill>
+                          <a:schemeClr val="tx1"/>
+                        </a:solidFill>
+                      </a:endParaRPr>
+                    </a:p>
+                  </a:txBody>
+                  <a:tcPr anchor="ctr"/>
+                </a:tc>
+                <a:extLst>
+                  <a:ext uri="{0D108BD9-81ED-4DB2-BD59-A6C34878D82A}">
+                    <a16:rowId xmlns:a16="http://schemas.microsoft.com/office/drawing/2014/main" val="2682673113"/>
+                  </a:ext>
+                </a:extLst>
+              </a:tr>
+              <a:tr h="239050">
+                <a:tc>
+                  <a:txBody>
+                    <a:bodyPr/>
+                    <a:lstStyle/>
+                    <a:p>
+                      <a:pPr algn="ctr" latinLnBrk="1"/>
+                      <a:r>
+                        <a:rPr lang="en-US" altLang="ko-KR" sz="1100" dirty="0">
+                          <a:solidFill>
+                            <a:schemeClr val="tx1"/>
+                          </a:solidFill>
+                        </a:rPr>
+                        <a:t>THUMBNAIL_ID</a:t>
+                      </a:r>
+                      <a:endParaRPr lang="ko-KR" altLang="en-US" sz="1100" dirty="0">
+                        <a:solidFill>
+                          <a:schemeClr val="tx1"/>
+                        </a:solidFill>
+                      </a:endParaRPr>
+                    </a:p>
+                  </a:txBody>
+                  <a:tcPr anchor="ctr"/>
+                </a:tc>
+                <a:extLst>
+                  <a:ext uri="{0D108BD9-81ED-4DB2-BD59-A6C34878D82A}">
+                    <a16:rowId xmlns:a16="http://schemas.microsoft.com/office/drawing/2014/main" val="3228376060"/>
                   </a:ext>
                 </a:extLst>
               </a:tr>
@@ -11349,14 +11390,14 @@
           <p:nvPr>
             <p:extLst>
               <p:ext uri="{D42A27DB-BD31-4B8C-83A1-F6EECF244321}">
-                <p14:modId xmlns:p14="http://schemas.microsoft.com/office/powerpoint/2010/main" val="7434612"/>
+                <p14:modId xmlns:p14="http://schemas.microsoft.com/office/powerpoint/2010/main" val="1691858085"/>
               </p:ext>
             </p:extLst>
           </p:nvPr>
         </p:nvGraphicFramePr>
         <p:xfrm>
-          <a:off x="7222908" y="5747220"/>
-          <a:ext cx="1156368" cy="1036320"/>
+          <a:off x="7897075" y="5412783"/>
+          <a:ext cx="1353635" cy="1295400"/>
         </p:xfrm>
         <a:graphic>
           <a:graphicData uri="http://schemas.openxmlformats.org/drawingml/2006/table">
@@ -11365,7 +11406,7 @@
                 <a:tableStyleId>{5C22544A-7EE6-4342-B048-85BDC9FD1C3A}</a:tableStyleId>
               </a:tblPr>
               <a:tblGrid>
-                <a:gridCol w="1156368">
+                <a:gridCol w="1353635">
                   <a:extLst>
                     <a:ext uri="{9D8B030D-6E8A-4147-A177-3AD203B41FA5}">
                       <a16:colId xmlns:a16="http://schemas.microsoft.com/office/drawing/2014/main" val="329139778"/>
@@ -11419,12 +11460,8 @@
                         <a:defRPr/>
                       </a:pPr>
                       <a:r>
-                        <a:rPr lang="en-US" altLang="ko-KR" sz="1100" dirty="0">
-                          <a:solidFill>
-                            <a:srgbClr val="C00000"/>
-                          </a:solidFill>
-                        </a:rPr>
-                        <a:t>Item N:1</a:t>
+                        <a:rPr lang="en-US" altLang="ko-KR" sz="1100" dirty="0"/>
+                        <a:t>ITEM_IMAGE_ID</a:t>
                       </a:r>
                       <a:endParaRPr lang="ko-KR" altLang="en-US" sz="1100" dirty="0"/>
                     </a:p>
@@ -11445,8 +11482,8 @@
                     <a:p>
                       <a:pPr algn="ctr" latinLnBrk="1"/>
                       <a:r>
-                        <a:rPr lang="en-US" altLang="ko-KR" sz="1100" dirty="0" err="1"/>
-                        <a:t>upload_name</a:t>
+                        <a:rPr lang="en-US" altLang="ko-KR" sz="1100" dirty="0"/>
+                        <a:t>STORE_NAME</a:t>
                       </a:r>
                       <a:endParaRPr lang="ko-KR" altLang="en-US" sz="1100" dirty="0"/>
                     </a:p>
@@ -11467,8 +11504,8 @@
                     <a:p>
                       <a:pPr algn="ctr" latinLnBrk="1"/>
                       <a:r>
-                        <a:rPr lang="en-US" altLang="ko-KR" sz="1100" dirty="0" err="1"/>
-                        <a:t>store_name</a:t>
+                        <a:rPr lang="en-US" altLang="ko-KR" sz="1100" dirty="0"/>
+                        <a:t>UPLOAD_NAME</a:t>
                       </a:r>
                       <a:endParaRPr lang="ko-KR" altLang="en-US" sz="1100" dirty="0"/>
                     </a:p>
@@ -11478,6 +11515,28 @@
                 <a:extLst>
                   <a:ext uri="{0D108BD9-81ED-4DB2-BD59-A6C34878D82A}">
                     <a16:rowId xmlns:a16="http://schemas.microsoft.com/office/drawing/2014/main" val="3029070334"/>
+                  </a:ext>
+                </a:extLst>
+              </a:tr>
+              <a:tr h="239050">
+                <a:tc>
+                  <a:txBody>
+                    <a:bodyPr/>
+                    <a:lstStyle/>
+                    <a:p>
+                      <a:pPr algn="ctr" latinLnBrk="1"/>
+                      <a:r>
+                        <a:rPr lang="en-US" altLang="ko-KR" sz="1100" dirty="0"/>
+                        <a:t>ITEM_ID</a:t>
+                      </a:r>
+                      <a:endParaRPr lang="ko-KR" altLang="en-US" sz="1100" dirty="0"/>
+                    </a:p>
+                  </a:txBody>
+                  <a:tcPr anchor="ctr"/>
+                </a:tc>
+                <a:extLst>
+                  <a:ext uri="{0D108BD9-81ED-4DB2-BD59-A6C34878D82A}">
+                    <a16:rowId xmlns:a16="http://schemas.microsoft.com/office/drawing/2014/main" val="641896097"/>
                   </a:ext>
                 </a:extLst>
               </a:tr>
@@ -11500,13 +11559,13 @@
           <p:nvPr>
             <p:extLst>
               <p:ext uri="{D42A27DB-BD31-4B8C-83A1-F6EECF244321}">
-                <p14:modId xmlns:p14="http://schemas.microsoft.com/office/powerpoint/2010/main" val="3162581041"/>
+                <p14:modId xmlns:p14="http://schemas.microsoft.com/office/powerpoint/2010/main" val="130290088"/>
               </p:ext>
             </p:extLst>
           </p:nvPr>
         </p:nvGraphicFramePr>
         <p:xfrm>
-          <a:off x="10199153" y="1492425"/>
+          <a:off x="10043689" y="411645"/>
           <a:ext cx="1572413" cy="777240"/>
         </p:xfrm>
         <a:graphic>
@@ -11570,10 +11629,18 @@
                         <a:defRPr/>
                       </a:pPr>
                       <a:r>
-                        <a:rPr lang="en-US" altLang="ko-KR" sz="1100" dirty="0"/>
-                        <a:t>name</a:t>
-                      </a:r>
-                      <a:endParaRPr lang="ko-KR" altLang="en-US" sz="1100" dirty="0"/>
+                        <a:rPr lang="en-US" altLang="ko-KR" sz="1100" dirty="0">
+                          <a:solidFill>
+                            <a:schemeClr val="tx1"/>
+                          </a:solidFill>
+                        </a:rPr>
+                        <a:t>CATEGORY_ID</a:t>
+                      </a:r>
+                      <a:endParaRPr lang="ko-KR" altLang="en-US" sz="1100" dirty="0">
+                        <a:solidFill>
+                          <a:schemeClr val="tx1"/>
+                        </a:solidFill>
+                      </a:endParaRPr>
                     </a:p>
                   </a:txBody>
                   <a:tcPr anchor="ctr"/>
@@ -11610,30 +11677,14 @@
                       <a:r>
                         <a:rPr lang="en-US" altLang="ko-KR" sz="1100" dirty="0">
                           <a:solidFill>
-                            <a:srgbClr val="0070C0"/>
-                          </a:solidFill>
-                        </a:rPr>
-                        <a:t>List&lt;</a:t>
-                      </a:r>
-                      <a:r>
-                        <a:rPr lang="en-US" altLang="ko-KR" sz="1100" dirty="0" err="1">
-                          <a:solidFill>
-                            <a:srgbClr val="0070C0"/>
-                          </a:solidFill>
-                        </a:rPr>
-                        <a:t>Category_item</a:t>
-                      </a:r>
-                      <a:r>
-                        <a:rPr lang="en-US" altLang="ko-KR" sz="1100" dirty="0">
-                          <a:solidFill>
-                            <a:srgbClr val="0070C0"/>
-                          </a:solidFill>
-                        </a:rPr>
-                        <a:t>&gt;</a:t>
+                            <a:schemeClr val="tx1"/>
+                          </a:solidFill>
+                        </a:rPr>
+                        <a:t>NAME</a:t>
                       </a:r>
                       <a:endParaRPr lang="ko-KR" altLang="en-US" sz="1100" dirty="0">
                         <a:solidFill>
-                          <a:srgbClr val="0070C0"/>
+                          <a:schemeClr val="tx1"/>
                         </a:solidFill>
                       </a:endParaRPr>
                     </a:p>
@@ -11665,14 +11716,14 @@
           <p:nvPr>
             <p:extLst>
               <p:ext uri="{D42A27DB-BD31-4B8C-83A1-F6EECF244321}">
-                <p14:modId xmlns:p14="http://schemas.microsoft.com/office/powerpoint/2010/main" val="1807935080"/>
+                <p14:modId xmlns:p14="http://schemas.microsoft.com/office/powerpoint/2010/main" val="810868007"/>
               </p:ext>
             </p:extLst>
           </p:nvPr>
         </p:nvGraphicFramePr>
         <p:xfrm>
-          <a:off x="4103560" y="2965781"/>
-          <a:ext cx="1284824" cy="2240280"/>
+          <a:off x="5497510" y="191453"/>
+          <a:ext cx="1572413" cy="3108960"/>
         </p:xfrm>
         <a:graphic>
           <a:graphicData uri="http://schemas.openxmlformats.org/drawingml/2006/table">
@@ -11681,7 +11732,7 @@
                 <a:tableStyleId>{5C22544A-7EE6-4342-B048-85BDC9FD1C3A}</a:tableStyleId>
               </a:tblPr>
               <a:tblGrid>
-                <a:gridCol w="1284824">
+                <a:gridCol w="1572413">
                   <a:extLst>
                     <a:ext uri="{9D8B030D-6E8A-4147-A177-3AD203B41FA5}">
                       <a16:colId xmlns:a16="http://schemas.microsoft.com/office/drawing/2014/main" val="329139778"/>
@@ -11737,14 +11788,14 @@
                       <a:r>
                         <a:rPr lang="en-US" altLang="ko-KR" sz="1100" dirty="0">
                           <a:solidFill>
-                            <a:srgbClr val="C00000"/>
-                          </a:solidFill>
-                        </a:rPr>
-                        <a:t>Item N:1</a:t>
+                            <a:schemeClr val="tx1"/>
+                          </a:solidFill>
+                        </a:rPr>
+                        <a:t>QNA_ID</a:t>
                       </a:r>
                       <a:endParaRPr lang="ko-KR" altLang="en-US" sz="1100" dirty="0">
                         <a:solidFill>
-                          <a:srgbClr val="C00000"/>
+                          <a:schemeClr val="tx1"/>
                         </a:solidFill>
                       </a:endParaRPr>
                     </a:p>
@@ -11783,14 +11834,14 @@
                       <a:r>
                         <a:rPr lang="en-US" altLang="ko-KR" sz="1100" dirty="0">
                           <a:solidFill>
-                            <a:srgbClr val="C00000"/>
-                          </a:solidFill>
-                        </a:rPr>
-                        <a:t>Member N:1</a:t>
+                            <a:schemeClr val="tx1"/>
+                          </a:solidFill>
+                        </a:rPr>
+                        <a:t>ANSWER</a:t>
                       </a:r>
                       <a:endParaRPr lang="ko-KR" altLang="en-US" sz="1100" dirty="0">
                         <a:solidFill>
-                          <a:srgbClr val="C00000"/>
+                          <a:schemeClr val="tx1"/>
                         </a:solidFill>
                       </a:endParaRPr>
                     </a:p>
@@ -11827,24 +11878,16 @@
                         <a:defRPr/>
                       </a:pPr>
                       <a:r>
-                        <a:rPr lang="en-US" altLang="ko-KR" sz="1100" dirty="0" err="1">
-                          <a:solidFill>
-                            <a:srgbClr val="C00000"/>
-                          </a:solidFill>
-                        </a:rPr>
-                        <a:t>Admin_member</a:t>
-                      </a:r>
-                      <a:r>
                         <a:rPr lang="en-US" altLang="ko-KR" sz="1100" dirty="0">
                           <a:solidFill>
-                            <a:srgbClr val="C00000"/>
-                          </a:solidFill>
-                        </a:rPr>
-                        <a:t> N:1</a:t>
+                            <a:schemeClr val="tx1"/>
+                          </a:solidFill>
+                        </a:rPr>
+                        <a:t>ANSWER_DATE</a:t>
                       </a:r>
                       <a:endParaRPr lang="ko-KR" altLang="en-US" sz="1100" dirty="0">
                         <a:solidFill>
-                          <a:srgbClr val="C00000"/>
+                          <a:schemeClr val="tx1"/>
                         </a:solidFill>
                       </a:endParaRPr>
                     </a:p>
@@ -11881,8 +11924,8 @@
                         <a:defRPr/>
                       </a:pPr>
                       <a:r>
-                        <a:rPr lang="en-US" altLang="ko-KR" sz="1100" dirty="0" err="1"/>
-                        <a:t>isSecret</a:t>
+                        <a:rPr lang="en-US" altLang="ko-KR" sz="1100" dirty="0"/>
+                        <a:t>IS_ANSWERED</a:t>
                       </a:r>
                       <a:endParaRPr lang="ko-KR" altLang="en-US" sz="1100" dirty="0"/>
                     </a:p>
@@ -11919,8 +11962,8 @@
                         <a:defRPr/>
                       </a:pPr>
                       <a:r>
-                        <a:rPr lang="en-US" altLang="ko-KR" sz="1100" dirty="0" err="1"/>
-                        <a:t>isAnswered</a:t>
+                        <a:rPr lang="en-US" altLang="ko-KR" sz="1100" dirty="0"/>
+                        <a:t>IS_SECRET</a:t>
                       </a:r>
                       <a:endParaRPr lang="ko-KR" altLang="en-US" sz="1100" dirty="0"/>
                     </a:p>
@@ -11957,8 +12000,8 @@
                         <a:defRPr/>
                       </a:pPr>
                       <a:r>
-                        <a:rPr lang="en-US" altLang="ko-KR" sz="1100" dirty="0" err="1"/>
-                        <a:t>quesion</a:t>
+                        <a:rPr lang="en-US" altLang="ko-KR" sz="1100" dirty="0"/>
+                        <a:t>QUESTION</a:t>
                       </a:r>
                       <a:endParaRPr lang="ko-KR" altLang="en-US" sz="1100" dirty="0"/>
                     </a:p>
@@ -11996,7 +12039,7 @@
                       </a:pPr>
                       <a:r>
                         <a:rPr lang="en-US" altLang="ko-KR" sz="1100" dirty="0"/>
-                        <a:t>answer</a:t>
+                        <a:t>REGISTRY_DATE</a:t>
                       </a:r>
                       <a:endParaRPr lang="ko-KR" altLang="en-US" sz="1100" dirty="0"/>
                     </a:p>
@@ -12006,6 +12049,158 @@
                 <a:extLst>
                   <a:ext uri="{0D108BD9-81ED-4DB2-BD59-A6C34878D82A}">
                     <a16:rowId xmlns:a16="http://schemas.microsoft.com/office/drawing/2014/main" val="3893380815"/>
+                  </a:ext>
+                </a:extLst>
+              </a:tr>
+              <a:tr h="239050">
+                <a:tc>
+                  <a:txBody>
+                    <a:bodyPr/>
+                    <a:lstStyle/>
+                    <a:p>
+                      <a:pPr marL="0" marR="0" lvl="0" indent="0" algn="ctr" defTabSz="914400" rtl="0" eaLnBrk="1" fontAlgn="auto" latinLnBrk="1" hangingPunct="1">
+                        <a:lnSpc>
+                          <a:spcPct val="100000"/>
+                        </a:lnSpc>
+                        <a:spcBef>
+                          <a:spcPts val="0"/>
+                        </a:spcBef>
+                        <a:spcAft>
+                          <a:spcPts val="0"/>
+                        </a:spcAft>
+                        <a:buClrTx/>
+                        <a:buSzTx/>
+                        <a:buFontTx/>
+                        <a:buNone/>
+                        <a:tabLst/>
+                        <a:defRPr/>
+                      </a:pPr>
+                      <a:r>
+                        <a:rPr lang="en-US" altLang="ko-KR" sz="1100" dirty="0"/>
+                        <a:t>TITLE</a:t>
+                      </a:r>
+                      <a:endParaRPr lang="ko-KR" altLang="en-US" sz="1100" dirty="0"/>
+                    </a:p>
+                  </a:txBody>
+                  <a:tcPr anchor="ctr"/>
+                </a:tc>
+                <a:extLst>
+                  <a:ext uri="{0D108BD9-81ED-4DB2-BD59-A6C34878D82A}">
+                    <a16:rowId xmlns:a16="http://schemas.microsoft.com/office/drawing/2014/main" val="3350295452"/>
+                  </a:ext>
+                </a:extLst>
+              </a:tr>
+              <a:tr h="239050">
+                <a:tc>
+                  <a:txBody>
+                    <a:bodyPr/>
+                    <a:lstStyle/>
+                    <a:p>
+                      <a:pPr marL="0" marR="0" lvl="0" indent="0" algn="ctr" defTabSz="914400" rtl="0" eaLnBrk="1" fontAlgn="auto" latinLnBrk="1" hangingPunct="1">
+                        <a:lnSpc>
+                          <a:spcPct val="100000"/>
+                        </a:lnSpc>
+                        <a:spcBef>
+                          <a:spcPts val="0"/>
+                        </a:spcBef>
+                        <a:spcAft>
+                          <a:spcPts val="0"/>
+                        </a:spcAft>
+                        <a:buClrTx/>
+                        <a:buSzTx/>
+                        <a:buFontTx/>
+                        <a:buNone/>
+                        <a:tabLst/>
+                        <a:defRPr/>
+                      </a:pPr>
+                      <a:r>
+                        <a:rPr lang="en-US" altLang="ko-KR" sz="1100" dirty="0"/>
+                        <a:t>ADMIN_MEMBER_ID</a:t>
+                      </a:r>
+                      <a:endParaRPr lang="ko-KR" altLang="en-US" sz="1100" dirty="0"/>
+                    </a:p>
+                  </a:txBody>
+                  <a:tcPr anchor="ctr"/>
+                </a:tc>
+                <a:extLst>
+                  <a:ext uri="{0D108BD9-81ED-4DB2-BD59-A6C34878D82A}">
+                    <a16:rowId xmlns:a16="http://schemas.microsoft.com/office/drawing/2014/main" val="264018930"/>
+                  </a:ext>
+                </a:extLst>
+              </a:tr>
+              <a:tr h="239050">
+                <a:tc>
+                  <a:txBody>
+                    <a:bodyPr/>
+                    <a:lstStyle/>
+                    <a:p>
+                      <a:pPr marL="0" marR="0" lvl="0" indent="0" algn="ctr" defTabSz="914400" rtl="0" eaLnBrk="1" fontAlgn="auto" latinLnBrk="1" hangingPunct="1">
+                        <a:lnSpc>
+                          <a:spcPct val="100000"/>
+                        </a:lnSpc>
+                        <a:spcBef>
+                          <a:spcPts val="0"/>
+                        </a:spcBef>
+                        <a:spcAft>
+                          <a:spcPts val="0"/>
+                        </a:spcAft>
+                        <a:buClrTx/>
+                        <a:buSzTx/>
+                        <a:buFontTx/>
+                        <a:buNone/>
+                        <a:tabLst/>
+                        <a:defRPr/>
+                      </a:pPr>
+                      <a:r>
+                        <a:rPr lang="en-US" altLang="ko-KR" sz="1100" dirty="0"/>
+                        <a:t>ITEM_ID</a:t>
+                      </a:r>
+                      <a:endParaRPr lang="ko-KR" altLang="en-US" sz="1100" dirty="0"/>
+                    </a:p>
+                  </a:txBody>
+                  <a:tcPr anchor="ctr"/>
+                </a:tc>
+                <a:extLst>
+                  <a:ext uri="{0D108BD9-81ED-4DB2-BD59-A6C34878D82A}">
+                    <a16:rowId xmlns:a16="http://schemas.microsoft.com/office/drawing/2014/main" val="3108828246"/>
+                  </a:ext>
+                </a:extLst>
+              </a:tr>
+              <a:tr h="239050">
+                <a:tc>
+                  <a:txBody>
+                    <a:bodyPr/>
+                    <a:lstStyle/>
+                    <a:p>
+                      <a:pPr marL="0" marR="0" lvl="0" indent="0" algn="ctr" defTabSz="914400" rtl="0" eaLnBrk="1" fontAlgn="auto" latinLnBrk="1" hangingPunct="1">
+                        <a:lnSpc>
+                          <a:spcPct val="100000"/>
+                        </a:lnSpc>
+                        <a:spcBef>
+                          <a:spcPts val="0"/>
+                        </a:spcBef>
+                        <a:spcAft>
+                          <a:spcPts val="0"/>
+                        </a:spcAft>
+                        <a:buClrTx/>
+                        <a:buSzTx/>
+                        <a:buFontTx/>
+                        <a:buNone/>
+                        <a:tabLst/>
+                        <a:defRPr/>
+                      </a:pPr>
+                      <a:r>
+                        <a:rPr lang="en-US" altLang="ko-KR" sz="1100" dirty="0"/>
+                        <a:t>MEMBER_ID</a:t>
+                      </a:r>
+                      <a:endParaRPr lang="ko-KR" altLang="en-US" sz="1100" dirty="0"/>
+                    </a:p>
+                  </a:txBody>
+                  <a:tcPr anchor="ctr"/>
+                </a:tc>
+                <a:extLst>
+                  <a:ext uri="{0D108BD9-81ED-4DB2-BD59-A6C34878D82A}">
+                    <a16:rowId xmlns:a16="http://schemas.microsoft.com/office/drawing/2014/main" val="882583533"/>
                   </a:ext>
                 </a:extLst>
               </a:tr>
@@ -12028,13 +12223,13 @@
           <p:nvPr>
             <p:extLst>
               <p:ext uri="{D42A27DB-BD31-4B8C-83A1-F6EECF244321}">
-                <p14:modId xmlns:p14="http://schemas.microsoft.com/office/powerpoint/2010/main" val="2029819973"/>
+                <p14:modId xmlns:p14="http://schemas.microsoft.com/office/powerpoint/2010/main" val="2901893577"/>
               </p:ext>
             </p:extLst>
           </p:nvPr>
         </p:nvGraphicFramePr>
         <p:xfrm>
-          <a:off x="8496747" y="2013281"/>
+          <a:off x="10064958" y="1356360"/>
           <a:ext cx="1519240" cy="2072640"/>
         </p:xfrm>
         <a:graphic>
@@ -12100,14 +12295,14 @@
                       <a:r>
                         <a:rPr lang="en-US" altLang="ko-KR" sz="1100" dirty="0">
                           <a:solidFill>
-                            <a:srgbClr val="C00000"/>
-                          </a:solidFill>
-                        </a:rPr>
-                        <a:t>Item N:1</a:t>
+                            <a:schemeClr val="tx1"/>
+                          </a:solidFill>
+                        </a:rPr>
+                        <a:t>REVIEW_ID</a:t>
                       </a:r>
                       <a:endParaRPr lang="ko-KR" altLang="en-US" sz="1100" dirty="0">
                         <a:solidFill>
-                          <a:srgbClr val="C00000"/>
+                          <a:schemeClr val="tx1"/>
                         </a:solidFill>
                       </a:endParaRPr>
                     </a:p>
@@ -12144,10 +12339,18 @@
                         <a:defRPr/>
                       </a:pPr>
                       <a:r>
-                        <a:rPr lang="en-US" altLang="ko-KR" sz="1100" dirty="0"/>
-                        <a:t>option(string)</a:t>
-                      </a:r>
-                      <a:endParaRPr lang="ko-KR" altLang="en-US" sz="1100" dirty="0"/>
+                        <a:rPr lang="en-US" altLang="ko-KR" sz="1100" dirty="0">
+                          <a:solidFill>
+                            <a:schemeClr val="tx1"/>
+                          </a:solidFill>
+                        </a:rPr>
+                        <a:t>DESCRIPTION</a:t>
+                      </a:r>
+                      <a:endParaRPr lang="ko-KR" altLang="en-US" sz="1100" dirty="0">
+                        <a:solidFill>
+                          <a:schemeClr val="tx1"/>
+                        </a:solidFill>
+                      </a:endParaRPr>
                     </a:p>
                   </a:txBody>
                   <a:tcPr anchor="ctr"/>
@@ -12184,14 +12387,14 @@
                       <a:r>
                         <a:rPr lang="en-US" altLang="ko-KR" sz="1100" dirty="0">
                           <a:solidFill>
-                            <a:srgbClr val="C00000"/>
-                          </a:solidFill>
-                        </a:rPr>
-                        <a:t>Member N:1</a:t>
+                            <a:schemeClr val="tx1"/>
+                          </a:solidFill>
+                        </a:rPr>
+                        <a:t>OPTION</a:t>
                       </a:r>
                       <a:endParaRPr lang="ko-KR" altLang="en-US" sz="1100" dirty="0">
                         <a:solidFill>
-                          <a:srgbClr val="C00000"/>
+                          <a:schemeClr val="tx1"/>
                         </a:solidFill>
                       </a:endParaRPr>
                     </a:p>
@@ -12228,10 +12431,18 @@
                         <a:defRPr/>
                       </a:pPr>
                       <a:r>
-                        <a:rPr lang="en-US" altLang="ko-KR" sz="1100" dirty="0"/>
-                        <a:t>description</a:t>
-                      </a:r>
-                      <a:endParaRPr lang="ko-KR" altLang="en-US" sz="1100" dirty="0"/>
+                        <a:rPr lang="en-US" altLang="ko-KR" sz="1100" dirty="0">
+                          <a:solidFill>
+                            <a:schemeClr val="tx1"/>
+                          </a:solidFill>
+                        </a:rPr>
+                        <a:t>RATE</a:t>
+                      </a:r>
+                      <a:endParaRPr lang="ko-KR" altLang="en-US" sz="1100" dirty="0">
+                        <a:solidFill>
+                          <a:schemeClr val="tx1"/>
+                        </a:solidFill>
+                      </a:endParaRPr>
                     </a:p>
                   </a:txBody>
                   <a:tcPr anchor="ctr"/>
@@ -12266,10 +12477,18 @@
                         <a:defRPr/>
                       </a:pPr>
                       <a:r>
-                        <a:rPr lang="en-US" altLang="ko-KR" sz="1100" dirty="0"/>
-                        <a:t>rate</a:t>
-                      </a:r>
-                      <a:endParaRPr lang="ko-KR" altLang="en-US" sz="1100" dirty="0"/>
+                        <a:rPr lang="en-US" altLang="ko-KR" sz="1100" dirty="0">
+                          <a:solidFill>
+                            <a:schemeClr val="tx1"/>
+                          </a:solidFill>
+                        </a:rPr>
+                        <a:t>REGISTRY_DATE</a:t>
+                      </a:r>
+                      <a:endParaRPr lang="ko-KR" altLang="en-US" sz="1100" dirty="0">
+                        <a:solidFill>
+                          <a:schemeClr val="tx1"/>
+                        </a:solidFill>
+                      </a:endParaRPr>
                     </a:p>
                   </a:txBody>
                   <a:tcPr anchor="ctr"/>
@@ -12304,10 +12523,18 @@
                         <a:defRPr/>
                       </a:pPr>
                       <a:r>
-                        <a:rPr lang="en-US" altLang="ko-KR" sz="1100" dirty="0" err="1"/>
-                        <a:t>registry_date</a:t>
-                      </a:r>
-                      <a:endParaRPr lang="ko-KR" altLang="en-US" sz="1100" dirty="0"/>
+                        <a:rPr lang="en-US" altLang="ko-KR" sz="1100" dirty="0">
+                          <a:solidFill>
+                            <a:schemeClr val="tx1"/>
+                          </a:solidFill>
+                        </a:rPr>
+                        <a:t>ITEM_ID</a:t>
+                      </a:r>
+                      <a:endParaRPr lang="ko-KR" altLang="en-US" sz="1100" dirty="0">
+                        <a:solidFill>
+                          <a:schemeClr val="tx1"/>
+                        </a:solidFill>
+                      </a:endParaRPr>
                     </a:p>
                   </a:txBody>
                   <a:tcPr anchor="ctr"/>
@@ -12344,30 +12571,14 @@
                       <a:r>
                         <a:rPr lang="en-US" altLang="ko-KR" sz="1100" dirty="0">
                           <a:solidFill>
-                            <a:srgbClr val="0070C0"/>
-                          </a:solidFill>
-                        </a:rPr>
-                        <a:t>List&lt;</a:t>
-                      </a:r>
-                      <a:r>
-                        <a:rPr lang="en-US" altLang="ko-KR" sz="1100" dirty="0" err="1">
-                          <a:solidFill>
-                            <a:srgbClr val="0070C0"/>
-                          </a:solidFill>
-                        </a:rPr>
-                        <a:t>Review_image</a:t>
-                      </a:r>
-                      <a:r>
-                        <a:rPr lang="en-US" altLang="ko-KR" sz="1100" dirty="0">
-                          <a:solidFill>
-                            <a:srgbClr val="0070C0"/>
-                          </a:solidFill>
-                        </a:rPr>
-                        <a:t>&gt;</a:t>
+                            <a:schemeClr val="tx1"/>
+                          </a:solidFill>
+                        </a:rPr>
+                        <a:t>MEMBER_ID</a:t>
                       </a:r>
                       <a:endParaRPr lang="ko-KR" altLang="en-US" sz="1100" dirty="0">
                         <a:solidFill>
-                          <a:srgbClr val="0070C0"/>
+                          <a:schemeClr val="tx1"/>
                         </a:solidFill>
                       </a:endParaRPr>
                     </a:p>
@@ -12399,14 +12610,14 @@
           <p:nvPr>
             <p:extLst>
               <p:ext uri="{D42A27DB-BD31-4B8C-83A1-F6EECF244321}">
-                <p14:modId xmlns:p14="http://schemas.microsoft.com/office/powerpoint/2010/main" val="4153020584"/>
+                <p14:modId xmlns:p14="http://schemas.microsoft.com/office/powerpoint/2010/main" val="2317328781"/>
               </p:ext>
             </p:extLst>
           </p:nvPr>
         </p:nvGraphicFramePr>
         <p:xfrm>
-          <a:off x="10199153" y="3422409"/>
-          <a:ext cx="1156368" cy="1036320"/>
+          <a:off x="10663702" y="3694461"/>
+          <a:ext cx="1156368" cy="1630680"/>
         </p:xfrm>
         <a:graphic>
           <a:graphicData uri="http://schemas.openxmlformats.org/drawingml/2006/table">
@@ -12471,14 +12682,14 @@
                       <a:r>
                         <a:rPr lang="en-US" altLang="ko-KR" sz="1100" dirty="0">
                           <a:solidFill>
-                            <a:srgbClr val="C00000"/>
-                          </a:solidFill>
-                        </a:rPr>
-                        <a:t>Review N:1</a:t>
+                            <a:schemeClr val="tx1"/>
+                          </a:solidFill>
+                        </a:rPr>
+                        <a:t>REVIEW_IMAGE_ID</a:t>
                       </a:r>
                       <a:endParaRPr lang="ko-KR" altLang="en-US" sz="1100" dirty="0">
                         <a:solidFill>
-                          <a:srgbClr val="C00000"/>
+                          <a:schemeClr val="tx1"/>
                         </a:solidFill>
                       </a:endParaRPr>
                     </a:p>
@@ -12497,12 +12708,66 @@
                     <a:bodyPr/>
                     <a:lstStyle/>
                     <a:p>
-                      <a:pPr algn="ctr" latinLnBrk="1"/>
-                      <a:r>
-                        <a:rPr lang="en-US" altLang="ko-KR" sz="1100" dirty="0" err="1"/>
-                        <a:t>upload_name</a:t>
-                      </a:r>
-                      <a:endParaRPr lang="ko-KR" altLang="en-US" sz="1100" dirty="0"/>
+                      <a:pPr marL="0" marR="0" lvl="0" indent="0" algn="ctr" defTabSz="914400" rtl="0" eaLnBrk="1" fontAlgn="auto" latinLnBrk="1" hangingPunct="1">
+                        <a:lnSpc>
+                          <a:spcPct val="100000"/>
+                        </a:lnSpc>
+                        <a:spcBef>
+                          <a:spcPts val="0"/>
+                        </a:spcBef>
+                        <a:spcAft>
+                          <a:spcPts val="0"/>
+                        </a:spcAft>
+                        <a:buClrTx/>
+                        <a:buSzTx/>
+                        <a:buFontTx/>
+                        <a:buNone/>
+                        <a:tabLst/>
+                        <a:defRPr/>
+                      </a:pPr>
+                      <a:r>
+                        <a:rPr lang="en-US" altLang="ko-KR" sz="1100" dirty="0">
+                          <a:solidFill>
+                            <a:schemeClr val="tx1"/>
+                          </a:solidFill>
+                        </a:rPr>
+                        <a:t>STORE_NAME</a:t>
+                      </a:r>
+                      <a:endParaRPr lang="ko-KR" altLang="en-US" sz="1100" dirty="0">
+                        <a:solidFill>
+                          <a:schemeClr val="tx1"/>
+                        </a:solidFill>
+                      </a:endParaRPr>
+                    </a:p>
+                  </a:txBody>
+                  <a:tcPr anchor="ctr"/>
+                </a:tc>
+                <a:extLst>
+                  <a:ext uri="{0D108BD9-81ED-4DB2-BD59-A6C34878D82A}">
+                    <a16:rowId xmlns:a16="http://schemas.microsoft.com/office/drawing/2014/main" val="108283803"/>
+                  </a:ext>
+                </a:extLst>
+              </a:tr>
+              <a:tr h="239050">
+                <a:tc>
+                  <a:txBody>
+                    <a:bodyPr/>
+                    <a:lstStyle/>
+                    <a:p>
+                      <a:pPr algn="ctr" latinLnBrk="1"/>
+                      <a:r>
+                        <a:rPr lang="en-US" altLang="ko-KR" sz="1100" dirty="0">
+                          <a:solidFill>
+                            <a:schemeClr val="tx1"/>
+                          </a:solidFill>
+                        </a:rPr>
+                        <a:t>UPLOAD_NAME</a:t>
+                      </a:r>
+                      <a:endParaRPr lang="ko-KR" altLang="en-US" sz="1100" dirty="0">
+                        <a:solidFill>
+                          <a:schemeClr val="tx1"/>
+                        </a:solidFill>
+                      </a:endParaRPr>
                     </a:p>
                   </a:txBody>
                   <a:tcPr anchor="ctr"/>
@@ -12521,8 +12786,8 @@
                     <a:p>
                       <a:pPr algn="ctr" latinLnBrk="1"/>
                       <a:r>
-                        <a:rPr lang="en-US" altLang="ko-KR" sz="1100" dirty="0" err="1"/>
-                        <a:t>store_name</a:t>
+                        <a:rPr lang="en-US" altLang="ko-KR" sz="1100" dirty="0"/>
+                        <a:t>REVIEW_ID</a:t>
                       </a:r>
                       <a:endParaRPr lang="ko-KR" altLang="en-US" sz="1100" dirty="0"/>
                     </a:p>
@@ -12554,14 +12819,14 @@
           <p:nvPr>
             <p:extLst>
               <p:ext uri="{D42A27DB-BD31-4B8C-83A1-F6EECF244321}">
-                <p14:modId xmlns:p14="http://schemas.microsoft.com/office/powerpoint/2010/main" val="2626485065"/>
+                <p14:modId xmlns:p14="http://schemas.microsoft.com/office/powerpoint/2010/main" val="2415835852"/>
               </p:ext>
             </p:extLst>
           </p:nvPr>
         </p:nvGraphicFramePr>
         <p:xfrm>
-          <a:off x="8513154" y="4877544"/>
-          <a:ext cx="1156368" cy="1036320"/>
+          <a:off x="8094342" y="3694461"/>
+          <a:ext cx="1156368" cy="1295400"/>
         </p:xfrm>
         <a:graphic>
           <a:graphicData uri="http://schemas.openxmlformats.org/drawingml/2006/table">
@@ -12624,12 +12889,8 @@
                         <a:defRPr/>
                       </a:pPr>
                       <a:r>
-                        <a:rPr lang="en-US" altLang="ko-KR" sz="1100" dirty="0">
-                          <a:solidFill>
-                            <a:srgbClr val="C00000"/>
-                          </a:solidFill>
-                        </a:rPr>
-                        <a:t>Item N:1</a:t>
+                        <a:rPr lang="en-US" altLang="ko-KR" sz="1100" dirty="0"/>
+                        <a:t>OPTION1_ID</a:t>
                       </a:r>
                       <a:endParaRPr lang="ko-KR" altLang="en-US" sz="1100" dirty="0"/>
                     </a:p>
@@ -12666,10 +12927,18 @@
                         <a:defRPr/>
                       </a:pPr>
                       <a:r>
-                        <a:rPr lang="en-US" altLang="ko-KR" sz="1100" dirty="0"/>
-                        <a:t>name</a:t>
-                      </a:r>
-                      <a:endParaRPr lang="ko-KR" altLang="en-US" sz="1100" dirty="0"/>
+                        <a:rPr lang="en-US" altLang="ko-KR" sz="1100" dirty="0">
+                          <a:solidFill>
+                            <a:schemeClr val="tx1"/>
+                          </a:solidFill>
+                        </a:rPr>
+                        <a:t>NAME</a:t>
+                      </a:r>
+                      <a:endParaRPr lang="ko-KR" altLang="en-US" sz="1100" dirty="0">
+                        <a:solidFill>
+                          <a:schemeClr val="tx1"/>
+                        </a:solidFill>
+                      </a:endParaRPr>
                     </a:p>
                   </a:txBody>
                   <a:tcPr anchor="ctr"/>
@@ -12706,14 +12975,60 @@
                       <a:r>
                         <a:rPr lang="en-US" altLang="ko-KR" sz="1100" dirty="0">
                           <a:solidFill>
-                            <a:srgbClr val="0070C0"/>
-                          </a:solidFill>
-                        </a:rPr>
-                        <a:t>List&lt;Option2&gt;</a:t>
+                            <a:schemeClr val="tx1"/>
+                          </a:solidFill>
+                        </a:rPr>
+                        <a:t>STOCK</a:t>
                       </a:r>
                       <a:endParaRPr lang="ko-KR" altLang="en-US" sz="1100" dirty="0">
                         <a:solidFill>
-                          <a:srgbClr val="0070C0"/>
+                          <a:schemeClr val="tx1"/>
+                        </a:solidFill>
+                      </a:endParaRPr>
+                    </a:p>
+                  </a:txBody>
+                  <a:tcPr anchor="ctr"/>
+                </a:tc>
+                <a:extLst>
+                  <a:ext uri="{0D108BD9-81ED-4DB2-BD59-A6C34878D82A}">
+                    <a16:rowId xmlns:a16="http://schemas.microsoft.com/office/drawing/2014/main" val="3900001141"/>
+                  </a:ext>
+                </a:extLst>
+              </a:tr>
+              <a:tr h="239050">
+                <a:tc>
+                  <a:txBody>
+                    <a:bodyPr/>
+                    <a:lstStyle/>
+                    <a:p>
+                      <a:pPr marL="0" marR="0" lvl="0" indent="0" algn="ctr" defTabSz="914400" rtl="0" eaLnBrk="1" fontAlgn="auto" latinLnBrk="1" hangingPunct="1">
+                        <a:lnSpc>
+                          <a:spcPct val="100000"/>
+                        </a:lnSpc>
+                        <a:spcBef>
+                          <a:spcPts val="0"/>
+                        </a:spcBef>
+                        <a:spcAft>
+                          <a:spcPts val="0"/>
+                        </a:spcAft>
+                        <a:buClrTx/>
+                        <a:buSzTx/>
+                        <a:buFontTx/>
+                        <a:buNone/>
+                        <a:tabLst/>
+                        <a:defRPr/>
+                      </a:pPr>
+                      <a:r>
+                        <a:rPr lang="en-US" altLang="ko-KR" sz="1100" dirty="0">
+                          <a:solidFill>
+                            <a:schemeClr val="tx1"/>
+                          </a:solidFill>
+                        </a:rPr>
+                        <a:t>ITEM_ID</a:t>
+                      </a:r>
+                      <a:endParaRPr lang="ko-KR" altLang="en-US" sz="1100" dirty="0">
+                        <a:solidFill>
+                          <a:schemeClr val="tx1"/>
                         </a:solidFill>
                       </a:endParaRPr>
                     </a:p>
@@ -12745,14 +13060,14 @@
           <p:nvPr>
             <p:extLst>
               <p:ext uri="{D42A27DB-BD31-4B8C-83A1-F6EECF244321}">
-                <p14:modId xmlns:p14="http://schemas.microsoft.com/office/powerpoint/2010/main" val="4056985100"/>
+                <p14:modId xmlns:p14="http://schemas.microsoft.com/office/powerpoint/2010/main" val="2196541232"/>
               </p:ext>
             </p:extLst>
           </p:nvPr>
         </p:nvGraphicFramePr>
         <p:xfrm>
-          <a:off x="9779909" y="4890093"/>
-          <a:ext cx="1156368" cy="1036320"/>
+          <a:off x="9338121" y="3694461"/>
+          <a:ext cx="1156368" cy="1295400"/>
         </p:xfrm>
         <a:graphic>
           <a:graphicData uri="http://schemas.openxmlformats.org/drawingml/2006/table">
@@ -12817,14 +13132,14 @@
                       <a:r>
                         <a:rPr lang="en-US" altLang="ko-KR" sz="1100" dirty="0">
                           <a:solidFill>
-                            <a:srgbClr val="C00000"/>
-                          </a:solidFill>
-                        </a:rPr>
-                        <a:t>Option1 N:1</a:t>
+                            <a:schemeClr val="tx1"/>
+                          </a:solidFill>
+                        </a:rPr>
+                        <a:t>OPTION2_ID</a:t>
                       </a:r>
                       <a:endParaRPr lang="ko-KR" altLang="en-US" sz="1100" dirty="0">
                         <a:solidFill>
-                          <a:srgbClr val="C00000"/>
+                          <a:schemeClr val="tx1"/>
                         </a:solidFill>
                       </a:endParaRPr>
                     </a:p>
@@ -12861,10 +13176,18 @@
                         <a:defRPr/>
                       </a:pPr>
                       <a:r>
-                        <a:rPr lang="en-US" altLang="ko-KR" sz="1100" dirty="0"/>
-                        <a:t>stock</a:t>
-                      </a:r>
-                      <a:endParaRPr lang="ko-KR" altLang="en-US" sz="1100" dirty="0"/>
+                        <a:rPr lang="en-US" altLang="ko-KR" sz="1100" dirty="0">
+                          <a:solidFill>
+                            <a:schemeClr val="tx1"/>
+                          </a:solidFill>
+                        </a:rPr>
+                        <a:t>NAME</a:t>
+                      </a:r>
+                      <a:endParaRPr lang="ko-KR" altLang="en-US" sz="1100" dirty="0">
+                        <a:solidFill>
+                          <a:schemeClr val="tx1"/>
+                        </a:solidFill>
+                      </a:endParaRPr>
                     </a:p>
                   </a:txBody>
                   <a:tcPr anchor="ctr"/>
@@ -12899,8 +13222,54 @@
                         <a:defRPr/>
                       </a:pPr>
                       <a:r>
+                        <a:rPr lang="en-US" altLang="ko-KR" sz="1100" dirty="0">
+                          <a:solidFill>
+                            <a:schemeClr val="tx1"/>
+                          </a:solidFill>
+                        </a:rPr>
+                        <a:t>STOCK</a:t>
+                      </a:r>
+                      <a:endParaRPr lang="ko-KR" altLang="en-US" sz="1100" dirty="0">
+                        <a:solidFill>
+                          <a:schemeClr val="tx1"/>
+                        </a:solidFill>
+                      </a:endParaRPr>
+                    </a:p>
+                  </a:txBody>
+                  <a:tcPr anchor="ctr"/>
+                </a:tc>
+                <a:extLst>
+                  <a:ext uri="{0D108BD9-81ED-4DB2-BD59-A6C34878D82A}">
+                    <a16:rowId xmlns:a16="http://schemas.microsoft.com/office/drawing/2014/main" val="3885091206"/>
+                  </a:ext>
+                </a:extLst>
+              </a:tr>
+              <a:tr h="239050">
+                <a:tc>
+                  <a:txBody>
+                    <a:bodyPr/>
+                    <a:lstStyle/>
+                    <a:p>
+                      <a:pPr marL="0" marR="0" lvl="0" indent="0" algn="ctr" defTabSz="914400" rtl="0" eaLnBrk="1" fontAlgn="auto" latinLnBrk="1" hangingPunct="1">
+                        <a:lnSpc>
+                          <a:spcPct val="100000"/>
+                        </a:lnSpc>
+                        <a:spcBef>
+                          <a:spcPts val="0"/>
+                        </a:spcBef>
+                        <a:spcAft>
+                          <a:spcPts val="0"/>
+                        </a:spcAft>
+                        <a:buClrTx/>
+                        <a:buSzTx/>
+                        <a:buFontTx/>
+                        <a:buNone/>
+                        <a:tabLst/>
+                        <a:defRPr/>
+                      </a:pPr>
+                      <a:r>
                         <a:rPr lang="en-US" altLang="ko-KR" sz="1100" dirty="0"/>
-                        <a:t>name</a:t>
+                        <a:t>OPTION1_ID</a:t>
                       </a:r>
                       <a:endParaRPr lang="ko-KR" altLang="en-US" sz="1100" dirty="0"/>
                     </a:p>
@@ -12909,7 +13278,7 @@
                 </a:tc>
                 <a:extLst>
                   <a:ext uri="{0D108BD9-81ED-4DB2-BD59-A6C34878D82A}">
-                    <a16:rowId xmlns:a16="http://schemas.microsoft.com/office/drawing/2014/main" val="3885091206"/>
+                    <a16:rowId xmlns:a16="http://schemas.microsoft.com/office/drawing/2014/main" val="402772981"/>
                   </a:ext>
                 </a:extLst>
               </a:tr>
@@ -12932,14 +13301,14 @@
           <p:nvPr>
             <p:extLst>
               <p:ext uri="{D42A27DB-BD31-4B8C-83A1-F6EECF244321}">
-                <p14:modId xmlns:p14="http://schemas.microsoft.com/office/powerpoint/2010/main" val="2483371314"/>
+                <p14:modId xmlns:p14="http://schemas.microsoft.com/office/powerpoint/2010/main" val="714546701"/>
               </p:ext>
             </p:extLst>
           </p:nvPr>
         </p:nvGraphicFramePr>
         <p:xfrm>
-          <a:off x="5964558" y="5747220"/>
-          <a:ext cx="1156368" cy="1036320"/>
+          <a:off x="6388090" y="5412783"/>
+          <a:ext cx="1353635" cy="1036320"/>
         </p:xfrm>
         <a:graphic>
           <a:graphicData uri="http://schemas.openxmlformats.org/drawingml/2006/table">
@@ -12948,7 +13317,7 @@
                 <a:tableStyleId>{5C22544A-7EE6-4342-B048-85BDC9FD1C3A}</a:tableStyleId>
               </a:tblPr>
               <a:tblGrid>
-                <a:gridCol w="1156368">
+                <a:gridCol w="1353635">
                   <a:extLst>
                     <a:ext uri="{9D8B030D-6E8A-4147-A177-3AD203B41FA5}">
                       <a16:colId xmlns:a16="http://schemas.microsoft.com/office/drawing/2014/main" val="329139778"/>
@@ -13002,12 +13371,8 @@
                         <a:defRPr/>
                       </a:pPr>
                       <a:r>
-                        <a:rPr lang="en-US" altLang="ko-KR" sz="1100" dirty="0">
-                          <a:solidFill>
-                            <a:srgbClr val="C00000"/>
-                          </a:solidFill>
-                        </a:rPr>
-                        <a:t>Item 1:1</a:t>
+                        <a:rPr lang="en-US" altLang="ko-KR" sz="1100" dirty="0"/>
+                        <a:t>THUMBNAIL_ID</a:t>
                       </a:r>
                       <a:endParaRPr lang="ko-KR" altLang="en-US" sz="1100" dirty="0"/>
                     </a:p>
@@ -13028,8 +13393,8 @@
                     <a:p>
                       <a:pPr algn="ctr" latinLnBrk="1"/>
                       <a:r>
-                        <a:rPr lang="en-US" altLang="ko-KR" sz="1100" dirty="0" err="1"/>
-                        <a:t>upload_name</a:t>
+                        <a:rPr lang="en-US" altLang="ko-KR" sz="1100" dirty="0"/>
+                        <a:t>STORE_NAME</a:t>
                       </a:r>
                       <a:endParaRPr lang="ko-KR" altLang="en-US" sz="1100" dirty="0"/>
                     </a:p>
@@ -13050,8 +13415,8 @@
                     <a:p>
                       <a:pPr algn="ctr" latinLnBrk="1"/>
                       <a:r>
-                        <a:rPr lang="en-US" altLang="ko-KR" sz="1100" dirty="0" err="1"/>
-                        <a:t>store_name</a:t>
+                        <a:rPr lang="en-US" altLang="ko-KR" sz="1100" dirty="0"/>
+                        <a:t>UPLOAD_NAME</a:t>
                       </a:r>
                       <a:endParaRPr lang="ko-KR" altLang="en-US" sz="1100" dirty="0"/>
                     </a:p>
@@ -13083,14 +13448,14 @@
           <p:nvPr>
             <p:extLst>
               <p:ext uri="{D42A27DB-BD31-4B8C-83A1-F6EECF244321}">
-                <p14:modId xmlns:p14="http://schemas.microsoft.com/office/powerpoint/2010/main" val="1663919033"/>
+                <p14:modId xmlns:p14="http://schemas.microsoft.com/office/powerpoint/2010/main" val="3168272875"/>
               </p:ext>
             </p:extLst>
           </p:nvPr>
         </p:nvGraphicFramePr>
         <p:xfrm>
-          <a:off x="6436701" y="142291"/>
-          <a:ext cx="1572413" cy="1036320"/>
+          <a:off x="149479" y="152565"/>
+          <a:ext cx="1572413" cy="777240"/>
         </p:xfrm>
         <a:graphic>
           <a:graphicData uri="http://schemas.openxmlformats.org/drawingml/2006/table">
@@ -13200,7 +13565,7 @@
                             <a:noFill/>
                           </a:ln>
                           <a:solidFill>
-                            <a:srgbClr val="C00000"/>
+                            <a:schemeClr val="tx1"/>
                           </a:solidFill>
                           <a:effectLst/>
                           <a:uLnTx/>
@@ -13209,14 +13574,14 @@
                           <a:ea typeface="맑은 고딕" panose="020B0503020000020004" pitchFamily="50" charset="-127"/>
                           <a:cs typeface="+mn-cs"/>
                         </a:rPr>
-                        <a:t>Member 1:1</a:t>
+                        <a:t>ADMIN_ID</a:t>
                       </a:r>
                       <a:endParaRPr kumimoji="0" lang="ko-KR" altLang="en-US" sz="1100" b="0" i="0" u="none" strike="noStrike" kern="1200" cap="none" spc="0" normalizeH="0" baseline="0" noProof="0" dirty="0">
                         <a:ln>
                           <a:noFill/>
                         </a:ln>
                         <a:solidFill>
-                          <a:srgbClr val="C00000"/>
+                          <a:schemeClr val="tx1"/>
                         </a:solidFill>
                         <a:effectLst/>
                         <a:uLnTx/>
@@ -13264,7 +13629,7 @@
                             <a:noFill/>
                           </a:ln>
                           <a:solidFill>
-                            <a:srgbClr val="0070C0"/>
+                            <a:schemeClr val="tx1"/>
                           </a:solidFill>
                           <a:effectLst/>
                           <a:uLnTx/>
@@ -13273,48 +13638,14 @@
                           <a:ea typeface="맑은 고딕" panose="020B0503020000020004" pitchFamily="50" charset="-127"/>
                           <a:cs typeface="+mn-cs"/>
                         </a:rPr>
-                        <a:t>List&lt;</a:t>
-                      </a:r>
-                      <a:r>
-                        <a:rPr kumimoji="0" lang="en-US" altLang="ko-KR" sz="1100" b="0" i="0" u="none" strike="noStrike" kern="1200" cap="none" spc="0" normalizeH="0" baseline="0" noProof="0" dirty="0" err="1">
-                          <a:ln>
-                            <a:noFill/>
-                          </a:ln>
-                          <a:solidFill>
-                            <a:srgbClr val="0070C0"/>
-                          </a:solidFill>
-                          <a:effectLst/>
-                          <a:uLnTx/>
-                          <a:uFillTx/>
-                          <a:latin typeface="맑은 고딕" panose="020F0502020204030204"/>
-                          <a:ea typeface="맑은 고딕" panose="020B0503020000020004" pitchFamily="50" charset="-127"/>
-                          <a:cs typeface="+mn-cs"/>
-                        </a:rPr>
-                        <a:t>Qna</a:t>
-                      </a:r>
-                      <a:r>
-                        <a:rPr kumimoji="0" lang="en-US" altLang="ko-KR" sz="1100" b="0" i="0" u="none" strike="noStrike" kern="1200" cap="none" spc="0" normalizeH="0" baseline="0" noProof="0" dirty="0">
-                          <a:ln>
-                            <a:noFill/>
-                          </a:ln>
-                          <a:solidFill>
-                            <a:srgbClr val="0070C0"/>
-                          </a:solidFill>
-                          <a:effectLst/>
-                          <a:uLnTx/>
-                          <a:uFillTx/>
-                          <a:latin typeface="맑은 고딕" panose="020F0502020204030204"/>
-                          <a:ea typeface="맑은 고딕" panose="020B0503020000020004" pitchFamily="50" charset="-127"/>
-                          <a:cs typeface="+mn-cs"/>
-                        </a:rPr>
-                        <a:t>&gt;</a:t>
+                        <a:t>MEMBER_ID</a:t>
                       </a:r>
                       <a:endParaRPr kumimoji="0" lang="ko-KR" altLang="en-US" sz="1100" b="0" i="0" u="none" strike="noStrike" kern="1200" cap="none" spc="0" normalizeH="0" baseline="0" noProof="0" dirty="0">
                         <a:ln>
                           <a:noFill/>
                         </a:ln>
                         <a:solidFill>
-                          <a:srgbClr val="0070C0"/>
+                          <a:schemeClr val="tx1"/>
                         </a:solidFill>
                         <a:effectLst/>
                         <a:uLnTx/>
@@ -13330,70 +13661,6 @@
                 <a:extLst>
                   <a:ext uri="{0D108BD9-81ED-4DB2-BD59-A6C34878D82A}">
                     <a16:rowId xmlns:a16="http://schemas.microsoft.com/office/drawing/2014/main" val="1194688058"/>
-                  </a:ext>
-                </a:extLst>
-              </a:tr>
-              <a:tr h="239050">
-                <a:tc>
-                  <a:txBody>
-                    <a:bodyPr/>
-                    <a:lstStyle/>
-                    <a:p>
-                      <a:pPr marL="0" marR="0" lvl="0" indent="0" algn="ctr" defTabSz="914400" rtl="0" eaLnBrk="1" fontAlgn="auto" latinLnBrk="1" hangingPunct="1">
-                        <a:lnSpc>
-                          <a:spcPct val="100000"/>
-                        </a:lnSpc>
-                        <a:spcBef>
-                          <a:spcPts val="0"/>
-                        </a:spcBef>
-                        <a:spcAft>
-                          <a:spcPts val="0"/>
-                        </a:spcAft>
-                        <a:buClrTx/>
-                        <a:buSzTx/>
-                        <a:buFontTx/>
-                        <a:buNone/>
-                        <a:tabLst/>
-                        <a:defRPr/>
-                      </a:pPr>
-                      <a:r>
-                        <a:rPr kumimoji="0" lang="en-US" altLang="ko-KR" sz="1100" b="0" i="0" u="none" strike="noStrike" kern="1200" cap="none" spc="0" normalizeH="0" baseline="0" noProof="0" dirty="0">
-                          <a:ln>
-                            <a:noFill/>
-                          </a:ln>
-                          <a:solidFill>
-                            <a:srgbClr val="0070C0"/>
-                          </a:solidFill>
-                          <a:effectLst/>
-                          <a:uLnTx/>
-                          <a:uFillTx/>
-                          <a:latin typeface="맑은 고딕" panose="020F0502020204030204"/>
-                          <a:ea typeface="맑은 고딕" panose="020B0503020000020004" pitchFamily="50" charset="-127"/>
-                          <a:cs typeface="+mn-cs"/>
-                        </a:rPr>
-                        <a:t>List&lt;Item&gt;</a:t>
-                      </a:r>
-                      <a:endParaRPr kumimoji="0" lang="ko-KR" altLang="en-US" sz="1100" b="0" i="0" u="none" strike="noStrike" kern="1200" cap="none" spc="0" normalizeH="0" baseline="0" noProof="0" dirty="0">
-                        <a:ln>
-                          <a:noFill/>
-                        </a:ln>
-                        <a:solidFill>
-                          <a:srgbClr val="0070C0"/>
-                        </a:solidFill>
-                        <a:effectLst/>
-                        <a:uLnTx/>
-                        <a:uFillTx/>
-                        <a:latin typeface="맑은 고딕" panose="020F0502020204030204"/>
-                        <a:ea typeface="맑은 고딕" panose="020B0503020000020004" pitchFamily="50" charset="-127"/>
-                        <a:cs typeface="+mn-cs"/>
-                      </a:endParaRPr>
-                    </a:p>
-                  </a:txBody>
-                  <a:tcPr anchor="ctr"/>
-                </a:tc>
-                <a:extLst>
-                  <a:ext uri="{0D108BD9-81ED-4DB2-BD59-A6C34878D82A}">
-                    <a16:rowId xmlns:a16="http://schemas.microsoft.com/office/drawing/2014/main" val="4155564115"/>
                   </a:ext>
                 </a:extLst>
               </a:tr>
@@ -13416,14 +13683,14 @@
           <p:nvPr>
             <p:extLst>
               <p:ext uri="{D42A27DB-BD31-4B8C-83A1-F6EECF244321}">
-                <p14:modId xmlns:p14="http://schemas.microsoft.com/office/powerpoint/2010/main" val="3241106897"/>
+                <p14:modId xmlns:p14="http://schemas.microsoft.com/office/powerpoint/2010/main" val="1649107167"/>
               </p:ext>
             </p:extLst>
           </p:nvPr>
         </p:nvGraphicFramePr>
         <p:xfrm>
-          <a:off x="49398" y="3833262"/>
-          <a:ext cx="1156368" cy="1295400"/>
+          <a:off x="55303" y="4748004"/>
+          <a:ext cx="1371013" cy="1554480"/>
         </p:xfrm>
         <a:graphic>
           <a:graphicData uri="http://schemas.openxmlformats.org/drawingml/2006/table">
@@ -13432,7 +13699,7 @@
                 <a:tableStyleId>{5C22544A-7EE6-4342-B048-85BDC9FD1C3A}</a:tableStyleId>
               </a:tblPr>
               <a:tblGrid>
-                <a:gridCol w="1156368">
+                <a:gridCol w="1371013">
                   <a:extLst>
                     <a:ext uri="{9D8B030D-6E8A-4147-A177-3AD203B41FA5}">
                       <a16:colId xmlns:a16="http://schemas.microsoft.com/office/drawing/2014/main" val="329139778"/>
@@ -13471,7 +13738,7 @@
                       <a:pPr algn="ctr" latinLnBrk="1"/>
                       <a:r>
                         <a:rPr lang="en-US" altLang="ko-KR" sz="1100" dirty="0"/>
-                        <a:t>address</a:t>
+                        <a:t>DELIBERY_ID</a:t>
                       </a:r>
                       <a:endParaRPr lang="ko-KR" altLang="en-US" sz="1100" dirty="0"/>
                     </a:p>
@@ -13493,7 +13760,7 @@
                       <a:pPr algn="ctr" latinLnBrk="1"/>
                       <a:r>
                         <a:rPr lang="en-US" altLang="ko-KR" sz="1100" dirty="0"/>
-                        <a:t>phone</a:t>
+                        <a:t>ADDRESS</a:t>
                       </a:r>
                       <a:endParaRPr lang="ko-KR" altLang="en-US" sz="1100" dirty="0"/>
                     </a:p>
@@ -13515,7 +13782,7 @@
                       <a:pPr algn="ctr" latinLnBrk="1"/>
                       <a:r>
                         <a:rPr lang="en-US" altLang="ko-KR" sz="1100" dirty="0"/>
-                        <a:t>recipient</a:t>
+                        <a:t>DELIVERY_STATE</a:t>
                       </a:r>
                       <a:endParaRPr lang="ko-KR" altLang="en-US" sz="1100" dirty="0"/>
                     </a:p>
@@ -13536,8 +13803,8 @@
                     <a:p>
                       <a:pPr algn="ctr" latinLnBrk="1"/>
                       <a:r>
-                        <a:rPr lang="en-US" altLang="ko-KR" sz="1100" dirty="0" err="1"/>
-                        <a:t>delivery_state</a:t>
+                        <a:rPr lang="en-US" altLang="ko-KR" sz="1100" dirty="0"/>
+                        <a:t>PHONE</a:t>
                       </a:r>
                       <a:endParaRPr lang="ko-KR" altLang="en-US" sz="1100" dirty="0"/>
                     </a:p>
@@ -13547,6 +13814,28 @@
                 <a:extLst>
                   <a:ext uri="{0D108BD9-81ED-4DB2-BD59-A6C34878D82A}">
                     <a16:rowId xmlns:a16="http://schemas.microsoft.com/office/drawing/2014/main" val="3288449375"/>
+                  </a:ext>
+                </a:extLst>
+              </a:tr>
+              <a:tr h="239050">
+                <a:tc>
+                  <a:txBody>
+                    <a:bodyPr/>
+                    <a:lstStyle/>
+                    <a:p>
+                      <a:pPr algn="ctr" latinLnBrk="1"/>
+                      <a:r>
+                        <a:rPr lang="en-US" altLang="ko-KR" sz="1100" dirty="0"/>
+                        <a:t>RECIPIENT</a:t>
+                      </a:r>
+                      <a:endParaRPr lang="ko-KR" altLang="en-US" sz="1100" dirty="0"/>
+                    </a:p>
+                  </a:txBody>
+                  <a:tcPr anchor="ctr"/>
+                </a:tc>
+                <a:extLst>
+                  <a:ext uri="{0D108BD9-81ED-4DB2-BD59-A6C34878D82A}">
+                    <a16:rowId xmlns:a16="http://schemas.microsoft.com/office/drawing/2014/main" val="598855767"/>
                   </a:ext>
                 </a:extLst>
               </a:tr>
@@ -13554,594 +13843,6 @@
           </a:graphicData>
         </a:graphic>
       </p:graphicFrame>
-      <p:graphicFrame>
-        <p:nvGraphicFramePr>
-          <p:cNvPr id="22" name="표 21">
-            <a:extLst>
-              <a:ext uri="{FF2B5EF4-FFF2-40B4-BE49-F238E27FC236}">
-                <a16:creationId xmlns:a16="http://schemas.microsoft.com/office/drawing/2014/main" id="{40F366BE-9A47-E74F-BDBB-B271FBC7031E}"/>
-              </a:ext>
-            </a:extLst>
-          </p:cNvPr>
-          <p:cNvGraphicFramePr>
-            <a:graphicFrameLocks noGrp="1"/>
-          </p:cNvGraphicFramePr>
-          <p:nvPr>
-            <p:extLst>
-              <p:ext uri="{D42A27DB-BD31-4B8C-83A1-F6EECF244321}">
-                <p14:modId xmlns:p14="http://schemas.microsoft.com/office/powerpoint/2010/main" val="2853716737"/>
-              </p:ext>
-            </p:extLst>
-          </p:nvPr>
-        </p:nvGraphicFramePr>
-        <p:xfrm>
-          <a:off x="8623541" y="1017645"/>
-          <a:ext cx="1156368" cy="777240"/>
-        </p:xfrm>
-        <a:graphic>
-          <a:graphicData uri="http://schemas.openxmlformats.org/drawingml/2006/table">
-            <a:tbl>
-              <a:tblPr firstRow="1" bandRow="1">
-                <a:tableStyleId>{5C22544A-7EE6-4342-B048-85BDC9FD1C3A}</a:tableStyleId>
-              </a:tblPr>
-              <a:tblGrid>
-                <a:gridCol w="1156368">
-                  <a:extLst>
-                    <a:ext uri="{9D8B030D-6E8A-4147-A177-3AD203B41FA5}">
-                      <a16:colId xmlns:a16="http://schemas.microsoft.com/office/drawing/2014/main" val="329139778"/>
-                    </a:ext>
-                  </a:extLst>
-                </a:gridCol>
-              </a:tblGrid>
-              <a:tr h="172876">
-                <a:tc>
-                  <a:txBody>
-                    <a:bodyPr/>
-                    <a:lstStyle/>
-                    <a:p>
-                      <a:pPr algn="ctr" latinLnBrk="1"/>
-                      <a:r>
-                        <a:rPr lang="en-US" altLang="ko-KR" sz="1100" dirty="0" err="1"/>
-                        <a:t>Category_item</a:t>
-                      </a:r>
-                      <a:endParaRPr lang="ko-KR" altLang="en-US" sz="1100" dirty="0"/>
-                    </a:p>
-                  </a:txBody>
-                  <a:tcPr anchor="ctr"/>
-                </a:tc>
-                <a:extLst>
-                  <a:ext uri="{0D108BD9-81ED-4DB2-BD59-A6C34878D82A}">
-                    <a16:rowId xmlns:a16="http://schemas.microsoft.com/office/drawing/2014/main" val="684698208"/>
-                  </a:ext>
-                </a:extLst>
-              </a:tr>
-              <a:tr h="239050">
-                <a:tc>
-                  <a:txBody>
-                    <a:bodyPr/>
-                    <a:lstStyle/>
-                    <a:p>
-                      <a:pPr marL="0" marR="0" lvl="0" indent="0" algn="ctr" defTabSz="914400" rtl="0" eaLnBrk="1" fontAlgn="auto" latinLnBrk="1" hangingPunct="1">
-                        <a:lnSpc>
-                          <a:spcPct val="100000"/>
-                        </a:lnSpc>
-                        <a:spcBef>
-                          <a:spcPts val="0"/>
-                        </a:spcBef>
-                        <a:spcAft>
-                          <a:spcPts val="0"/>
-                        </a:spcAft>
-                        <a:buClrTx/>
-                        <a:buSzTx/>
-                        <a:buFontTx/>
-                        <a:buNone/>
-                        <a:tabLst/>
-                        <a:defRPr/>
-                      </a:pPr>
-                      <a:r>
-                        <a:rPr lang="en-US" altLang="ko-KR" sz="1100" dirty="0">
-                          <a:solidFill>
-                            <a:srgbClr val="C00000"/>
-                          </a:solidFill>
-                        </a:rPr>
-                        <a:t>Item N:1</a:t>
-                      </a:r>
-                      <a:endParaRPr lang="ko-KR" altLang="en-US" sz="1100" dirty="0">
-                        <a:solidFill>
-                          <a:srgbClr val="C00000"/>
-                        </a:solidFill>
-                      </a:endParaRPr>
-                    </a:p>
-                  </a:txBody>
-                  <a:tcPr anchor="ctr"/>
-                </a:tc>
-                <a:extLst>
-                  <a:ext uri="{0D108BD9-81ED-4DB2-BD59-A6C34878D82A}">
-                    <a16:rowId xmlns:a16="http://schemas.microsoft.com/office/drawing/2014/main" val="3610887053"/>
-                  </a:ext>
-                </a:extLst>
-              </a:tr>
-              <a:tr h="239050">
-                <a:tc>
-                  <a:txBody>
-                    <a:bodyPr/>
-                    <a:lstStyle/>
-                    <a:p>
-                      <a:pPr marL="0" marR="0" lvl="0" indent="0" algn="ctr" defTabSz="914400" rtl="0" eaLnBrk="1" fontAlgn="auto" latinLnBrk="1" hangingPunct="1">
-                        <a:lnSpc>
-                          <a:spcPct val="100000"/>
-                        </a:lnSpc>
-                        <a:spcBef>
-                          <a:spcPts val="0"/>
-                        </a:spcBef>
-                        <a:spcAft>
-                          <a:spcPts val="0"/>
-                        </a:spcAft>
-                        <a:buClrTx/>
-                        <a:buSzTx/>
-                        <a:buFontTx/>
-                        <a:buNone/>
-                        <a:tabLst/>
-                        <a:defRPr/>
-                      </a:pPr>
-                      <a:r>
-                        <a:rPr lang="en-US" altLang="ko-KR" sz="1100" dirty="0">
-                          <a:solidFill>
-                            <a:srgbClr val="C00000"/>
-                          </a:solidFill>
-                        </a:rPr>
-                        <a:t>Category N:1</a:t>
-                      </a:r>
-                      <a:endParaRPr lang="ko-KR" altLang="en-US" sz="1100" dirty="0">
-                        <a:solidFill>
-                          <a:srgbClr val="C00000"/>
-                        </a:solidFill>
-                      </a:endParaRPr>
-                    </a:p>
-                  </a:txBody>
-                  <a:tcPr anchor="ctr"/>
-                </a:tc>
-                <a:extLst>
-                  <a:ext uri="{0D108BD9-81ED-4DB2-BD59-A6C34878D82A}">
-                    <a16:rowId xmlns:a16="http://schemas.microsoft.com/office/drawing/2014/main" val="1879136300"/>
-                  </a:ext>
-                </a:extLst>
-              </a:tr>
-            </a:tbl>
-          </a:graphicData>
-        </a:graphic>
-      </p:graphicFrame>
-      <p:sp>
-        <p:nvSpPr>
-          <p:cNvPr id="2" name="모서리가 둥근 직사각형 1">
-            <a:extLst>
-              <a:ext uri="{FF2B5EF4-FFF2-40B4-BE49-F238E27FC236}">
-                <a16:creationId xmlns:a16="http://schemas.microsoft.com/office/drawing/2014/main" id="{6BC2B3DD-E78E-DA4F-8887-8582C6F59930}"/>
-              </a:ext>
-            </a:extLst>
-          </p:cNvPr>
-          <p:cNvSpPr/>
-          <p:nvPr/>
-        </p:nvSpPr>
-        <p:spPr>
-          <a:xfrm>
-            <a:off x="4094323" y="229195"/>
-            <a:ext cx="773181" cy="416344"/>
-          </a:xfrm>
-          <a:prstGeom prst="roundRect">
-            <a:avLst/>
-          </a:prstGeom>
-        </p:spPr>
-        <p:style>
-          <a:lnRef idx="2">
-            <a:schemeClr val="accent6"/>
-          </a:lnRef>
-          <a:fillRef idx="1">
-            <a:schemeClr val="lt1"/>
-          </a:fillRef>
-          <a:effectRef idx="0">
-            <a:schemeClr val="accent6"/>
-          </a:effectRef>
-          <a:fontRef idx="minor">
-            <a:schemeClr val="dk1"/>
-          </a:fontRef>
-        </p:style>
-        <p:txBody>
-          <a:bodyPr rtlCol="0" anchor="ctr"/>
-          <a:lstStyle/>
-          <a:p>
-            <a:pPr algn="ctr"/>
-            <a:r>
-              <a:rPr kumimoji="1" lang="en-US" altLang="ko-Kore-KR" sz="1100" dirty="0"/>
-              <a:t>percent</a:t>
-            </a:r>
-          </a:p>
-          <a:p>
-            <a:pPr algn="ctr"/>
-            <a:r>
-              <a:rPr kumimoji="1" lang="en-US" altLang="ko-Kore-KR" sz="1100" dirty="0"/>
-              <a:t>static</a:t>
-            </a:r>
-            <a:endParaRPr kumimoji="1" lang="ko-Kore-KR" altLang="en-US" sz="1100" dirty="0"/>
-          </a:p>
-        </p:txBody>
-      </p:sp>
-      <p:sp>
-        <p:nvSpPr>
-          <p:cNvPr id="23" name="모서리가 둥근 직사각형 22">
-            <a:extLst>
-              <a:ext uri="{FF2B5EF4-FFF2-40B4-BE49-F238E27FC236}">
-                <a16:creationId xmlns:a16="http://schemas.microsoft.com/office/drawing/2014/main" id="{513744D4-997F-334C-9956-8A7F75274570}"/>
-              </a:ext>
-            </a:extLst>
-          </p:cNvPr>
-          <p:cNvSpPr/>
-          <p:nvPr/>
-        </p:nvSpPr>
-        <p:spPr>
-          <a:xfrm>
-            <a:off x="191615" y="5230478"/>
-            <a:ext cx="751687" cy="416344"/>
-          </a:xfrm>
-          <a:prstGeom prst="roundRect">
-            <a:avLst/>
-          </a:prstGeom>
-        </p:spPr>
-        <p:style>
-          <a:lnRef idx="2">
-            <a:schemeClr val="accent6"/>
-          </a:lnRef>
-          <a:fillRef idx="1">
-            <a:schemeClr val="lt1"/>
-          </a:fillRef>
-          <a:effectRef idx="0">
-            <a:schemeClr val="accent6"/>
-          </a:effectRef>
-          <a:fontRef idx="minor">
-            <a:schemeClr val="dk1"/>
-          </a:fontRef>
-        </p:style>
-        <p:txBody>
-          <a:bodyPr rtlCol="0" anchor="ctr"/>
-          <a:lstStyle/>
-          <a:p>
-            <a:pPr algn="ctr"/>
-            <a:r>
-              <a:rPr kumimoji="1" lang="en-US" altLang="ko-Kore-KR" sz="900" dirty="0"/>
-              <a:t>preparing</a:t>
-            </a:r>
-          </a:p>
-          <a:p>
-            <a:pPr algn="ctr"/>
-            <a:r>
-              <a:rPr kumimoji="1" lang="en-US" altLang="ko-Kore-KR" sz="900" dirty="0"/>
-              <a:t>shipping</a:t>
-            </a:r>
-          </a:p>
-          <a:p>
-            <a:pPr algn="ctr"/>
-            <a:r>
-              <a:rPr kumimoji="1" lang="en-US" altLang="ko-Kore-KR" sz="900" dirty="0"/>
-              <a:t>complete</a:t>
-            </a:r>
-            <a:endParaRPr kumimoji="1" lang="ko-Kore-KR" altLang="en-US" sz="900" dirty="0"/>
-          </a:p>
-        </p:txBody>
-      </p:sp>
-      <p:sp>
-        <p:nvSpPr>
-          <p:cNvPr id="24" name="모서리가 둥근 직사각형 23">
-            <a:extLst>
-              <a:ext uri="{FF2B5EF4-FFF2-40B4-BE49-F238E27FC236}">
-                <a16:creationId xmlns:a16="http://schemas.microsoft.com/office/drawing/2014/main" id="{F27297CE-BECD-D143-A2D7-D2B1BF3BB664}"/>
-              </a:ext>
-            </a:extLst>
-          </p:cNvPr>
-          <p:cNvSpPr/>
-          <p:nvPr/>
-        </p:nvSpPr>
-        <p:spPr>
-          <a:xfrm>
-            <a:off x="407205" y="6297697"/>
-            <a:ext cx="751687" cy="416344"/>
-          </a:xfrm>
-          <a:prstGeom prst="roundRect">
-            <a:avLst/>
-          </a:prstGeom>
-        </p:spPr>
-        <p:style>
-          <a:lnRef idx="2">
-            <a:schemeClr val="accent6"/>
-          </a:lnRef>
-          <a:fillRef idx="1">
-            <a:schemeClr val="lt1"/>
-          </a:fillRef>
-          <a:effectRef idx="0">
-            <a:schemeClr val="accent6"/>
-          </a:effectRef>
-          <a:fontRef idx="minor">
-            <a:schemeClr val="dk1"/>
-          </a:fontRef>
-        </p:style>
-        <p:txBody>
-          <a:bodyPr rtlCol="0" anchor="ctr"/>
-          <a:lstStyle/>
-          <a:p>
-            <a:pPr algn="ctr"/>
-            <a:r>
-              <a:rPr kumimoji="1" lang="en-US" altLang="ko-Kore-KR" sz="900" dirty="0"/>
-              <a:t>normality</a:t>
-            </a:r>
-          </a:p>
-          <a:p>
-            <a:pPr algn="ctr"/>
-            <a:r>
-              <a:rPr kumimoji="1" lang="en-US" altLang="ko-Kore-KR" sz="900" dirty="0"/>
-              <a:t>cancel</a:t>
-            </a:r>
-            <a:endParaRPr kumimoji="1" lang="ko-Kore-KR" altLang="en-US" sz="900" dirty="0"/>
-          </a:p>
-        </p:txBody>
-      </p:sp>
-      <p:sp>
-        <p:nvSpPr>
-          <p:cNvPr id="27" name="모서리가 둥근 직사각형 26">
-            <a:extLst>
-              <a:ext uri="{FF2B5EF4-FFF2-40B4-BE49-F238E27FC236}">
-                <a16:creationId xmlns:a16="http://schemas.microsoft.com/office/drawing/2014/main" id="{670199D8-D819-5D4E-ADCD-9F4240D7D75B}"/>
-              </a:ext>
-            </a:extLst>
-          </p:cNvPr>
-          <p:cNvSpPr/>
-          <p:nvPr/>
-        </p:nvSpPr>
-        <p:spPr>
-          <a:xfrm>
-            <a:off x="5546782" y="1732624"/>
-            <a:ext cx="898531" cy="521024"/>
-          </a:xfrm>
-          <a:prstGeom prst="roundRect">
-            <a:avLst/>
-          </a:prstGeom>
-        </p:spPr>
-        <p:style>
-          <a:lnRef idx="2">
-            <a:schemeClr val="accent6"/>
-          </a:lnRef>
-          <a:fillRef idx="1">
-            <a:schemeClr val="lt1"/>
-          </a:fillRef>
-          <a:effectRef idx="0">
-            <a:schemeClr val="accent6"/>
-          </a:effectRef>
-          <a:fontRef idx="minor">
-            <a:schemeClr val="dk1"/>
-          </a:fontRef>
-        </p:style>
-        <p:txBody>
-          <a:bodyPr rtlCol="0" anchor="ctr"/>
-          <a:lstStyle/>
-          <a:p>
-            <a:pPr algn="ctr"/>
-            <a:r>
-              <a:rPr kumimoji="1" lang="en-US" altLang="ko-Kore-KR" sz="900" dirty="0"/>
-              <a:t>normality</a:t>
-            </a:r>
-          </a:p>
-          <a:p>
-            <a:pPr algn="ctr"/>
-            <a:r>
-              <a:rPr kumimoji="1" lang="en-US" altLang="ko-Kore-KR" sz="900" dirty="0" err="1"/>
-              <a:t>sold_out</a:t>
-            </a:r>
-            <a:endParaRPr kumimoji="1" lang="en-US" altLang="ko-Kore-KR" sz="900" dirty="0"/>
-          </a:p>
-          <a:p>
-            <a:pPr algn="ctr"/>
-            <a:r>
-              <a:rPr kumimoji="1" lang="en" altLang="ko-Kore-KR" sz="900" dirty="0"/>
-              <a:t>pause</a:t>
-            </a:r>
-            <a:endParaRPr kumimoji="1" lang="ko-Kore-KR" altLang="en-US" sz="900" dirty="0"/>
-          </a:p>
-        </p:txBody>
-      </p:sp>
-      <p:sp>
-        <p:nvSpPr>
-          <p:cNvPr id="28" name="모서리가 둥근 직사각형 27">
-            <a:extLst>
-              <a:ext uri="{FF2B5EF4-FFF2-40B4-BE49-F238E27FC236}">
-                <a16:creationId xmlns:a16="http://schemas.microsoft.com/office/drawing/2014/main" id="{BF40026B-3009-FD4A-9359-9E220E6D3204}"/>
-              </a:ext>
-            </a:extLst>
-          </p:cNvPr>
-          <p:cNvSpPr/>
-          <p:nvPr/>
-        </p:nvSpPr>
-        <p:spPr>
-          <a:xfrm>
-            <a:off x="4083661" y="1116470"/>
-            <a:ext cx="1685567" cy="416344"/>
-          </a:xfrm>
-          <a:prstGeom prst="roundRect">
-            <a:avLst/>
-          </a:prstGeom>
-        </p:spPr>
-        <p:style>
-          <a:lnRef idx="2">
-            <a:schemeClr val="accent6"/>
-          </a:lnRef>
-          <a:fillRef idx="1">
-            <a:schemeClr val="lt1"/>
-          </a:fillRef>
-          <a:effectRef idx="0">
-            <a:schemeClr val="accent6"/>
-          </a:effectRef>
-          <a:fontRef idx="minor">
-            <a:schemeClr val="dk1"/>
-          </a:fontRef>
-        </p:style>
-        <p:txBody>
-          <a:bodyPr rtlCol="0" anchor="ctr"/>
-          <a:lstStyle/>
-          <a:p>
-            <a:pPr algn="ctr"/>
-            <a:r>
-              <a:rPr kumimoji="1" lang="en-US" altLang="ko-Kore-KR" sz="1100" dirty="0" err="1"/>
-              <a:t>total_price</a:t>
-            </a:r>
-            <a:r>
-              <a:rPr kumimoji="1" lang="en-US" altLang="ko-Kore-KR" sz="1100" dirty="0"/>
-              <a:t>_</a:t>
-            </a:r>
-            <a:r>
-              <a:rPr kumimoji="1" lang="ko-KR" altLang="en-US" sz="1100" dirty="0"/>
-              <a:t>숫자</a:t>
-            </a:r>
-            <a:endParaRPr kumimoji="1" lang="en-US" altLang="ko-Kore-KR" sz="1100" dirty="0"/>
-          </a:p>
-          <a:p>
-            <a:pPr algn="ctr"/>
-            <a:r>
-              <a:rPr kumimoji="1" lang="en-US" altLang="ko-Kore-KR" sz="1100" dirty="0" err="1"/>
-              <a:t>shipping_charge</a:t>
-            </a:r>
-            <a:r>
-              <a:rPr kumimoji="1" lang="en-US" altLang="ko-Kore-KR" sz="1100" dirty="0"/>
-              <a:t>_</a:t>
-            </a:r>
-            <a:r>
-              <a:rPr kumimoji="1" lang="ko-KR" altLang="en-US" sz="1100" dirty="0"/>
-              <a:t>숫자</a:t>
-            </a:r>
-            <a:endParaRPr kumimoji="1" lang="ko-Kore-KR" altLang="en-US" sz="1100" dirty="0"/>
-          </a:p>
-        </p:txBody>
-      </p:sp>
-      <p:sp>
-        <p:nvSpPr>
-          <p:cNvPr id="29" name="모서리가 둥근 직사각형 28">
-            <a:extLst>
-              <a:ext uri="{FF2B5EF4-FFF2-40B4-BE49-F238E27FC236}">
-                <a16:creationId xmlns:a16="http://schemas.microsoft.com/office/drawing/2014/main" id="{A5F94FC3-E514-1842-9CAD-DBFB192D698F}"/>
-              </a:ext>
-            </a:extLst>
-          </p:cNvPr>
-          <p:cNvSpPr/>
-          <p:nvPr/>
-        </p:nvSpPr>
-        <p:spPr>
-          <a:xfrm>
-            <a:off x="93040" y="1586713"/>
-            <a:ext cx="692507" cy="682952"/>
-          </a:xfrm>
-          <a:prstGeom prst="roundRect">
-            <a:avLst/>
-          </a:prstGeom>
-        </p:spPr>
-        <p:style>
-          <a:lnRef idx="2">
-            <a:schemeClr val="accent6"/>
-          </a:lnRef>
-          <a:fillRef idx="1">
-            <a:schemeClr val="lt1"/>
-          </a:fillRef>
-          <a:effectRef idx="0">
-            <a:schemeClr val="accent6"/>
-          </a:effectRef>
-          <a:fontRef idx="minor">
-            <a:schemeClr val="dk1"/>
-          </a:fontRef>
-        </p:style>
-        <p:txBody>
-          <a:bodyPr rtlCol="0" anchor="ctr"/>
-          <a:lstStyle/>
-          <a:p>
-            <a:pPr algn="ctr"/>
-            <a:r>
-              <a:rPr kumimoji="1" lang="en-US" altLang="ko-Kore-KR" sz="1100" dirty="0"/>
-              <a:t>admin</a:t>
-            </a:r>
-          </a:p>
-          <a:p>
-            <a:pPr algn="ctr"/>
-            <a:r>
-              <a:rPr kumimoji="1" lang="en-US" altLang="ko-Kore-KR" sz="1100" dirty="0"/>
-              <a:t>bronze</a:t>
-            </a:r>
-          </a:p>
-          <a:p>
-            <a:pPr algn="ctr"/>
-            <a:r>
-              <a:rPr kumimoji="1" lang="en-US" altLang="ko-Kore-KR" sz="1100" dirty="0"/>
-              <a:t>silver</a:t>
-            </a:r>
-          </a:p>
-          <a:p>
-            <a:pPr algn="ctr"/>
-            <a:r>
-              <a:rPr kumimoji="1" lang="en-US" altLang="ko-Kore-KR" sz="1100" dirty="0"/>
-              <a:t>gold</a:t>
-            </a:r>
-            <a:endParaRPr kumimoji="1" lang="ko-Kore-KR" altLang="en-US" sz="1100" dirty="0"/>
-          </a:p>
-        </p:txBody>
-      </p:sp>
-      <p:sp>
-        <p:nvSpPr>
-          <p:cNvPr id="30" name="모서리가 둥근 직사각형 29">
-            <a:extLst>
-              <a:ext uri="{FF2B5EF4-FFF2-40B4-BE49-F238E27FC236}">
-                <a16:creationId xmlns:a16="http://schemas.microsoft.com/office/drawing/2014/main" id="{8107D236-3E72-9448-BC10-72BE615CAF91}"/>
-              </a:ext>
-            </a:extLst>
-          </p:cNvPr>
-          <p:cNvSpPr/>
-          <p:nvPr/>
-        </p:nvSpPr>
-        <p:spPr>
-          <a:xfrm>
-            <a:off x="424231" y="5748638"/>
-            <a:ext cx="751687" cy="416344"/>
-          </a:xfrm>
-          <a:prstGeom prst="roundRect">
-            <a:avLst/>
-          </a:prstGeom>
-        </p:spPr>
-        <p:style>
-          <a:lnRef idx="2">
-            <a:schemeClr val="accent6"/>
-          </a:lnRef>
-          <a:fillRef idx="1">
-            <a:schemeClr val="lt1"/>
-          </a:fillRef>
-          <a:effectRef idx="0">
-            <a:schemeClr val="accent6"/>
-          </a:effectRef>
-          <a:fontRef idx="minor">
-            <a:schemeClr val="dk1"/>
-          </a:fontRef>
-        </p:style>
-        <p:txBody>
-          <a:bodyPr rtlCol="0" anchor="ctr"/>
-          <a:lstStyle/>
-          <a:p>
-            <a:pPr algn="ctr"/>
-            <a:r>
-              <a:rPr kumimoji="1" lang="en-US" altLang="ko-Kore-KR" sz="900" dirty="0"/>
-              <a:t>card</a:t>
-            </a:r>
-          </a:p>
-          <a:p>
-            <a:pPr algn="ctr"/>
-            <a:r>
-              <a:rPr kumimoji="1" lang="en-US" altLang="ko-Kore-KR" sz="900" dirty="0"/>
-              <a:t>bankbook</a:t>
-            </a:r>
-            <a:endParaRPr kumimoji="1" lang="ko-Kore-KR" altLang="en-US" sz="900" dirty="0"/>
-          </a:p>
-        </p:txBody>
-      </p:sp>
       <p:graphicFrame>
         <p:nvGraphicFramePr>
           <p:cNvPr id="31" name="표 30">
@@ -14157,14 +13858,14 @@
           <p:nvPr>
             <p:extLst>
               <p:ext uri="{D42A27DB-BD31-4B8C-83A1-F6EECF244321}">
-                <p14:modId xmlns:p14="http://schemas.microsoft.com/office/powerpoint/2010/main" val="2371226380"/>
+                <p14:modId xmlns:p14="http://schemas.microsoft.com/office/powerpoint/2010/main" val="3067610573"/>
               </p:ext>
             </p:extLst>
           </p:nvPr>
         </p:nvGraphicFramePr>
         <p:xfrm>
-          <a:off x="4686058" y="5747220"/>
-          <a:ext cx="1156368" cy="1036320"/>
+          <a:off x="9367275" y="5412783"/>
+          <a:ext cx="1353635" cy="1295400"/>
         </p:xfrm>
         <a:graphic>
           <a:graphicData uri="http://schemas.openxmlformats.org/drawingml/2006/table">
@@ -14173,7 +13874,7 @@
                 <a:tableStyleId>{5C22544A-7EE6-4342-B048-85BDC9FD1C3A}</a:tableStyleId>
               </a:tblPr>
               <a:tblGrid>
-                <a:gridCol w="1156368">
+                <a:gridCol w="1353635">
                   <a:extLst>
                     <a:ext uri="{9D8B030D-6E8A-4147-A177-3AD203B41FA5}">
                       <a16:colId xmlns:a16="http://schemas.microsoft.com/office/drawing/2014/main" val="329139778"/>
@@ -14229,14 +13930,14 @@
                       <a:r>
                         <a:rPr lang="en-US" altLang="ko-KR" sz="1100" dirty="0">
                           <a:solidFill>
-                            <a:srgbClr val="C00000"/>
-                          </a:solidFill>
-                        </a:rPr>
-                        <a:t>Item N:1</a:t>
+                            <a:schemeClr val="tx1"/>
+                          </a:solidFill>
+                        </a:rPr>
+                        <a:t>DETAIL_IMAGE_ID</a:t>
                       </a:r>
                       <a:endParaRPr lang="ko-KR" altLang="en-US" sz="1100" dirty="0">
                         <a:solidFill>
-                          <a:srgbClr val="C00000"/>
+                          <a:schemeClr val="tx1"/>
                         </a:solidFill>
                       </a:endParaRPr>
                     </a:p>
@@ -14257,8 +13958,38 @@
                     <a:p>
                       <a:pPr algn="ctr" latinLnBrk="1"/>
                       <a:r>
-                        <a:rPr lang="en-US" altLang="ko-KR" sz="1100" dirty="0" err="1"/>
-                        <a:t>upload_name</a:t>
+                        <a:rPr lang="en-US" altLang="ko-KR" sz="1100" dirty="0">
+                          <a:solidFill>
+                            <a:schemeClr val="tx1"/>
+                          </a:solidFill>
+                        </a:rPr>
+                        <a:t>STORE_NAME</a:t>
+                      </a:r>
+                      <a:endParaRPr lang="ko-KR" altLang="en-US" sz="1100" dirty="0">
+                        <a:solidFill>
+                          <a:schemeClr val="tx1"/>
+                        </a:solidFill>
+                      </a:endParaRPr>
+                    </a:p>
+                  </a:txBody>
+                  <a:tcPr anchor="ctr"/>
+                </a:tc>
+                <a:extLst>
+                  <a:ext uri="{0D108BD9-81ED-4DB2-BD59-A6C34878D82A}">
+                    <a16:rowId xmlns:a16="http://schemas.microsoft.com/office/drawing/2014/main" val="1431156138"/>
+                  </a:ext>
+                </a:extLst>
+              </a:tr>
+              <a:tr h="239050">
+                <a:tc>
+                  <a:txBody>
+                    <a:bodyPr/>
+                    <a:lstStyle/>
+                    <a:p>
+                      <a:pPr algn="ctr" latinLnBrk="1"/>
+                      <a:r>
+                        <a:rPr lang="en-US" altLang="ko-KR" sz="1100" dirty="0"/>
+                        <a:t>UPLOAD_NAME</a:t>
                       </a:r>
                       <a:endParaRPr lang="ko-KR" altLang="en-US" sz="1100" dirty="0"/>
                     </a:p>
@@ -14267,20 +13998,20 @@
                 </a:tc>
                 <a:extLst>
                   <a:ext uri="{0D108BD9-81ED-4DB2-BD59-A6C34878D82A}">
-                    <a16:rowId xmlns:a16="http://schemas.microsoft.com/office/drawing/2014/main" val="1431156138"/>
-                  </a:ext>
-                </a:extLst>
-              </a:tr>
-              <a:tr h="239050">
-                <a:tc>
-                  <a:txBody>
-                    <a:bodyPr/>
-                    <a:lstStyle/>
-                    <a:p>
-                      <a:pPr algn="ctr" latinLnBrk="1"/>
-                      <a:r>
-                        <a:rPr lang="en-US" altLang="ko-KR" sz="1100" dirty="0" err="1"/>
-                        <a:t>store_name</a:t>
+                    <a16:rowId xmlns:a16="http://schemas.microsoft.com/office/drawing/2014/main" val="3029070334"/>
+                  </a:ext>
+                </a:extLst>
+              </a:tr>
+              <a:tr h="239050">
+                <a:tc>
+                  <a:txBody>
+                    <a:bodyPr/>
+                    <a:lstStyle/>
+                    <a:p>
+                      <a:pPr algn="ctr" latinLnBrk="1"/>
+                      <a:r>
+                        <a:rPr lang="en-US" altLang="ko-KR" sz="1100" dirty="0"/>
+                        <a:t>ITEM_ID</a:t>
                       </a:r>
                       <a:endParaRPr lang="ko-KR" altLang="en-US" sz="1100" dirty="0"/>
                     </a:p>
@@ -14289,7 +14020,7 @@
                 </a:tc>
                 <a:extLst>
                   <a:ext uri="{0D108BD9-81ED-4DB2-BD59-A6C34878D82A}">
-                    <a16:rowId xmlns:a16="http://schemas.microsoft.com/office/drawing/2014/main" val="3029070334"/>
+                    <a16:rowId xmlns:a16="http://schemas.microsoft.com/office/drawing/2014/main" val="911468289"/>
                   </a:ext>
                 </a:extLst>
               </a:tr>
@@ -14300,7 +14031,7 @@
     </p:spTree>
     <p:extLst>
       <p:ext uri="{BB962C8B-B14F-4D97-AF65-F5344CB8AC3E}">
-        <p14:creationId xmlns:p14="http://schemas.microsoft.com/office/powerpoint/2010/main" val="1168201652"/>
+        <p14:creationId xmlns:p14="http://schemas.microsoft.com/office/powerpoint/2010/main" val="7633587"/>
       </p:ext>
     </p:extLst>
   </p:cSld>

</xml_diff>

<commit_message>
Add readme And refactoring
</commit_message>
<xml_diff>
--- a/DB 설계.pptx
+++ b/DB 설계.pptx
@@ -198,7 +198,7 @@
           <a:p>
             <a:fld id="{6C5DBB6D-5226-2A49-ABF7-57F1FB2574B4}" type="datetimeFigureOut">
               <a:rPr kumimoji="1" lang="ko-Kore-KR" altLang="en-US" smtClean="0"/>
-              <a:t>2022. 2. 6.</a:t>
+              <a:t>2022. 2. 23.</a:t>
             </a:fld>
             <a:endParaRPr kumimoji="1" lang="ko-Kore-KR" altLang="en-US"/>
           </a:p>
@@ -781,7 +781,7 @@
           <a:p>
             <a:fld id="{13A5D19F-5D9F-4A76-AB4A-89CB286FCE28}" type="datetimeFigureOut">
               <a:rPr lang="ko-KR" altLang="en-US" smtClean="0"/>
-              <a:t>2022. 2. 6.</a:t>
+              <a:t>2022. 2. 23.</a:t>
             </a:fld>
             <a:endParaRPr lang="ko-KR" altLang="en-US"/>
           </a:p>
@@ -979,7 +979,7 @@
           <a:p>
             <a:fld id="{13A5D19F-5D9F-4A76-AB4A-89CB286FCE28}" type="datetimeFigureOut">
               <a:rPr lang="ko-KR" altLang="en-US" smtClean="0"/>
-              <a:t>2022. 2. 6.</a:t>
+              <a:t>2022. 2. 23.</a:t>
             </a:fld>
             <a:endParaRPr lang="ko-KR" altLang="en-US"/>
           </a:p>
@@ -1187,7 +1187,7 @@
           <a:p>
             <a:fld id="{13A5D19F-5D9F-4A76-AB4A-89CB286FCE28}" type="datetimeFigureOut">
               <a:rPr lang="ko-KR" altLang="en-US" smtClean="0"/>
-              <a:t>2022. 2. 6.</a:t>
+              <a:t>2022. 2. 23.</a:t>
             </a:fld>
             <a:endParaRPr lang="ko-KR" altLang="en-US"/>
           </a:p>
@@ -1385,7 +1385,7 @@
           <a:p>
             <a:fld id="{13A5D19F-5D9F-4A76-AB4A-89CB286FCE28}" type="datetimeFigureOut">
               <a:rPr lang="ko-KR" altLang="en-US" smtClean="0"/>
-              <a:t>2022. 2. 6.</a:t>
+              <a:t>2022. 2. 23.</a:t>
             </a:fld>
             <a:endParaRPr lang="ko-KR" altLang="en-US"/>
           </a:p>
@@ -1660,7 +1660,7 @@
           <a:p>
             <a:fld id="{13A5D19F-5D9F-4A76-AB4A-89CB286FCE28}" type="datetimeFigureOut">
               <a:rPr lang="ko-KR" altLang="en-US" smtClean="0"/>
-              <a:t>2022. 2. 6.</a:t>
+              <a:t>2022. 2. 23.</a:t>
             </a:fld>
             <a:endParaRPr lang="ko-KR" altLang="en-US"/>
           </a:p>
@@ -1925,7 +1925,7 @@
           <a:p>
             <a:fld id="{13A5D19F-5D9F-4A76-AB4A-89CB286FCE28}" type="datetimeFigureOut">
               <a:rPr lang="ko-KR" altLang="en-US" smtClean="0"/>
-              <a:t>2022. 2. 6.</a:t>
+              <a:t>2022. 2. 23.</a:t>
             </a:fld>
             <a:endParaRPr lang="ko-KR" altLang="en-US"/>
           </a:p>
@@ -2337,7 +2337,7 @@
           <a:p>
             <a:fld id="{13A5D19F-5D9F-4A76-AB4A-89CB286FCE28}" type="datetimeFigureOut">
               <a:rPr lang="ko-KR" altLang="en-US" smtClean="0"/>
-              <a:t>2022. 2. 6.</a:t>
+              <a:t>2022. 2. 23.</a:t>
             </a:fld>
             <a:endParaRPr lang="ko-KR" altLang="en-US"/>
           </a:p>
@@ -2478,7 +2478,7 @@
           <a:p>
             <a:fld id="{13A5D19F-5D9F-4A76-AB4A-89CB286FCE28}" type="datetimeFigureOut">
               <a:rPr lang="ko-KR" altLang="en-US" smtClean="0"/>
-              <a:t>2022. 2. 6.</a:t>
+              <a:t>2022. 2. 23.</a:t>
             </a:fld>
             <a:endParaRPr lang="ko-KR" altLang="en-US"/>
           </a:p>
@@ -2591,7 +2591,7 @@
           <a:p>
             <a:fld id="{13A5D19F-5D9F-4A76-AB4A-89CB286FCE28}" type="datetimeFigureOut">
               <a:rPr lang="ko-KR" altLang="en-US" smtClean="0"/>
-              <a:t>2022. 2. 6.</a:t>
+              <a:t>2022. 2. 23.</a:t>
             </a:fld>
             <a:endParaRPr lang="ko-KR" altLang="en-US"/>
           </a:p>
@@ -2902,7 +2902,7 @@
           <a:p>
             <a:fld id="{13A5D19F-5D9F-4A76-AB4A-89CB286FCE28}" type="datetimeFigureOut">
               <a:rPr lang="ko-KR" altLang="en-US" smtClean="0"/>
-              <a:t>2022. 2. 6.</a:t>
+              <a:t>2022. 2. 23.</a:t>
             </a:fld>
             <a:endParaRPr lang="ko-KR" altLang="en-US"/>
           </a:p>
@@ -3190,7 +3190,7 @@
           <a:p>
             <a:fld id="{13A5D19F-5D9F-4A76-AB4A-89CB286FCE28}" type="datetimeFigureOut">
               <a:rPr lang="ko-KR" altLang="en-US" smtClean="0"/>
-              <a:t>2022. 2. 6.</a:t>
+              <a:t>2022. 2. 23.</a:t>
             </a:fld>
             <a:endParaRPr lang="ko-KR" altLang="en-US"/>
           </a:p>
@@ -3431,7 +3431,7 @@
           <a:p>
             <a:fld id="{13A5D19F-5D9F-4A76-AB4A-89CB286FCE28}" type="datetimeFigureOut">
               <a:rPr lang="ko-KR" altLang="en-US" smtClean="0"/>
-              <a:t>2022. 2. 6.</a:t>
+              <a:t>2022. 2. 23.</a:t>
             </a:fld>
             <a:endParaRPr lang="ko-KR" altLang="en-US"/>
           </a:p>
@@ -3860,7 +3860,13 @@
           <p:cNvGraphicFramePr>
             <a:graphicFrameLocks noGrp="1"/>
           </p:cNvGraphicFramePr>
-          <p:nvPr/>
+          <p:nvPr>
+            <p:extLst>
+              <p:ext uri="{D42A27DB-BD31-4B8C-83A1-F6EECF244321}">
+                <p14:modId xmlns:p14="http://schemas.microsoft.com/office/powerpoint/2010/main" val="1138730717"/>
+              </p:ext>
+            </p:extLst>
+          </p:nvPr>
         </p:nvGraphicFramePr>
         <p:xfrm>
           <a:off x="891279" y="14515"/>
@@ -4021,10 +4027,18 @@
                     <a:p>
                       <a:pPr algn="ctr" latinLnBrk="1"/>
                       <a:r>
-                        <a:rPr lang="en-US" altLang="ko-KR" sz="800" dirty="0" err="1"/>
+                        <a:rPr lang="en-US" altLang="ko-KR" sz="800" dirty="0" err="1">
+                          <a:solidFill>
+                            <a:srgbClr val="00B050"/>
+                          </a:solidFill>
+                        </a:rPr>
                         <a:t>member_role</a:t>
                       </a:r>
-                      <a:endParaRPr lang="ko-KR" altLang="en-US" sz="800" dirty="0"/>
+                      <a:endParaRPr lang="ko-KR" altLang="en-US" sz="800" dirty="0">
+                        <a:solidFill>
+                          <a:srgbClr val="00B050"/>
+                        </a:solidFill>
+                      </a:endParaRPr>
                     </a:p>
                   </a:txBody>
                   <a:tcPr anchor="ctr"/>
@@ -4345,7 +4359,13 @@
           <p:cNvGraphicFramePr>
             <a:graphicFrameLocks noGrp="1"/>
           </p:cNvGraphicFramePr>
-          <p:nvPr/>
+          <p:nvPr>
+            <p:extLst>
+              <p:ext uri="{D42A27DB-BD31-4B8C-83A1-F6EECF244321}">
+                <p14:modId xmlns:p14="http://schemas.microsoft.com/office/powerpoint/2010/main" val="1039824964"/>
+              </p:ext>
+            </p:extLst>
+          </p:nvPr>
         </p:nvGraphicFramePr>
         <p:xfrm>
           <a:off x="1255723" y="3833262"/>
@@ -4568,10 +4588,18 @@
                         <a:defRPr/>
                       </a:pPr>
                       <a:r>
-                        <a:rPr lang="en-US" altLang="ko-KR" sz="1100" dirty="0" err="1"/>
+                        <a:rPr lang="en-US" altLang="ko-KR" sz="1100" dirty="0" err="1">
+                          <a:solidFill>
+                            <a:srgbClr val="00B050"/>
+                          </a:solidFill>
+                        </a:rPr>
                         <a:t>pay_method</a:t>
                       </a:r>
-                      <a:endParaRPr lang="ko-KR" altLang="en-US" sz="1100" dirty="0"/>
+                      <a:endParaRPr lang="ko-KR" altLang="en-US" sz="1100" dirty="0">
+                        <a:solidFill>
+                          <a:srgbClr val="00B050"/>
+                        </a:solidFill>
+                      </a:endParaRPr>
                     </a:p>
                   </a:txBody>
                   <a:tcPr anchor="ctr"/>
@@ -4612,10 +4640,18 @@
                     <a:p>
                       <a:pPr algn="ctr" latinLnBrk="1"/>
                       <a:r>
-                        <a:rPr lang="en-US" altLang="ko-KR" sz="1100" dirty="0" err="1"/>
+                        <a:rPr lang="en-US" altLang="ko-KR" sz="1100" dirty="0" err="1">
+                          <a:solidFill>
+                            <a:srgbClr val="00B050"/>
+                          </a:solidFill>
+                        </a:rPr>
                         <a:t>order_state</a:t>
                       </a:r>
-                      <a:endParaRPr lang="ko-KR" altLang="en-US" sz="1100" dirty="0"/>
+                      <a:endParaRPr lang="ko-KR" altLang="en-US" sz="1100" dirty="0">
+                        <a:solidFill>
+                          <a:srgbClr val="00B050"/>
+                        </a:solidFill>
+                      </a:endParaRPr>
                     </a:p>
                   </a:txBody>
                   <a:tcPr anchor="ctr"/>
@@ -4707,14 +4743,14 @@
           <p:nvPr>
             <p:extLst>
               <p:ext uri="{D42A27DB-BD31-4B8C-83A1-F6EECF244321}">
-                <p14:modId xmlns:p14="http://schemas.microsoft.com/office/powerpoint/2010/main" val="1133068660"/>
+                <p14:modId xmlns:p14="http://schemas.microsoft.com/office/powerpoint/2010/main" val="3118184042"/>
               </p:ext>
             </p:extLst>
           </p:nvPr>
         </p:nvGraphicFramePr>
         <p:xfrm>
-          <a:off x="2639120" y="4359081"/>
-          <a:ext cx="1156368" cy="2849880"/>
+          <a:off x="2638056" y="4070964"/>
+          <a:ext cx="1156368" cy="2766060"/>
         </p:xfrm>
         <a:graphic>
           <a:graphicData uri="http://schemas.openxmlformats.org/drawingml/2006/table">
@@ -4739,10 +4775,10 @@
                     <a:p>
                       <a:pPr algn="ctr" latinLnBrk="1"/>
                       <a:r>
-                        <a:rPr lang="en-US" altLang="ko-KR" sz="1100" dirty="0" err="1"/>
+                        <a:rPr lang="en-US" altLang="ko-KR" sz="1050" dirty="0" err="1"/>
                         <a:t>Order_item</a:t>
                       </a:r>
-                      <a:endParaRPr lang="ko-KR" altLang="en-US" sz="1100" dirty="0"/>
+                      <a:endParaRPr lang="ko-KR" altLang="en-US" sz="1050" dirty="0"/>
                     </a:p>
                   </a:txBody>
                   <a:tcPr anchor="ctr"/>
@@ -4761,14 +4797,14 @@
                     <a:p>
                       <a:pPr algn="ctr" latinLnBrk="1"/>
                       <a:r>
-                        <a:rPr lang="en-US" altLang="ko-KR" sz="1100" dirty="0">
+                        <a:rPr lang="en-US" altLang="ko-KR" sz="1050" dirty="0">
                           <a:solidFill>
                             <a:srgbClr val="C00000"/>
                           </a:solidFill>
                         </a:rPr>
                         <a:t>Order N:1</a:t>
                       </a:r>
-                      <a:endParaRPr lang="ko-KR" altLang="en-US" sz="1100" dirty="0">
+                      <a:endParaRPr lang="ko-KR" altLang="en-US" sz="1050" dirty="0">
                         <a:solidFill>
                           <a:srgbClr val="C00000"/>
                         </a:solidFill>
@@ -4791,14 +4827,14 @@
                     <a:p>
                       <a:pPr algn="ctr" latinLnBrk="1"/>
                       <a:r>
-                        <a:rPr lang="en-US" altLang="ko-KR" sz="1100">
+                        <a:rPr lang="en-US" altLang="ko-KR" sz="1050">
                           <a:solidFill>
                             <a:srgbClr val="C00000"/>
                           </a:solidFill>
                         </a:rPr>
                         <a:t>Item N:1</a:t>
                       </a:r>
-                      <a:endParaRPr lang="ko-KR" altLang="en-US" sz="1100" dirty="0">
+                      <a:endParaRPr lang="ko-KR" altLang="en-US" sz="1050" dirty="0">
                         <a:solidFill>
                           <a:srgbClr val="C00000"/>
                         </a:solidFill>
@@ -4821,10 +4857,10 @@
                     <a:p>
                       <a:pPr algn="ctr" latinLnBrk="1"/>
                       <a:r>
-                        <a:rPr lang="en-US" altLang="ko-KR" sz="1100" dirty="0" err="1"/>
+                        <a:rPr lang="en-US" altLang="ko-KR" sz="1050" dirty="0" err="1"/>
                         <a:t>item_price</a:t>
                       </a:r>
-                      <a:endParaRPr lang="ko-KR" altLang="en-US" sz="1100" dirty="0"/>
+                      <a:endParaRPr lang="ko-KR" altLang="en-US" sz="1050" dirty="0"/>
                     </a:p>
                   </a:txBody>
                   <a:tcPr anchor="ctr"/>
@@ -4843,14 +4879,14 @@
                     <a:p>
                       <a:pPr algn="ctr" latinLnBrk="1"/>
                       <a:r>
-                        <a:rPr lang="en-US" altLang="ko-KR" sz="1100" dirty="0">
+                        <a:rPr lang="en-US" altLang="ko-KR" sz="1050" dirty="0">
                           <a:solidFill>
                             <a:schemeClr val="tx1"/>
                           </a:solidFill>
                         </a:rPr>
                         <a:t>option1</a:t>
                       </a:r>
-                      <a:endParaRPr lang="ko-KR" altLang="en-US" sz="1100" dirty="0">
+                      <a:endParaRPr lang="ko-KR" altLang="en-US" sz="1050" dirty="0">
                         <a:solidFill>
                           <a:schemeClr val="tx1"/>
                         </a:solidFill>
@@ -4873,14 +4909,14 @@
                     <a:p>
                       <a:pPr algn="ctr" latinLnBrk="1"/>
                       <a:r>
-                        <a:rPr lang="en-US" altLang="ko-KR" sz="1100" dirty="0">
+                        <a:rPr lang="en-US" altLang="ko-KR" sz="1050" dirty="0">
                           <a:solidFill>
                             <a:schemeClr val="tx1"/>
                           </a:solidFill>
                         </a:rPr>
                         <a:t>option2</a:t>
                       </a:r>
-                      <a:endParaRPr lang="ko-KR" altLang="en-US" sz="1100" dirty="0">
+                      <a:endParaRPr lang="ko-KR" altLang="en-US" sz="1050" dirty="0">
                         <a:solidFill>
                           <a:schemeClr val="tx1"/>
                         </a:solidFill>
@@ -4903,14 +4939,14 @@
                     <a:p>
                       <a:pPr algn="ctr" latinLnBrk="1"/>
                       <a:r>
-                        <a:rPr lang="en-US" altLang="ko-KR" sz="1100" dirty="0" err="1">
+                        <a:rPr lang="en-US" altLang="ko-KR" sz="1050" dirty="0" err="1">
                           <a:solidFill>
                             <a:schemeClr val="tx1"/>
                           </a:solidFill>
                         </a:rPr>
                         <a:t>item_name</a:t>
                       </a:r>
-                      <a:endParaRPr lang="ko-KR" altLang="en-US" sz="1100" dirty="0">
+                      <a:endParaRPr lang="ko-KR" altLang="en-US" sz="1050" dirty="0">
                         <a:solidFill>
                           <a:schemeClr val="tx1"/>
                         </a:solidFill>
@@ -4933,10 +4969,10 @@
                     <a:p>
                       <a:pPr algn="ctr" latinLnBrk="1"/>
                       <a:r>
-                        <a:rPr lang="en-US" altLang="ko-KR" sz="1100" dirty="0"/>
+                        <a:rPr lang="en-US" altLang="ko-KR" sz="1050" dirty="0"/>
                         <a:t>count</a:t>
                       </a:r>
-                      <a:endParaRPr lang="ko-KR" altLang="en-US" sz="1100" dirty="0"/>
+                      <a:endParaRPr lang="ko-KR" altLang="en-US" sz="1050" dirty="0"/>
                     </a:p>
                   </a:txBody>
                   <a:tcPr anchor="ctr"/>
@@ -4955,10 +4991,10 @@
                     <a:p>
                       <a:pPr algn="ctr" latinLnBrk="1"/>
                       <a:r>
-                        <a:rPr lang="en-US" altLang="ko-KR" sz="1100" dirty="0" err="1"/>
+                        <a:rPr lang="en-US" altLang="ko-KR" sz="1050" dirty="0" err="1"/>
                         <a:t>item_version</a:t>
                       </a:r>
-                      <a:endParaRPr lang="ko-KR" altLang="en-US" sz="1100" dirty="0"/>
+                      <a:endParaRPr lang="ko-KR" altLang="en-US" sz="1050" dirty="0"/>
                     </a:p>
                   </a:txBody>
                   <a:tcPr anchor="ctr"/>
@@ -4977,10 +5013,10 @@
                     <a:p>
                       <a:pPr algn="ctr" latinLnBrk="1"/>
                       <a:r>
-                        <a:rPr lang="en-US" altLang="ko-KR" sz="1100" dirty="0" err="1"/>
+                        <a:rPr lang="en-US" altLang="ko-KR" sz="1050" dirty="0" err="1"/>
                         <a:t>thumbnailUrl</a:t>
                       </a:r>
-                      <a:endParaRPr lang="ko-KR" altLang="en-US" sz="1100" dirty="0"/>
+                      <a:endParaRPr lang="ko-KR" altLang="en-US" sz="1050" dirty="0"/>
                     </a:p>
                   </a:txBody>
                   <a:tcPr anchor="ctr"/>
@@ -4999,10 +5035,10 @@
                     <a:p>
                       <a:pPr algn="ctr" latinLnBrk="1"/>
                       <a:r>
-                        <a:rPr lang="en-US" altLang="ko-KR" sz="1100" dirty="0" err="1"/>
+                        <a:rPr lang="en-US" altLang="ko-KR" sz="1050" dirty="0" err="1"/>
                         <a:t>isReviewed</a:t>
                       </a:r>
-                      <a:endParaRPr lang="ko-KR" altLang="en-US" sz="1100" dirty="0"/>
+                      <a:endParaRPr lang="ko-KR" altLang="en-US" sz="1050" dirty="0"/>
                     </a:p>
                   </a:txBody>
                   <a:tcPr anchor="ctr"/>
@@ -5032,14 +5068,14 @@
           <p:nvPr>
             <p:extLst>
               <p:ext uri="{D42A27DB-BD31-4B8C-83A1-F6EECF244321}">
-                <p14:modId xmlns:p14="http://schemas.microsoft.com/office/powerpoint/2010/main" val="919051863"/>
+                <p14:modId xmlns:p14="http://schemas.microsoft.com/office/powerpoint/2010/main" val="3149735260"/>
               </p:ext>
             </p:extLst>
           </p:nvPr>
         </p:nvGraphicFramePr>
         <p:xfrm>
-          <a:off x="2626803" y="2454780"/>
-          <a:ext cx="1156368" cy="1813560"/>
+          <a:off x="2623119" y="2294269"/>
+          <a:ext cx="1156368" cy="1760220"/>
         </p:xfrm>
         <a:graphic>
           <a:graphicData uri="http://schemas.openxmlformats.org/drawingml/2006/table">
@@ -5064,10 +5100,10 @@
                     <a:p>
                       <a:pPr algn="ctr" latinLnBrk="1"/>
                       <a:r>
-                        <a:rPr lang="en-US" altLang="ko-KR" sz="1100" dirty="0" err="1"/>
+                        <a:rPr lang="en-US" altLang="ko-KR" sz="1050" dirty="0" err="1"/>
                         <a:t>Cart_item</a:t>
                       </a:r>
-                      <a:endParaRPr lang="ko-KR" altLang="en-US" sz="1100" dirty="0"/>
+                      <a:endParaRPr lang="ko-KR" altLang="en-US" sz="1050" dirty="0"/>
                     </a:p>
                   </a:txBody>
                   <a:tcPr anchor="ctr"/>
@@ -5086,14 +5122,14 @@
                     <a:p>
                       <a:pPr algn="ctr" latinLnBrk="1"/>
                       <a:r>
-                        <a:rPr lang="en-US" altLang="ko-KR" sz="1100" dirty="0">
+                        <a:rPr lang="en-US" altLang="ko-KR" sz="1050" dirty="0">
                           <a:solidFill>
                             <a:srgbClr val="C00000"/>
                           </a:solidFill>
                         </a:rPr>
                         <a:t>Item N:1</a:t>
                       </a:r>
-                      <a:endParaRPr lang="ko-KR" altLang="en-US" sz="1100" dirty="0">
+                      <a:endParaRPr lang="ko-KR" altLang="en-US" sz="1050" dirty="0">
                         <a:solidFill>
                           <a:srgbClr val="C00000"/>
                         </a:solidFill>
@@ -5116,10 +5152,10 @@
                     <a:p>
                       <a:pPr algn="ctr" latinLnBrk="1"/>
                       <a:r>
-                        <a:rPr lang="en-US" altLang="ko-KR" sz="1100" dirty="0" err="1"/>
+                        <a:rPr lang="en-US" altLang="ko-KR" sz="1050" dirty="0" err="1"/>
                         <a:t>item_version</a:t>
                       </a:r>
-                      <a:endParaRPr lang="en-US" altLang="ko-KR" sz="1100" dirty="0"/>
+                      <a:endParaRPr lang="en-US" altLang="ko-KR" sz="1050" dirty="0"/>
                     </a:p>
                   </a:txBody>
                   <a:tcPr anchor="ctr"/>
@@ -5138,14 +5174,14 @@
                     <a:p>
                       <a:pPr algn="ctr" latinLnBrk="1"/>
                       <a:r>
-                        <a:rPr lang="en-US" altLang="ko-KR" sz="1100" dirty="0">
+                        <a:rPr lang="en-US" altLang="ko-KR" sz="1050" dirty="0">
                           <a:solidFill>
                             <a:srgbClr val="C00000"/>
                           </a:solidFill>
                         </a:rPr>
                         <a:t>Member N:1</a:t>
                       </a:r>
-                      <a:endParaRPr lang="ko-KR" altLang="en-US" sz="1100" dirty="0">
+                      <a:endParaRPr lang="ko-KR" altLang="en-US" sz="1050" dirty="0">
                         <a:solidFill>
                           <a:srgbClr val="C00000"/>
                         </a:solidFill>
@@ -5168,14 +5204,14 @@
                     <a:p>
                       <a:pPr algn="ctr" latinLnBrk="1"/>
                       <a:r>
-                        <a:rPr lang="en-US" altLang="ko-KR" sz="1100" dirty="0">
+                        <a:rPr lang="en-US" altLang="ko-KR" sz="1050" dirty="0">
                           <a:solidFill>
                             <a:srgbClr val="C00000"/>
                           </a:solidFill>
                         </a:rPr>
                         <a:t>Option1 N:1</a:t>
                       </a:r>
-                      <a:endParaRPr lang="ko-KR" altLang="en-US" sz="1100" dirty="0">
+                      <a:endParaRPr lang="ko-KR" altLang="en-US" sz="1050" dirty="0">
                         <a:solidFill>
                           <a:srgbClr val="C00000"/>
                         </a:solidFill>
@@ -5198,14 +5234,14 @@
                     <a:p>
                       <a:pPr algn="ctr" latinLnBrk="1"/>
                       <a:r>
-                        <a:rPr lang="en-US" altLang="ko-KR" sz="1100" dirty="0">
+                        <a:rPr lang="en-US" altLang="ko-KR" sz="1050" dirty="0">
                           <a:solidFill>
                             <a:srgbClr val="C00000"/>
                           </a:solidFill>
                         </a:rPr>
                         <a:t>Option2 N:1</a:t>
                       </a:r>
-                      <a:endParaRPr lang="ko-KR" altLang="en-US" sz="1100" dirty="0">
+                      <a:endParaRPr lang="ko-KR" altLang="en-US" sz="1050" dirty="0">
                         <a:solidFill>
                           <a:srgbClr val="C00000"/>
                         </a:solidFill>
@@ -5228,10 +5264,10 @@
                     <a:p>
                       <a:pPr algn="ctr" latinLnBrk="1"/>
                       <a:r>
-                        <a:rPr lang="en-US" altLang="ko-KR" sz="1100" dirty="0"/>
+                        <a:rPr lang="en-US" altLang="ko-KR" sz="1050" dirty="0"/>
                         <a:t>count</a:t>
                       </a:r>
-                      <a:endParaRPr lang="ko-KR" altLang="en-US" sz="1100" dirty="0"/>
+                      <a:endParaRPr lang="ko-KR" altLang="en-US" sz="1050" dirty="0"/>
                     </a:p>
                   </a:txBody>
                   <a:tcPr anchor="ctr"/>
@@ -5261,13 +5297,13 @@
           <p:nvPr>
             <p:extLst>
               <p:ext uri="{D42A27DB-BD31-4B8C-83A1-F6EECF244321}">
-                <p14:modId xmlns:p14="http://schemas.microsoft.com/office/powerpoint/2010/main" val="980920800"/>
+                <p14:modId xmlns:p14="http://schemas.microsoft.com/office/powerpoint/2010/main" val="2340635392"/>
               </p:ext>
             </p:extLst>
           </p:nvPr>
         </p:nvGraphicFramePr>
         <p:xfrm>
-          <a:off x="4094323" y="1609059"/>
+          <a:off x="4464191" y="1609059"/>
           <a:ext cx="1294061" cy="777240"/>
         </p:xfrm>
         <a:graphic>
@@ -5383,11 +5419,17 @@
           <p:cNvGraphicFramePr>
             <a:graphicFrameLocks noGrp="1"/>
           </p:cNvGraphicFramePr>
-          <p:nvPr/>
+          <p:nvPr>
+            <p:extLst>
+              <p:ext uri="{D42A27DB-BD31-4B8C-83A1-F6EECF244321}">
+                <p14:modId xmlns:p14="http://schemas.microsoft.com/office/powerpoint/2010/main" val="3983634468"/>
+              </p:ext>
+            </p:extLst>
+          </p:nvPr>
         </p:nvGraphicFramePr>
         <p:xfrm>
           <a:off x="2608736" y="0"/>
-          <a:ext cx="1420569" cy="2331720"/>
+          <a:ext cx="1420569" cy="2263140"/>
         </p:xfrm>
         <a:graphic>
           <a:graphicData uri="http://schemas.openxmlformats.org/drawingml/2006/table">
@@ -5412,10 +5454,10 @@
                     <a:p>
                       <a:pPr algn="ctr" latinLnBrk="1"/>
                       <a:r>
-                        <a:rPr lang="en-US" altLang="ko-KR" sz="1100" dirty="0"/>
+                        <a:rPr lang="en-US" altLang="ko-KR" sz="1050" dirty="0"/>
                         <a:t>Coupon</a:t>
                       </a:r>
-                      <a:endParaRPr lang="ko-KR" altLang="en-US" sz="1100" dirty="0"/>
+                      <a:endParaRPr lang="ko-KR" altLang="en-US" sz="1050" dirty="0"/>
                     </a:p>
                   </a:txBody>
                   <a:tcPr anchor="ctr"/>
@@ -5450,10 +5492,18 @@
                         <a:defRPr/>
                       </a:pPr>
                       <a:r>
-                        <a:rPr lang="en-US" altLang="ko-KR" sz="1100" dirty="0" err="1"/>
+                        <a:rPr lang="en-US" altLang="ko-KR" sz="1050" dirty="0" err="1">
+                          <a:solidFill>
+                            <a:srgbClr val="00B050"/>
+                          </a:solidFill>
+                        </a:rPr>
                         <a:t>coupon_kind</a:t>
                       </a:r>
-                      <a:endParaRPr lang="ko-KR" altLang="en-US" sz="1100" dirty="0"/>
+                      <a:endParaRPr lang="ko-KR" altLang="en-US" sz="1050" dirty="0">
+                        <a:solidFill>
+                          <a:srgbClr val="00B050"/>
+                        </a:solidFill>
+                      </a:endParaRPr>
                     </a:p>
                   </a:txBody>
                   <a:tcPr anchor="ctr"/>
@@ -5472,10 +5522,10 @@
                     <a:p>
                       <a:pPr algn="ctr" latinLnBrk="1"/>
                       <a:r>
-                        <a:rPr lang="en-US" altLang="ko-KR" sz="1100" dirty="0"/>
+                        <a:rPr lang="en-US" altLang="ko-KR" sz="1050" dirty="0"/>
                         <a:t>rate</a:t>
                       </a:r>
-                      <a:endParaRPr lang="ko-KR" altLang="en-US" sz="1100" dirty="0"/>
+                      <a:endParaRPr lang="ko-KR" altLang="en-US" sz="1050" dirty="0"/>
                     </a:p>
                   </a:txBody>
                   <a:tcPr anchor="ctr"/>
@@ -5494,10 +5544,10 @@
                     <a:p>
                       <a:pPr algn="ctr" latinLnBrk="1"/>
                       <a:r>
-                        <a:rPr lang="en-US" altLang="ko-KR" sz="1100" dirty="0" err="1"/>
+                        <a:rPr lang="en-US" altLang="ko-KR" sz="1050" dirty="0" err="1"/>
                         <a:t>expired_date</a:t>
                       </a:r>
-                      <a:endParaRPr lang="ko-KR" altLang="en-US" sz="1100" dirty="0"/>
+                      <a:endParaRPr lang="ko-KR" altLang="en-US" sz="1050" dirty="0"/>
                     </a:p>
                   </a:txBody>
                   <a:tcPr anchor="ctr"/>
@@ -5516,10 +5566,10 @@
                     <a:p>
                       <a:pPr algn="ctr" latinLnBrk="1"/>
                       <a:r>
-                        <a:rPr lang="en-US" altLang="ko-KR" sz="1100" dirty="0" err="1"/>
+                        <a:rPr lang="en-US" altLang="ko-KR" sz="1050" dirty="0" err="1"/>
                         <a:t>coupon_condition</a:t>
                       </a:r>
-                      <a:endParaRPr lang="ko-KR" altLang="en-US" sz="1100" dirty="0"/>
+                      <a:endParaRPr lang="ko-KR" altLang="en-US" sz="1050" dirty="0"/>
                     </a:p>
                   </a:txBody>
                   <a:tcPr anchor="ctr"/>
@@ -5538,10 +5588,10 @@
                     <a:p>
                       <a:pPr algn="ctr" latinLnBrk="1"/>
                       <a:r>
-                        <a:rPr lang="en-US" altLang="ko-KR" sz="1100" dirty="0" err="1"/>
+                        <a:rPr lang="en-US" altLang="ko-KR" sz="1050" dirty="0" err="1"/>
                         <a:t>serial_number</a:t>
                       </a:r>
-                      <a:endParaRPr lang="ko-KR" altLang="en-US" sz="1100" dirty="0"/>
+                      <a:endParaRPr lang="ko-KR" altLang="en-US" sz="1050" dirty="0"/>
                     </a:p>
                   </a:txBody>
                   <a:tcPr anchor="ctr"/>
@@ -5560,7 +5610,7 @@
                     <a:p>
                       <a:pPr algn="ctr" latinLnBrk="1"/>
                       <a:r>
-                        <a:rPr lang="en-US" altLang="ko-KR" sz="1100" dirty="0"/>
+                        <a:rPr lang="en-US" altLang="ko-KR" sz="1050" dirty="0"/>
                         <a:t>name</a:t>
                       </a:r>
                     </a:p>
@@ -5581,14 +5631,14 @@
                     <a:p>
                       <a:pPr algn="ctr" latinLnBrk="1"/>
                       <a:r>
-                        <a:rPr lang="en-US" altLang="ko-KR" sz="1100" dirty="0">
+                        <a:rPr lang="en-US" altLang="ko-KR" sz="1050" dirty="0">
                           <a:solidFill>
                             <a:srgbClr val="C00000"/>
                           </a:solidFill>
                         </a:rPr>
                         <a:t>Member N:1</a:t>
                       </a:r>
-                      <a:endParaRPr lang="ko-KR" altLang="en-US" sz="1100" dirty="0">
+                      <a:endParaRPr lang="ko-KR" altLang="en-US" sz="1050" dirty="0">
                         <a:solidFill>
                           <a:srgbClr val="C00000"/>
                         </a:solidFill>
@@ -5611,14 +5661,14 @@
                     <a:p>
                       <a:pPr algn="ctr" latinLnBrk="1"/>
                       <a:r>
-                        <a:rPr lang="en-US" altLang="ko-KR" sz="1100" dirty="0" err="1">
+                        <a:rPr lang="en-US" altLang="ko-KR" sz="1050" dirty="0" err="1">
                           <a:solidFill>
                             <a:schemeClr val="tx1"/>
                           </a:solidFill>
                         </a:rPr>
                         <a:t>isUsed</a:t>
                       </a:r>
-                      <a:endParaRPr lang="ko-KR" altLang="en-US" sz="1100" dirty="0">
+                      <a:endParaRPr lang="ko-KR" altLang="en-US" sz="1050" dirty="0">
                         <a:solidFill>
                           <a:schemeClr val="tx1"/>
                         </a:solidFill>
@@ -5652,13 +5702,13 @@
           <p:nvPr>
             <p:extLst>
               <p:ext uri="{D42A27DB-BD31-4B8C-83A1-F6EECF244321}">
-                <p14:modId xmlns:p14="http://schemas.microsoft.com/office/powerpoint/2010/main" val="891849230"/>
+                <p14:modId xmlns:p14="http://schemas.microsoft.com/office/powerpoint/2010/main" val="1457514244"/>
               </p:ext>
             </p:extLst>
           </p:nvPr>
         </p:nvGraphicFramePr>
         <p:xfrm>
-          <a:off x="6445313" y="1522053"/>
+          <a:off x="7092583" y="1522053"/>
           <a:ext cx="1685567" cy="4145280"/>
         </p:xfrm>
         <a:graphic>
@@ -5708,14 +5758,14 @@
                       <a:r>
                         <a:rPr lang="en-US" altLang="ko-KR" sz="1100" dirty="0" err="1">
                           <a:solidFill>
-                            <a:schemeClr val="tx1"/>
+                            <a:srgbClr val="00B050"/>
                           </a:solidFill>
                         </a:rPr>
                         <a:t>item_state</a:t>
                       </a:r>
                       <a:endParaRPr lang="ko-KR" altLang="en-US" sz="1100" dirty="0">
                         <a:solidFill>
-                          <a:schemeClr val="tx1"/>
+                          <a:srgbClr val="00B050"/>
                         </a:solidFill>
                       </a:endParaRPr>
                     </a:p>
@@ -6180,10 +6230,16 @@
           <p:cNvGraphicFramePr>
             <a:graphicFrameLocks noGrp="1"/>
           </p:cNvGraphicFramePr>
-          <p:nvPr/>
+          <p:nvPr>
+            <p:extLst>
+              <p:ext uri="{D42A27DB-BD31-4B8C-83A1-F6EECF244321}">
+                <p14:modId xmlns:p14="http://schemas.microsoft.com/office/powerpoint/2010/main" val="1383998349"/>
+              </p:ext>
+            </p:extLst>
+          </p:nvPr>
         </p:nvGraphicFramePr>
         <p:xfrm>
-          <a:off x="7222908" y="5747220"/>
+          <a:off x="7870178" y="5747220"/>
           <a:ext cx="1156368" cy="1036320"/>
         </p:xfrm>
         <a:graphic>
@@ -6328,13 +6384,13 @@
           <p:nvPr>
             <p:extLst>
               <p:ext uri="{D42A27DB-BD31-4B8C-83A1-F6EECF244321}">
-                <p14:modId xmlns:p14="http://schemas.microsoft.com/office/powerpoint/2010/main" val="4293189578"/>
+                <p14:modId xmlns:p14="http://schemas.microsoft.com/office/powerpoint/2010/main" val="2238605746"/>
               </p:ext>
             </p:extLst>
           </p:nvPr>
         </p:nvGraphicFramePr>
         <p:xfrm>
-          <a:off x="8626740" y="848659"/>
+          <a:off x="9274010" y="848659"/>
           <a:ext cx="1572413" cy="777240"/>
         </p:xfrm>
         <a:graphic>
@@ -6477,13 +6533,13 @@
           <p:nvPr>
             <p:extLst>
               <p:ext uri="{D42A27DB-BD31-4B8C-83A1-F6EECF244321}">
-                <p14:modId xmlns:p14="http://schemas.microsoft.com/office/powerpoint/2010/main" val="217045377"/>
+                <p14:modId xmlns:p14="http://schemas.microsoft.com/office/powerpoint/2010/main" val="234064568"/>
               </p:ext>
             </p:extLst>
           </p:nvPr>
         </p:nvGraphicFramePr>
         <p:xfrm>
-          <a:off x="4094323" y="2542525"/>
+          <a:off x="4464191" y="2542525"/>
           <a:ext cx="1284824" cy="3017520"/>
         </p:xfrm>
         <a:graphic>
@@ -6951,10 +7007,16 @@
           <p:cNvGraphicFramePr>
             <a:graphicFrameLocks noGrp="1"/>
           </p:cNvGraphicFramePr>
-          <p:nvPr/>
+          <p:nvPr>
+            <p:extLst>
+              <p:ext uri="{D42A27DB-BD31-4B8C-83A1-F6EECF244321}">
+                <p14:modId xmlns:p14="http://schemas.microsoft.com/office/powerpoint/2010/main" val="1154989017"/>
+              </p:ext>
+            </p:extLst>
+          </p:nvPr>
         </p:nvGraphicFramePr>
         <p:xfrm>
-          <a:off x="8496747" y="2013281"/>
+          <a:off x="9144017" y="2013281"/>
           <a:ext cx="1519240" cy="2072640"/>
         </p:xfrm>
         <a:graphic>
@@ -7316,10 +7378,16 @@
           <p:cNvGraphicFramePr>
             <a:graphicFrameLocks noGrp="1"/>
           </p:cNvGraphicFramePr>
-          <p:nvPr/>
+          <p:nvPr>
+            <p:extLst>
+              <p:ext uri="{D42A27DB-BD31-4B8C-83A1-F6EECF244321}">
+                <p14:modId xmlns:p14="http://schemas.microsoft.com/office/powerpoint/2010/main" val="1994722588"/>
+              </p:ext>
+            </p:extLst>
+          </p:nvPr>
         </p:nvGraphicFramePr>
         <p:xfrm>
-          <a:off x="10199153" y="3422409"/>
+          <a:off x="10846423" y="3422409"/>
           <a:ext cx="1156368" cy="1036320"/>
         </p:xfrm>
         <a:graphic>
@@ -7468,13 +7536,13 @@
           <p:nvPr>
             <p:extLst>
               <p:ext uri="{D42A27DB-BD31-4B8C-83A1-F6EECF244321}">
-                <p14:modId xmlns:p14="http://schemas.microsoft.com/office/powerpoint/2010/main" val="52588712"/>
+                <p14:modId xmlns:p14="http://schemas.microsoft.com/office/powerpoint/2010/main" val="3120709286"/>
               </p:ext>
             </p:extLst>
           </p:nvPr>
         </p:nvGraphicFramePr>
         <p:xfrm>
-          <a:off x="8513154" y="4877544"/>
+          <a:off x="9160424" y="4877544"/>
           <a:ext cx="1156368" cy="1295400"/>
         </p:xfrm>
         <a:graphic>
@@ -7694,10 +7762,16 @@
           <p:cNvGraphicFramePr>
             <a:graphicFrameLocks noGrp="1"/>
           </p:cNvGraphicFramePr>
-          <p:nvPr/>
+          <p:nvPr>
+            <p:extLst>
+              <p:ext uri="{D42A27DB-BD31-4B8C-83A1-F6EECF244321}">
+                <p14:modId xmlns:p14="http://schemas.microsoft.com/office/powerpoint/2010/main" val="1774386216"/>
+              </p:ext>
+            </p:extLst>
+          </p:nvPr>
         </p:nvGraphicFramePr>
         <p:xfrm>
-          <a:off x="9779909" y="4890093"/>
+          <a:off x="10427179" y="4890093"/>
           <a:ext cx="1156368" cy="1036320"/>
         </p:xfrm>
         <a:graphic>
@@ -7875,10 +7949,16 @@
           <p:cNvGraphicFramePr>
             <a:graphicFrameLocks noGrp="1"/>
           </p:cNvGraphicFramePr>
-          <p:nvPr/>
+          <p:nvPr>
+            <p:extLst>
+              <p:ext uri="{D42A27DB-BD31-4B8C-83A1-F6EECF244321}">
+                <p14:modId xmlns:p14="http://schemas.microsoft.com/office/powerpoint/2010/main" val="3356031792"/>
+              </p:ext>
+            </p:extLst>
+          </p:nvPr>
         </p:nvGraphicFramePr>
         <p:xfrm>
-          <a:off x="5964558" y="5747220"/>
+          <a:off x="6632377" y="5747220"/>
           <a:ext cx="1156368" cy="1036320"/>
         </p:xfrm>
         <a:graphic>
@@ -8020,10 +8100,16 @@
           <p:cNvGraphicFramePr>
             <a:graphicFrameLocks noGrp="1"/>
           </p:cNvGraphicFramePr>
-          <p:nvPr/>
+          <p:nvPr>
+            <p:extLst>
+              <p:ext uri="{D42A27DB-BD31-4B8C-83A1-F6EECF244321}">
+                <p14:modId xmlns:p14="http://schemas.microsoft.com/office/powerpoint/2010/main" val="3822943987"/>
+              </p:ext>
+            </p:extLst>
+          </p:nvPr>
         </p:nvGraphicFramePr>
         <p:xfrm>
-          <a:off x="6436701" y="142291"/>
+          <a:off x="7083971" y="142291"/>
           <a:ext cx="1572413" cy="1036320"/>
         </p:xfrm>
         <a:graphic>
@@ -8347,7 +8433,13 @@
           <p:cNvGraphicFramePr>
             <a:graphicFrameLocks noGrp="1"/>
           </p:cNvGraphicFramePr>
-          <p:nvPr/>
+          <p:nvPr>
+            <p:extLst>
+              <p:ext uri="{D42A27DB-BD31-4B8C-83A1-F6EECF244321}">
+                <p14:modId xmlns:p14="http://schemas.microsoft.com/office/powerpoint/2010/main" val="3245488054"/>
+              </p:ext>
+            </p:extLst>
+          </p:nvPr>
         </p:nvGraphicFramePr>
         <p:xfrm>
           <a:off x="49398" y="3833262"/>
@@ -8464,10 +8556,18 @@
                     <a:p>
                       <a:pPr algn="ctr" latinLnBrk="1"/>
                       <a:r>
-                        <a:rPr lang="en-US" altLang="ko-KR" sz="1100" dirty="0" err="1"/>
+                        <a:rPr lang="en-US" altLang="ko-KR" sz="1100" dirty="0" err="1">
+                          <a:solidFill>
+                            <a:srgbClr val="00B050"/>
+                          </a:solidFill>
+                        </a:rPr>
                         <a:t>delivery_state</a:t>
                       </a:r>
-                      <a:endParaRPr lang="ko-KR" altLang="en-US" sz="1100" dirty="0"/>
+                      <a:endParaRPr lang="ko-KR" altLang="en-US" sz="1100" dirty="0">
+                        <a:solidFill>
+                          <a:srgbClr val="00B050"/>
+                        </a:solidFill>
+                      </a:endParaRPr>
                     </a:p>
                   </a:txBody>
                   <a:tcPr anchor="ctr"/>
@@ -8496,7 +8596,7 @@
         </p:nvSpPr>
         <p:spPr>
           <a:xfrm>
-            <a:off x="4094323" y="229195"/>
+            <a:off x="4032679" y="167551"/>
             <a:ext cx="773181" cy="416344"/>
           </a:xfrm>
           <a:prstGeom prst="roundRect">
@@ -8551,7 +8651,7 @@
         </p:nvSpPr>
         <p:spPr>
           <a:xfrm>
-            <a:off x="191615" y="5230478"/>
+            <a:off x="79777" y="5182651"/>
             <a:ext cx="751687" cy="416344"/>
           </a:xfrm>
           <a:prstGeom prst="roundRect">
@@ -8613,7 +8713,7 @@
         </p:nvSpPr>
         <p:spPr>
           <a:xfrm>
-            <a:off x="407205" y="6297697"/>
+            <a:off x="504036" y="6095895"/>
             <a:ext cx="751687" cy="416344"/>
           </a:xfrm>
           <a:prstGeom prst="roundRect">
@@ -8668,7 +8768,7 @@
         </p:nvSpPr>
         <p:spPr>
           <a:xfrm>
-            <a:off x="5546782" y="1732624"/>
+            <a:off x="6204324" y="1660705"/>
             <a:ext cx="898531" cy="521024"/>
           </a:xfrm>
           <a:prstGeom prst="roundRect">
@@ -8731,7 +8831,7 @@
         </p:nvSpPr>
         <p:spPr>
           <a:xfrm>
-            <a:off x="4061195" y="1052364"/>
+            <a:off x="4030373" y="1000994"/>
             <a:ext cx="1685567" cy="333262"/>
           </a:xfrm>
           <a:prstGeom prst="roundRect">
@@ -8787,7 +8887,7 @@
         </p:nvSpPr>
         <p:spPr>
           <a:xfrm>
-            <a:off x="93040" y="1586713"/>
+            <a:off x="179158" y="1201258"/>
             <a:ext cx="692507" cy="682952"/>
           </a:xfrm>
           <a:prstGeom prst="roundRect">
@@ -8856,7 +8956,7 @@
         </p:nvSpPr>
         <p:spPr>
           <a:xfrm>
-            <a:off x="424231" y="5748638"/>
+            <a:off x="493762" y="5608918"/>
             <a:ext cx="751687" cy="416344"/>
           </a:xfrm>
           <a:prstGeom prst="roundRect">
@@ -8909,10 +9009,16 @@
           <p:cNvGraphicFramePr>
             <a:graphicFrameLocks noGrp="1"/>
           </p:cNvGraphicFramePr>
-          <p:nvPr/>
+          <p:nvPr>
+            <p:extLst>
+              <p:ext uri="{D42A27DB-BD31-4B8C-83A1-F6EECF244321}">
+                <p14:modId xmlns:p14="http://schemas.microsoft.com/office/powerpoint/2010/main" val="2354792146"/>
+              </p:ext>
+            </p:extLst>
+          </p:nvPr>
         </p:nvGraphicFramePr>
         <p:xfrm>
-          <a:off x="4686058" y="5747220"/>
+          <a:off x="5374425" y="5747220"/>
           <a:ext cx="1156368" cy="1036320"/>
         </p:xfrm>
         <a:graphic>
@@ -12610,14 +12716,14 @@
           <p:nvPr>
             <p:extLst>
               <p:ext uri="{D42A27DB-BD31-4B8C-83A1-F6EECF244321}">
-                <p14:modId xmlns:p14="http://schemas.microsoft.com/office/powerpoint/2010/main" val="2317328781"/>
+                <p14:modId xmlns:p14="http://schemas.microsoft.com/office/powerpoint/2010/main" val="3769575311"/>
               </p:ext>
             </p:extLst>
           </p:nvPr>
         </p:nvGraphicFramePr>
         <p:xfrm>
-          <a:off x="10663702" y="3694461"/>
-          <a:ext cx="1156368" cy="1630680"/>
+          <a:off x="10581901" y="3694461"/>
+          <a:ext cx="1435436" cy="1295400"/>
         </p:xfrm>
         <a:graphic>
           <a:graphicData uri="http://schemas.openxmlformats.org/drawingml/2006/table">
@@ -12626,7 +12732,7 @@
                 <a:tableStyleId>{5C22544A-7EE6-4342-B048-85BDC9FD1C3A}</a:tableStyleId>
               </a:tblPr>
               <a:tblGrid>
-                <a:gridCol w="1156368">
+                <a:gridCol w="1435436">
                   <a:extLst>
                     <a:ext uri="{9D8B030D-6E8A-4147-A177-3AD203B41FA5}">
                       <a16:colId xmlns:a16="http://schemas.microsoft.com/office/drawing/2014/main" val="329139778"/>

</xml_diff>